<commit_message>
Initial add of test harness.
</commit_message>
<xml_diff>
--- a/HowToThinkInSets.pptx
+++ b/HowToThinkInSets.pptx
@@ -5,13 +5,14 @@
     <p:sldMasterId id="2147483648" r:id="rId1"/>
   </p:sldMasterIdLst>
   <p:notesMasterIdLst>
-    <p:notesMasterId r:id="rId6"/>
+    <p:notesMasterId r:id="rId7"/>
   </p:notesMasterIdLst>
   <p:sldIdLst>
     <p:sldId id="263" r:id="rId2"/>
     <p:sldId id="265" r:id="rId3"/>
     <p:sldId id="268" r:id="rId4"/>
-    <p:sldId id="267" r:id="rId5"/>
+    <p:sldId id="269" r:id="rId5"/>
+    <p:sldId id="267" r:id="rId6"/>
   </p:sldIdLst>
   <p:sldSz cx="11520488" cy="6480175"/>
   <p:notesSz cx="6858000" cy="9144000"/>
@@ -215,7 +216,7 @@
           <a:p>
             <a:fld id="{3CD51548-82AA-4A2B-B152-1D3266E0F652}" type="datetimeFigureOut">
               <a:rPr lang="en-US" smtClean="0"/>
-              <a:t>06/16/2017</a:t>
+              <a:t>06/20/2017</a:t>
             </a:fld>
             <a:endParaRPr lang="en-US"/>
           </a:p>
@@ -1674,7 +1675,7 @@
           <a:graphicData uri="http://schemas.openxmlformats.org/presentationml/2006/ole">
             <mc:AlternateContent xmlns:mc="http://schemas.openxmlformats.org/markup-compatibility/2006">
               <mc:Choice xmlns:v="urn:schemas-microsoft-com:vml" Requires="v">
-                <p:oleObj spid="_x0000_s1046" name="Image" r:id="rId10" imgW="2279520" imgH="1310400" progId="Photoshop.Image.18">
+                <p:oleObj spid="_x0000_s1047" name="Image" r:id="rId10" imgW="2279520" imgH="1310400" progId="Photoshop.Image.18">
                   <p:embed/>
                 </p:oleObj>
               </mc:Choice>
@@ -2097,7 +2098,7 @@
           <p:cNvPr id="4" name="TextBox 3">
             <a:extLst>
               <a:ext uri="{FF2B5EF4-FFF2-40B4-BE49-F238E27FC236}">
-                <a16:creationId xmlns:a16="http://schemas.microsoft.com/office/drawing/2014/main" xmlns="" id="{4E95CA58-BC71-4CE1-ACB0-4410970492E6}"/>
+                <a16:creationId xmlns="" xmlns:a16="http://schemas.microsoft.com/office/drawing/2014/main" id="{4E95CA58-BC71-4CE1-ACB0-4410970492E6}"/>
               </a:ext>
             </a:extLst>
           </p:cNvPr>
@@ -3276,6 +3277,85 @@
 </file>
 
 <file path=ppt/slides/slide4.xml><?xml version="1.0" encoding="utf-8"?>
+<p:sld xmlns:a="http://schemas.openxmlformats.org/drawingml/2006/main" xmlns:r="http://schemas.openxmlformats.org/officeDocument/2006/relationships" xmlns:p="http://schemas.openxmlformats.org/presentationml/2006/main">
+  <p:cSld>
+    <p:spTree>
+      <p:nvGrpSpPr>
+        <p:cNvPr id="1" name=""/>
+        <p:cNvGrpSpPr/>
+        <p:nvPr/>
+      </p:nvGrpSpPr>
+      <p:grpSpPr>
+        <a:xfrm>
+          <a:off x="0" y="0"/>
+          <a:ext cx="0" cy="0"/>
+          <a:chOff x="0" y="0"/>
+          <a:chExt cx="0" cy="0"/>
+        </a:xfrm>
+      </p:grpSpPr>
+      <p:sp>
+        <p:nvSpPr>
+          <p:cNvPr id="2" name="Title 1"/>
+          <p:cNvSpPr>
+            <a:spLocks noGrp="1"/>
+          </p:cNvSpPr>
+          <p:nvPr>
+            <p:ph type="title"/>
+          </p:nvPr>
+        </p:nvSpPr>
+        <p:spPr/>
+        <p:txBody>
+          <a:bodyPr/>
+          <a:lstStyle/>
+          <a:p>
+            <a:r>
+              <a:rPr lang="en-US" dirty="0" smtClean="0"/>
+              <a:t>Test Harness</a:t>
+            </a:r>
+            <a:endParaRPr lang="en-US" dirty="0"/>
+          </a:p>
+        </p:txBody>
+      </p:sp>
+      <p:pic>
+        <p:nvPicPr>
+          <p:cNvPr id="4" name="Content Placeholder 3"/>
+          <p:cNvPicPr>
+            <a:picLocks noGrp="1" noChangeAspect="1"/>
+          </p:cNvPicPr>
+          <p:nvPr>
+            <p:ph idx="1"/>
+          </p:nvPr>
+        </p:nvPicPr>
+        <p:blipFill>
+          <a:blip r:embed="rId2"/>
+          <a:stretch>
+            <a:fillRect/>
+          </a:stretch>
+        </p:blipFill>
+        <p:spPr>
+          <a:xfrm>
+            <a:off x="768737" y="1681655"/>
+            <a:ext cx="10296330" cy="3409152"/>
+          </a:xfrm>
+          <a:prstGeom prst="rect">
+            <a:avLst/>
+          </a:prstGeom>
+        </p:spPr>
+      </p:pic>
+    </p:spTree>
+    <p:extLst>
+      <p:ext uri="{BB962C8B-B14F-4D97-AF65-F5344CB8AC3E}">
+        <p14:creationId xmlns:p14="http://schemas.microsoft.com/office/powerpoint/2010/main" val="3902501664"/>
+      </p:ext>
+    </p:extLst>
+  </p:cSld>
+  <p:clrMapOvr>
+    <a:masterClrMapping/>
+  </p:clrMapOvr>
+</p:sld>
+</file>
+
+<file path=ppt/slides/slide5.xml><?xml version="1.0" encoding="utf-8"?>
 <p:sld xmlns:a="http://schemas.openxmlformats.org/drawingml/2006/main" xmlns:r="http://schemas.openxmlformats.org/officeDocument/2006/relationships" xmlns:p="http://schemas.openxmlformats.org/presentationml/2006/main">
   <p:cSld>
     <p:spTree>

</xml_diff>

<commit_message>
Update test harness code on slides.
</commit_message>
<xml_diff>
--- a/HowToThinkInSets.pptx
+++ b/HowToThinkInSets.pptx
@@ -5,14 +5,15 @@
     <p:sldMasterId id="2147483648" r:id="rId1"/>
   </p:sldMasterIdLst>
   <p:notesMasterIdLst>
-    <p:notesMasterId r:id="rId7"/>
+    <p:notesMasterId r:id="rId8"/>
   </p:notesMasterIdLst>
   <p:sldIdLst>
     <p:sldId id="263" r:id="rId2"/>
     <p:sldId id="265" r:id="rId3"/>
     <p:sldId id="268" r:id="rId4"/>
     <p:sldId id="269" r:id="rId5"/>
-    <p:sldId id="267" r:id="rId6"/>
+    <p:sldId id="271" r:id="rId6"/>
+    <p:sldId id="267" r:id="rId7"/>
   </p:sldIdLst>
   <p:sldSz cx="11520488" cy="6480175"/>
   <p:notesSz cx="6858000" cy="9144000"/>
@@ -216,7 +217,7 @@
           <a:p>
             <a:fld id="{3CD51548-82AA-4A2B-B152-1D3266E0F652}" type="datetimeFigureOut">
               <a:rPr lang="en-US" smtClean="0"/>
-              <a:t>06/20/2017</a:t>
+              <a:t>7/15/2017</a:t>
             </a:fld>
             <a:endParaRPr lang="en-US"/>
           </a:p>
@@ -1675,7 +1676,7 @@
           <a:graphicData uri="http://schemas.openxmlformats.org/presentationml/2006/ole">
             <mc:AlternateContent xmlns:mc="http://schemas.openxmlformats.org/markup-compatibility/2006">
               <mc:Choice xmlns:v="urn:schemas-microsoft-com:vml" Requires="v">
-                <p:oleObj spid="_x0000_s1047" name="Image" r:id="rId10" imgW="2279520" imgH="1310400" progId="Photoshop.Image.18">
+                <p:oleObj spid="_x0000_s1049" name="Image" r:id="rId10" imgW="2279520" imgH="1310400" progId="Photoshop.Image.18">
                   <p:embed/>
                 </p:oleObj>
               </mc:Choice>
@@ -2064,10 +2065,9 @@
           <a:lstStyle/>
           <a:p>
             <a:r>
-              <a:rPr lang="en-US" sz="5400" dirty="0" smtClean="0"/>
+              <a:rPr lang="en-US" sz="5400" dirty="0"/>
               <a:t>Set Me Up: How to Think in Sets</a:t>
             </a:r>
-            <a:endParaRPr lang="en-US" sz="5400" dirty="0"/>
           </a:p>
         </p:txBody>
       </p:sp>
@@ -2098,7 +2098,7 @@
           <p:cNvPr id="4" name="TextBox 3">
             <a:extLst>
               <a:ext uri="{FF2B5EF4-FFF2-40B4-BE49-F238E27FC236}">
-                <a16:creationId xmlns="" xmlns:a16="http://schemas.microsoft.com/office/drawing/2014/main" id="{4E95CA58-BC71-4CE1-ACB0-4410970492E6}"/>
+                <a16:creationId xmlns:a16="http://schemas.microsoft.com/office/drawing/2014/main" id="{4E95CA58-BC71-4CE1-ACB0-4410970492E6}"/>
               </a:ext>
             </a:extLst>
           </p:cNvPr>
@@ -2124,31 +2124,21 @@
             <a:pPr algn="r"/>
             <a:r>
               <a:rPr lang="en-US" dirty="0"/>
-              <a:t>SQL Saturday </a:t>
-            </a:r>
-            <a:r>
-              <a:rPr lang="en-US" dirty="0" smtClean="0"/>
-              <a:t>#628</a:t>
-            </a:r>
-            <a:endParaRPr lang="en-US" dirty="0"/>
+              <a:t>SQL Saturday #628</a:t>
+            </a:r>
           </a:p>
           <a:p>
             <a:pPr algn="r"/>
             <a:r>
-              <a:rPr lang="en-US" dirty="0" smtClean="0"/>
+              <a:rPr lang="en-US" dirty="0"/>
               <a:t>Baton Rouge, Louisiana</a:t>
             </a:r>
-            <a:endParaRPr lang="en-US" dirty="0"/>
           </a:p>
           <a:p>
             <a:pPr algn="r"/>
             <a:r>
-              <a:rPr lang="en-US" dirty="0" smtClean="0"/>
-              <a:t>29 July </a:t>
-            </a:r>
-            <a:r>
-              <a:rPr lang="en-US" dirty="0"/>
-              <a:t>2017</a:t>
+              <a:rPr lang="en-US" dirty="0"/>
+              <a:t>29 July 2017</a:t>
             </a:r>
           </a:p>
         </p:txBody>
@@ -3209,10 +3199,9 @@
           <a:lstStyle/>
           <a:p>
             <a:r>
-              <a:rPr lang="en-US" dirty="0" smtClean="0"/>
+              <a:rPr lang="en-US" dirty="0"/>
               <a:t>Agenda</a:t>
             </a:r>
-            <a:endParaRPr lang="en-US" dirty="0"/>
           </a:p>
         </p:txBody>
       </p:sp>
@@ -3236,7 +3225,7 @@
               <a:buChar char="•"/>
             </a:pPr>
             <a:r>
-              <a:rPr lang="en-US" dirty="0" smtClean="0"/>
+              <a:rPr lang="en-US" dirty="0"/>
               <a:t>Why sets?</a:t>
             </a:r>
           </a:p>
@@ -3246,7 +3235,7 @@
               <a:buChar char="•"/>
             </a:pPr>
             <a:r>
-              <a:rPr lang="en-US" dirty="0" smtClean="0"/>
+              <a:rPr lang="en-US" dirty="0"/>
               <a:t>Anti-patterns and solutions</a:t>
             </a:r>
           </a:p>
@@ -3256,10 +3245,9 @@
               <a:buChar char="•"/>
             </a:pPr>
             <a:r>
-              <a:rPr lang="en-US" dirty="0" smtClean="0"/>
+              <a:rPr lang="en-US" dirty="0"/>
               <a:t>Set-based constructs</a:t>
             </a:r>
-            <a:endParaRPr lang="en-US" dirty="0"/>
           </a:p>
         </p:txBody>
       </p:sp>
@@ -3309,10 +3297,9 @@
           <a:lstStyle/>
           <a:p>
             <a:r>
-              <a:rPr lang="en-US" dirty="0" smtClean="0"/>
+              <a:rPr lang="en-US" dirty="0"/>
               <a:t>Test Harness</a:t>
             </a:r>
-            <a:endParaRPr lang="en-US" dirty="0"/>
           </a:p>
         </p:txBody>
       </p:sp>
@@ -3389,6 +3376,573 @@
           <a:p>
             <a:r>
               <a:rPr lang="en-US" dirty="0"/>
+              <a:t>Test Harness</a:t>
+            </a:r>
+          </a:p>
+        </p:txBody>
+      </p:sp>
+      <p:sp>
+        <p:nvSpPr>
+          <p:cNvPr id="5" name="Content Placeholder 4">
+            <a:extLst>
+              <a:ext uri="{FF2B5EF4-FFF2-40B4-BE49-F238E27FC236}">
+                <a16:creationId xmlns:a16="http://schemas.microsoft.com/office/drawing/2014/main" id="{EA577935-A7F7-4DF4-95F2-8BF0108D9ACF}"/>
+              </a:ext>
+            </a:extLst>
+          </p:cNvPr>
+          <p:cNvSpPr>
+            <a:spLocks noGrp="1"/>
+          </p:cNvSpPr>
+          <p:nvPr>
+            <p:ph idx="1"/>
+          </p:nvPr>
+        </p:nvSpPr>
+        <p:spPr/>
+        <p:txBody>
+          <a:bodyPr>
+            <a:normAutofit/>
+          </a:bodyPr>
+          <a:lstStyle/>
+          <a:p>
+            <a:r>
+              <a:rPr lang="en-US" sz="1800" dirty="0">
+                <a:solidFill>
+                  <a:srgbClr val="2B91AF"/>
+                </a:solidFill>
+                <a:latin typeface="Consolas" panose="020B0609020204030204" pitchFamily="49" charset="0"/>
+              </a:rPr>
+              <a:t>List</a:t>
+            </a:r>
+            <a:r>
+              <a:rPr lang="en-US" sz="1800" dirty="0">
+                <a:solidFill>
+                  <a:srgbClr val="000000"/>
+                </a:solidFill>
+                <a:latin typeface="Consolas" panose="020B0609020204030204" pitchFamily="49" charset="0"/>
+              </a:rPr>
+              <a:t>&lt;</a:t>
+            </a:r>
+            <a:r>
+              <a:rPr lang="en-US" sz="1800" dirty="0" err="1">
+                <a:solidFill>
+                  <a:srgbClr val="2B91AF"/>
+                </a:solidFill>
+                <a:latin typeface="Consolas" panose="020B0609020204030204" pitchFamily="49" charset="0"/>
+              </a:rPr>
+              <a:t>TimeSpan</a:t>
+            </a:r>
+            <a:r>
+              <a:rPr lang="en-US" sz="1800" dirty="0">
+                <a:solidFill>
+                  <a:srgbClr val="000000"/>
+                </a:solidFill>
+                <a:latin typeface="Consolas" panose="020B0609020204030204" pitchFamily="49" charset="0"/>
+              </a:rPr>
+              <a:t>&gt; </a:t>
+            </a:r>
+            <a:r>
+              <a:rPr lang="en-US" sz="1800" dirty="0" err="1">
+                <a:solidFill>
+                  <a:srgbClr val="000000"/>
+                </a:solidFill>
+                <a:latin typeface="Consolas" panose="020B0609020204030204" pitchFamily="49" charset="0"/>
+              </a:rPr>
+              <a:t>executionTimes</a:t>
+            </a:r>
+            <a:r>
+              <a:rPr lang="en-US" sz="1800" dirty="0">
+                <a:solidFill>
+                  <a:srgbClr val="000000"/>
+                </a:solidFill>
+                <a:latin typeface="Consolas" panose="020B0609020204030204" pitchFamily="49" charset="0"/>
+              </a:rPr>
+              <a:t> = </a:t>
+            </a:r>
+            <a:r>
+              <a:rPr lang="en-US" sz="1800" dirty="0">
+                <a:solidFill>
+                  <a:srgbClr val="0000FF"/>
+                </a:solidFill>
+                <a:latin typeface="Consolas" panose="020B0609020204030204" pitchFamily="49" charset="0"/>
+              </a:rPr>
+              <a:t>new</a:t>
+            </a:r>
+            <a:r>
+              <a:rPr lang="en-US" sz="1800" dirty="0">
+                <a:solidFill>
+                  <a:srgbClr val="000000"/>
+                </a:solidFill>
+                <a:latin typeface="Consolas" panose="020B0609020204030204" pitchFamily="49" charset="0"/>
+              </a:rPr>
+              <a:t> </a:t>
+            </a:r>
+            <a:r>
+              <a:rPr lang="en-US" sz="1800" dirty="0">
+                <a:solidFill>
+                  <a:srgbClr val="2B91AF"/>
+                </a:solidFill>
+                <a:latin typeface="Consolas" panose="020B0609020204030204" pitchFamily="49" charset="0"/>
+              </a:rPr>
+              <a:t>List</a:t>
+            </a:r>
+            <a:r>
+              <a:rPr lang="en-US" sz="1800" dirty="0">
+                <a:solidFill>
+                  <a:srgbClr val="000000"/>
+                </a:solidFill>
+                <a:latin typeface="Consolas" panose="020B0609020204030204" pitchFamily="49" charset="0"/>
+              </a:rPr>
+              <a:t>&lt;</a:t>
+            </a:r>
+            <a:r>
+              <a:rPr lang="en-US" sz="1800" dirty="0" err="1">
+                <a:solidFill>
+                  <a:srgbClr val="2B91AF"/>
+                </a:solidFill>
+                <a:latin typeface="Consolas" panose="020B0609020204030204" pitchFamily="49" charset="0"/>
+              </a:rPr>
+              <a:t>TimeSpan</a:t>
+            </a:r>
+            <a:r>
+              <a:rPr lang="en-US" sz="1800" dirty="0">
+                <a:solidFill>
+                  <a:srgbClr val="000000"/>
+                </a:solidFill>
+                <a:latin typeface="Consolas" panose="020B0609020204030204" pitchFamily="49" charset="0"/>
+              </a:rPr>
+              <a:t>&gt;();</a:t>
+            </a:r>
+          </a:p>
+          <a:p>
+            <a:r>
+              <a:rPr lang="en-US" sz="1800" dirty="0">
+                <a:solidFill>
+                  <a:srgbClr val="0000FF"/>
+                </a:solidFill>
+                <a:latin typeface="Consolas" panose="020B0609020204030204" pitchFamily="49" charset="0"/>
+              </a:rPr>
+              <a:t>for</a:t>
+            </a:r>
+            <a:r>
+              <a:rPr lang="en-US" sz="1800" dirty="0">
+                <a:solidFill>
+                  <a:srgbClr val="000000"/>
+                </a:solidFill>
+                <a:latin typeface="Consolas" panose="020B0609020204030204" pitchFamily="49" charset="0"/>
+              </a:rPr>
+              <a:t> (</a:t>
+            </a:r>
+            <a:r>
+              <a:rPr lang="en-US" sz="1800" dirty="0" err="1">
+                <a:solidFill>
+                  <a:srgbClr val="0000FF"/>
+                </a:solidFill>
+                <a:latin typeface="Consolas" panose="020B0609020204030204" pitchFamily="49" charset="0"/>
+              </a:rPr>
+              <a:t>int</a:t>
+            </a:r>
+            <a:r>
+              <a:rPr lang="en-US" sz="1800" dirty="0">
+                <a:solidFill>
+                  <a:srgbClr val="000000"/>
+                </a:solidFill>
+                <a:latin typeface="Consolas" panose="020B0609020204030204" pitchFamily="49" charset="0"/>
+              </a:rPr>
+              <a:t> </a:t>
+            </a:r>
+            <a:r>
+              <a:rPr lang="en-US" sz="1800" dirty="0" err="1">
+                <a:solidFill>
+                  <a:srgbClr val="000000"/>
+                </a:solidFill>
+                <a:latin typeface="Consolas" panose="020B0609020204030204" pitchFamily="49" charset="0"/>
+              </a:rPr>
+              <a:t>executionCounter</a:t>
+            </a:r>
+            <a:r>
+              <a:rPr lang="en-US" sz="1800" dirty="0">
+                <a:solidFill>
+                  <a:srgbClr val="000000"/>
+                </a:solidFill>
+                <a:latin typeface="Consolas" panose="020B0609020204030204" pitchFamily="49" charset="0"/>
+              </a:rPr>
+              <a:t> = 0; </a:t>
+            </a:r>
+            <a:r>
+              <a:rPr lang="en-US" sz="1800" dirty="0" err="1">
+                <a:solidFill>
+                  <a:srgbClr val="000000"/>
+                </a:solidFill>
+                <a:latin typeface="Consolas" panose="020B0609020204030204" pitchFamily="49" charset="0"/>
+              </a:rPr>
+              <a:t>executionCounter</a:t>
+            </a:r>
+            <a:r>
+              <a:rPr lang="en-US" sz="1800" dirty="0">
+                <a:solidFill>
+                  <a:srgbClr val="000000"/>
+                </a:solidFill>
+                <a:latin typeface="Consolas" panose="020B0609020204030204" pitchFamily="49" charset="0"/>
+              </a:rPr>
+              <a:t> &lt; 5; </a:t>
+            </a:r>
+            <a:r>
+              <a:rPr lang="en-US" sz="1800" dirty="0" err="1">
+                <a:solidFill>
+                  <a:srgbClr val="000000"/>
+                </a:solidFill>
+                <a:latin typeface="Consolas" panose="020B0609020204030204" pitchFamily="49" charset="0"/>
+              </a:rPr>
+              <a:t>executionCounter</a:t>
+            </a:r>
+            <a:r>
+              <a:rPr lang="en-US" sz="1800" dirty="0">
+                <a:solidFill>
+                  <a:srgbClr val="000000"/>
+                </a:solidFill>
+                <a:latin typeface="Consolas" panose="020B0609020204030204" pitchFamily="49" charset="0"/>
+              </a:rPr>
+              <a:t>++)</a:t>
+            </a:r>
+          </a:p>
+          <a:p>
+            <a:r>
+              <a:rPr lang="en-US" sz="1800" dirty="0">
+                <a:solidFill>
+                  <a:srgbClr val="000000"/>
+                </a:solidFill>
+                <a:latin typeface="Consolas" panose="020B0609020204030204" pitchFamily="49" charset="0"/>
+              </a:rPr>
+              <a:t>{</a:t>
+            </a:r>
+          </a:p>
+          <a:p>
+            <a:r>
+              <a:rPr lang="en-US" sz="1800" dirty="0">
+                <a:solidFill>
+                  <a:srgbClr val="000000"/>
+                </a:solidFill>
+                <a:latin typeface="Consolas" panose="020B0609020204030204" pitchFamily="49" charset="0"/>
+              </a:rPr>
+              <a:t>    </a:t>
+            </a:r>
+            <a:r>
+              <a:rPr lang="en-US" sz="1800" dirty="0">
+                <a:solidFill>
+                  <a:srgbClr val="2B91AF"/>
+                </a:solidFill>
+                <a:latin typeface="Consolas" panose="020B0609020204030204" pitchFamily="49" charset="0"/>
+              </a:rPr>
+              <a:t>Stopwatch</a:t>
+            </a:r>
+            <a:r>
+              <a:rPr lang="en-US" sz="1800" dirty="0">
+                <a:solidFill>
+                  <a:srgbClr val="000000"/>
+                </a:solidFill>
+                <a:latin typeface="Consolas" panose="020B0609020204030204" pitchFamily="49" charset="0"/>
+              </a:rPr>
+              <a:t> clock = </a:t>
+            </a:r>
+            <a:r>
+              <a:rPr lang="en-US" sz="1800" dirty="0" err="1">
+                <a:solidFill>
+                  <a:srgbClr val="2B91AF"/>
+                </a:solidFill>
+                <a:latin typeface="Consolas" panose="020B0609020204030204" pitchFamily="49" charset="0"/>
+              </a:rPr>
+              <a:t>Stopwatch</a:t>
+            </a:r>
+            <a:r>
+              <a:rPr lang="en-US" sz="1800" dirty="0" err="1">
+                <a:solidFill>
+                  <a:srgbClr val="000000"/>
+                </a:solidFill>
+                <a:latin typeface="Consolas" panose="020B0609020204030204" pitchFamily="49" charset="0"/>
+              </a:rPr>
+              <a:t>.StartNew</a:t>
+            </a:r>
+            <a:r>
+              <a:rPr lang="en-US" sz="1800" dirty="0">
+                <a:solidFill>
+                  <a:srgbClr val="000000"/>
+                </a:solidFill>
+                <a:latin typeface="Consolas" panose="020B0609020204030204" pitchFamily="49" charset="0"/>
+              </a:rPr>
+              <a:t>();</a:t>
+            </a:r>
+          </a:p>
+          <a:p>
+            <a:r>
+              <a:rPr lang="en-US" sz="1800" dirty="0">
+                <a:solidFill>
+                  <a:srgbClr val="000000"/>
+                </a:solidFill>
+                <a:latin typeface="Consolas" panose="020B0609020204030204" pitchFamily="49" charset="0"/>
+              </a:rPr>
+              <a:t>    </a:t>
+            </a:r>
+            <a:r>
+              <a:rPr lang="en-US" sz="1800" dirty="0">
+                <a:solidFill>
+                  <a:srgbClr val="008000"/>
+                </a:solidFill>
+                <a:latin typeface="Consolas" panose="020B0609020204030204" pitchFamily="49" charset="0"/>
+              </a:rPr>
+              <a:t>// Execute test</a:t>
+            </a:r>
+          </a:p>
+          <a:p>
+            <a:r>
+              <a:rPr lang="en-US" sz="1800" dirty="0">
+                <a:solidFill>
+                  <a:srgbClr val="000000"/>
+                </a:solidFill>
+                <a:latin typeface="Consolas" panose="020B0609020204030204" pitchFamily="49" charset="0"/>
+              </a:rPr>
+              <a:t>    </a:t>
+            </a:r>
+            <a:r>
+              <a:rPr lang="en-US" sz="1800" dirty="0">
+                <a:solidFill>
+                  <a:srgbClr val="008000"/>
+                </a:solidFill>
+                <a:latin typeface="Consolas" panose="020B0609020204030204" pitchFamily="49" charset="0"/>
+              </a:rPr>
+              <a:t>// ...</a:t>
+            </a:r>
+          </a:p>
+          <a:p>
+            <a:r>
+              <a:rPr lang="en-US" sz="1800" dirty="0">
+                <a:solidFill>
+                  <a:srgbClr val="000000"/>
+                </a:solidFill>
+                <a:latin typeface="Consolas" panose="020B0609020204030204" pitchFamily="49" charset="0"/>
+              </a:rPr>
+              <a:t>    </a:t>
+            </a:r>
+            <a:r>
+              <a:rPr lang="en-US" sz="1800" dirty="0" err="1">
+                <a:solidFill>
+                  <a:srgbClr val="000000"/>
+                </a:solidFill>
+                <a:latin typeface="Consolas" panose="020B0609020204030204" pitchFamily="49" charset="0"/>
+              </a:rPr>
+              <a:t>clock.Stop</a:t>
+            </a:r>
+            <a:r>
+              <a:rPr lang="en-US" sz="1800" dirty="0">
+                <a:solidFill>
+                  <a:srgbClr val="000000"/>
+                </a:solidFill>
+                <a:latin typeface="Consolas" panose="020B0609020204030204" pitchFamily="49" charset="0"/>
+              </a:rPr>
+              <a:t>();</a:t>
+            </a:r>
+          </a:p>
+          <a:p>
+            <a:r>
+              <a:rPr lang="en-US" sz="1800" dirty="0">
+                <a:solidFill>
+                  <a:srgbClr val="000000"/>
+                </a:solidFill>
+                <a:latin typeface="Consolas" panose="020B0609020204030204" pitchFamily="49" charset="0"/>
+              </a:rPr>
+              <a:t>    </a:t>
+            </a:r>
+            <a:r>
+              <a:rPr lang="en-US" sz="1800" dirty="0" err="1">
+                <a:solidFill>
+                  <a:srgbClr val="000000"/>
+                </a:solidFill>
+                <a:latin typeface="Consolas" panose="020B0609020204030204" pitchFamily="49" charset="0"/>
+              </a:rPr>
+              <a:t>executionTimes.Add</a:t>
+            </a:r>
+            <a:r>
+              <a:rPr lang="en-US" sz="1800" dirty="0">
+                <a:solidFill>
+                  <a:srgbClr val="000000"/>
+                </a:solidFill>
+                <a:latin typeface="Consolas" panose="020B0609020204030204" pitchFamily="49" charset="0"/>
+              </a:rPr>
+              <a:t>(</a:t>
+            </a:r>
+            <a:r>
+              <a:rPr lang="en-US" sz="1800" dirty="0" err="1">
+                <a:solidFill>
+                  <a:srgbClr val="000000"/>
+                </a:solidFill>
+                <a:latin typeface="Consolas" panose="020B0609020204030204" pitchFamily="49" charset="0"/>
+              </a:rPr>
+              <a:t>clock.Elapsed</a:t>
+            </a:r>
+            <a:r>
+              <a:rPr lang="en-US" sz="1800" dirty="0">
+                <a:solidFill>
+                  <a:srgbClr val="000000"/>
+                </a:solidFill>
+                <a:latin typeface="Consolas" panose="020B0609020204030204" pitchFamily="49" charset="0"/>
+              </a:rPr>
+              <a:t>);</a:t>
+            </a:r>
+          </a:p>
+          <a:p>
+            <a:r>
+              <a:rPr lang="en-US" sz="1800" dirty="0">
+                <a:solidFill>
+                  <a:srgbClr val="000000"/>
+                </a:solidFill>
+                <a:latin typeface="Consolas" panose="020B0609020204030204" pitchFamily="49" charset="0"/>
+              </a:rPr>
+              <a:t>}</a:t>
+            </a:r>
+          </a:p>
+          <a:p>
+            <a:r>
+              <a:rPr lang="en-US" sz="1800" dirty="0" err="1">
+                <a:solidFill>
+                  <a:srgbClr val="000000"/>
+                </a:solidFill>
+                <a:latin typeface="Consolas" panose="020B0609020204030204" pitchFamily="49" charset="0"/>
+              </a:rPr>
+              <a:t>executionTimes.RemoveMinAndMaxValues</a:t>
+            </a:r>
+            <a:r>
+              <a:rPr lang="en-US" sz="1800" dirty="0">
+                <a:solidFill>
+                  <a:srgbClr val="000000"/>
+                </a:solidFill>
+                <a:latin typeface="Consolas" panose="020B0609020204030204" pitchFamily="49" charset="0"/>
+              </a:rPr>
+              <a:t>();</a:t>
+            </a:r>
+          </a:p>
+          <a:p>
+            <a:r>
+              <a:rPr lang="en-US" sz="1800" dirty="0">
+                <a:solidFill>
+                  <a:srgbClr val="0000FF"/>
+                </a:solidFill>
+                <a:latin typeface="Consolas" panose="020B0609020204030204" pitchFamily="49" charset="0"/>
+              </a:rPr>
+              <a:t>double</a:t>
+            </a:r>
+            <a:r>
+              <a:rPr lang="en-US" sz="1800" dirty="0">
+                <a:solidFill>
+                  <a:srgbClr val="000000"/>
+                </a:solidFill>
+                <a:latin typeface="Consolas" panose="020B0609020204030204" pitchFamily="49" charset="0"/>
+              </a:rPr>
+              <a:t> </a:t>
+            </a:r>
+            <a:r>
+              <a:rPr lang="en-US" sz="1800" dirty="0" err="1">
+                <a:solidFill>
+                  <a:srgbClr val="000000"/>
+                </a:solidFill>
+                <a:latin typeface="Consolas" panose="020B0609020204030204" pitchFamily="49" charset="0"/>
+              </a:rPr>
+              <a:t>averageTimeInMilliseconds</a:t>
+            </a:r>
+            <a:r>
+              <a:rPr lang="en-US" sz="1800" dirty="0">
+                <a:solidFill>
+                  <a:srgbClr val="000000"/>
+                </a:solidFill>
+                <a:latin typeface="Consolas" panose="020B0609020204030204" pitchFamily="49" charset="0"/>
+              </a:rPr>
+              <a:t> = </a:t>
+            </a:r>
+            <a:r>
+              <a:rPr lang="en-US" sz="1800" dirty="0" err="1">
+                <a:solidFill>
+                  <a:srgbClr val="000000"/>
+                </a:solidFill>
+                <a:latin typeface="Consolas" panose="020B0609020204030204" pitchFamily="49" charset="0"/>
+              </a:rPr>
+              <a:t>executionTimes.Average</a:t>
+            </a:r>
+            <a:r>
+              <a:rPr lang="en-US" sz="1800" dirty="0">
+                <a:solidFill>
+                  <a:srgbClr val="000000"/>
+                </a:solidFill>
+                <a:latin typeface="Consolas" panose="020B0609020204030204" pitchFamily="49" charset="0"/>
+              </a:rPr>
+              <a:t>(t =&gt; </a:t>
+            </a:r>
+            <a:r>
+              <a:rPr lang="en-US" sz="1800" dirty="0" err="1">
+                <a:solidFill>
+                  <a:srgbClr val="000000"/>
+                </a:solidFill>
+                <a:latin typeface="Consolas" panose="020B0609020204030204" pitchFamily="49" charset="0"/>
+              </a:rPr>
+              <a:t>t.TotalMilliseconds</a:t>
+            </a:r>
+            <a:r>
+              <a:rPr lang="en-US" sz="1800" dirty="0">
+                <a:solidFill>
+                  <a:srgbClr val="000000"/>
+                </a:solidFill>
+                <a:latin typeface="Consolas" panose="020B0609020204030204" pitchFamily="49" charset="0"/>
+              </a:rPr>
+              <a:t>);</a:t>
+            </a:r>
+            <a:endParaRPr lang="en-US" sz="1800" dirty="0"/>
+          </a:p>
+        </p:txBody>
+      </p:sp>
+    </p:spTree>
+    <p:extLst>
+      <p:ext uri="{BB962C8B-B14F-4D97-AF65-F5344CB8AC3E}">
+        <p14:creationId xmlns:p14="http://schemas.microsoft.com/office/powerpoint/2010/main" val="109034233"/>
+      </p:ext>
+    </p:extLst>
+  </p:cSld>
+  <p:clrMapOvr>
+    <a:masterClrMapping/>
+  </p:clrMapOvr>
+</p:sld>
+</file>
+
+<file path=ppt/slides/slide6.xml><?xml version="1.0" encoding="utf-8"?>
+<p:sld xmlns:a="http://schemas.openxmlformats.org/drawingml/2006/main" xmlns:r="http://schemas.openxmlformats.org/officeDocument/2006/relationships" xmlns:p="http://schemas.openxmlformats.org/presentationml/2006/main">
+  <p:cSld>
+    <p:spTree>
+      <p:nvGrpSpPr>
+        <p:cNvPr id="1" name=""/>
+        <p:cNvGrpSpPr/>
+        <p:nvPr/>
+      </p:nvGrpSpPr>
+      <p:grpSpPr>
+        <a:xfrm>
+          <a:off x="0" y="0"/>
+          <a:ext cx="0" cy="0"/>
+          <a:chOff x="0" y="0"/>
+          <a:chExt cx="0" cy="0"/>
+        </a:xfrm>
+      </p:grpSpPr>
+      <p:sp>
+        <p:nvSpPr>
+          <p:cNvPr id="2" name="Title 1"/>
+          <p:cNvSpPr>
+            <a:spLocks noGrp="1"/>
+          </p:cNvSpPr>
+          <p:nvPr>
+            <p:ph type="title"/>
+          </p:nvPr>
+        </p:nvSpPr>
+        <p:spPr/>
+        <p:txBody>
+          <a:bodyPr/>
+          <a:lstStyle/>
+          <a:p>
+            <a:r>
+              <a:rPr lang="en-US" dirty="0"/>
               <a:t>Thank You</a:t>
             </a:r>
           </a:p>
@@ -3416,16 +3970,15 @@
               <a:t>This presentation and supporting materials can be found at </a:t>
             </a:r>
             <a:r>
-              <a:rPr lang="en-US" dirty="0" smtClean="0">
+              <a:rPr lang="en-US" dirty="0">
                 <a:hlinkClick r:id="rId2"/>
               </a:rPr>
               <a:t>www.tf3604.com/sets</a:t>
             </a:r>
             <a:r>
-              <a:rPr lang="en-US" dirty="0" smtClean="0"/>
+              <a:rPr lang="en-US" dirty="0"/>
               <a:t>.</a:t>
             </a:r>
-            <a:endParaRPr lang="en-US" dirty="0"/>
           </a:p>
           <a:p>
             <a:pPr lvl="1"/>

</xml_diff>

<commit_message>
About Me slide; emphasize background in development.
</commit_message>
<xml_diff>
--- a/HowToThinkInSets.pptx
+++ b/HowToThinkInSets.pptx
@@ -217,7 +217,7 @@
           <a:p>
             <a:fld id="{3CD51548-82AA-4A2B-B152-1D3266E0F652}" type="datetimeFigureOut">
               <a:rPr lang="en-US" smtClean="0"/>
-              <a:t>7/15/2017</a:t>
+              <a:t>7/22/2017</a:t>
             </a:fld>
             <a:endParaRPr lang="en-US"/>
           </a:p>
@@ -1676,7 +1676,7 @@
           <a:graphicData uri="http://schemas.openxmlformats.org/presentationml/2006/ole">
             <mc:AlternateContent xmlns:mc="http://schemas.openxmlformats.org/markup-compatibility/2006">
               <mc:Choice xmlns:v="urn:schemas-microsoft-com:vml" Requires="v">
-                <p:oleObj spid="_x0000_s1049" name="Image" r:id="rId10" imgW="2279520" imgH="1310400" progId="Photoshop.Image.18">
+                <p:oleObj spid="_x0000_s1051" name="Image" r:id="rId10" imgW="2279520" imgH="1310400" progId="Photoshop.Image.18">
                   <p:embed/>
                 </p:oleObj>
               </mc:Choice>
@@ -2183,8 +2183,8 @@
         </p:nvSpPr>
         <p:spPr>
           <a:xfrm>
-            <a:off x="1872139" y="1512041"/>
-            <a:ext cx="7776210" cy="1971338"/>
+            <a:off x="1872139" y="1365397"/>
+            <a:ext cx="7776210" cy="2117982"/>
           </a:xfrm>
           <a:prstGeom prst="rect">
             <a:avLst/>
@@ -2192,7 +2192,7 @@
         </p:spPr>
         <p:txBody>
           <a:bodyPr vert="horz" lIns="86402" tIns="43201" rIns="86402" bIns="43201" rtlCol="0">
-            <a:normAutofit/>
+            <a:normAutofit fontScale="92500" lnSpcReduction="10000"/>
           </a:bodyPr>
           <a:lstStyle>
             <a:lvl1pPr marL="342900" indent="-342900" algn="l" defTabSz="457200" rtl="0" eaLnBrk="1" latinLnBrk="0" hangingPunct="1">
@@ -2356,6 +2356,28 @@
             <a:r>
               <a:rPr lang="en-US" sz="2457" dirty="0"/>
               <a:t>Fascinated with SQL internals</a:t>
+            </a:r>
+          </a:p>
+          <a:p>
+            <a:r>
+              <a:rPr lang="en-US" sz="2857" dirty="0"/>
+              <a:t>Started as </a:t>
+            </a:r>
+            <a:r>
+              <a:rPr lang="en-US" sz="2857" b="1" dirty="0"/>
+              <a:t>developer</a:t>
+            </a:r>
+            <a:r>
+              <a:rPr lang="en-US" sz="2857" dirty="0"/>
+              <a:t>, still </a:t>
+            </a:r>
+            <a:r>
+              <a:rPr lang="en-US" sz="2857" i="1" dirty="0"/>
+              <a:t>trying</a:t>
+            </a:r>
+            <a:r>
+              <a:rPr lang="en-US" sz="2857" dirty="0"/>
+              <a:t> to keep up</a:t>
             </a:r>
           </a:p>
         </p:txBody>
@@ -2400,7 +2422,7 @@
         </p:blipFill>
         <p:spPr>
           <a:xfrm>
-            <a:off x="6391304" y="3499202"/>
+            <a:off x="6391304" y="3947780"/>
             <a:ext cx="2805790" cy="932385"/>
           </a:xfrm>
         </p:spPr>
@@ -2421,7 +2443,7 @@
         </p:blipFill>
         <p:spPr>
           <a:xfrm>
-            <a:off x="1872139" y="4077714"/>
+            <a:off x="1872139" y="4526292"/>
             <a:ext cx="378721" cy="307567"/>
           </a:xfrm>
           <a:prstGeom prst="rect">
@@ -2445,7 +2467,7 @@
         </p:blipFill>
         <p:spPr>
           <a:xfrm>
-            <a:off x="1872139" y="3494807"/>
+            <a:off x="1872139" y="3943385"/>
             <a:ext cx="378721" cy="378721"/>
           </a:xfrm>
           <a:prstGeom prst="rect">
@@ -2469,7 +2491,7 @@
         </p:blipFill>
         <p:spPr>
           <a:xfrm>
-            <a:off x="1872140" y="4543907"/>
+            <a:off x="1872140" y="4992485"/>
             <a:ext cx="2367147" cy="570650"/>
           </a:xfrm>
           <a:prstGeom prst="rect">
@@ -2487,7 +2509,7 @@
         </p:nvSpPr>
         <p:spPr>
           <a:xfrm>
-            <a:off x="2408162" y="3990003"/>
+            <a:off x="2408162" y="4438581"/>
             <a:ext cx="3662247" cy="426706"/>
           </a:xfrm>
           <a:prstGeom prst="rect">
@@ -2656,7 +2678,7 @@
         </p:nvSpPr>
         <p:spPr>
           <a:xfrm>
-            <a:off x="2408163" y="3532661"/>
+            <a:off x="2408163" y="3981239"/>
             <a:ext cx="3662247" cy="426706"/>
           </a:xfrm>
           <a:prstGeom prst="rect">
@@ -2825,7 +2847,7 @@
         </p:nvSpPr>
         <p:spPr>
           <a:xfrm>
-            <a:off x="6391304" y="4474498"/>
+            <a:off x="6391304" y="4923076"/>
             <a:ext cx="2996559" cy="426706"/>
           </a:xfrm>
           <a:prstGeom prst="rect">
@@ -2994,7 +3016,7 @@
         </p:nvSpPr>
         <p:spPr>
           <a:xfrm>
-            <a:off x="1440129" y="5186238"/>
+            <a:off x="1440129" y="5634816"/>
             <a:ext cx="8640232" cy="426706"/>
           </a:xfrm>
           <a:prstGeom prst="rect">

</xml_diff>

<commit_message>
Add drawings for SSIS demos.
</commit_message>
<xml_diff>
--- a/HowToThinkInSets.pptx
+++ b/HowToThinkInSets.pptx
@@ -5,7 +5,7 @@
     <p:sldMasterId id="2147483648" r:id="rId1"/>
   </p:sldMasterIdLst>
   <p:notesMasterIdLst>
-    <p:notesMasterId r:id="rId13"/>
+    <p:notesMasterId r:id="rId15"/>
   </p:notesMasterIdLst>
   <p:sldIdLst>
     <p:sldId id="263" r:id="rId2"/>
@@ -15,10 +15,12 @@
     <p:sldId id="273" r:id="rId6"/>
     <p:sldId id="272" r:id="rId7"/>
     <p:sldId id="274" r:id="rId8"/>
-    <p:sldId id="275" r:id="rId9"/>
-    <p:sldId id="277" r:id="rId10"/>
-    <p:sldId id="276" r:id="rId11"/>
-    <p:sldId id="267" r:id="rId12"/>
+    <p:sldId id="278" r:id="rId9"/>
+    <p:sldId id="279" r:id="rId10"/>
+    <p:sldId id="275" r:id="rId11"/>
+    <p:sldId id="277" r:id="rId12"/>
+    <p:sldId id="276" r:id="rId13"/>
+    <p:sldId id="267" r:id="rId14"/>
   </p:sldIdLst>
   <p:sldSz cx="11520488" cy="6480175"/>
   <p:notesSz cx="6858000" cy="9144000"/>
@@ -222,7 +224,7 @@
           <a:p>
             <a:fld id="{3CD51548-82AA-4A2B-B152-1D3266E0F652}" type="datetimeFigureOut">
               <a:rPr lang="en-US" smtClean="0"/>
-              <a:t>07/24/2017</a:t>
+              <a:t>07/25/2017</a:t>
             </a:fld>
             <a:endParaRPr lang="en-US"/>
           </a:p>
@@ -1607,7 +1609,7 @@
           <a:graphicData uri="http://schemas.openxmlformats.org/presentationml/2006/ole">
             <mc:AlternateContent xmlns:mc="http://schemas.openxmlformats.org/markup-compatibility/2006">
               <mc:Choice xmlns:v="urn:schemas-microsoft-com:vml" Requires="v">
-                <p:oleObj spid="_x0000_s1057" name="Image" r:id="rId10" imgW="2279520" imgH="1310400" progId="Photoshop.Image.18">
+                <p:oleObj spid="_x0000_s1060" name="Image" r:id="rId10" imgW="2279520" imgH="1310400" progId="Photoshop.Image.18">
                   <p:embed/>
                 </p:oleObj>
               </mc:Choice>
@@ -2029,7 +2031,7 @@
           <p:cNvPr id="4" name="TextBox 3">
             <a:extLst>
               <a:ext uri="{FF2B5EF4-FFF2-40B4-BE49-F238E27FC236}">
-                <a16:creationId xmlns:a16="http://schemas.microsoft.com/office/drawing/2014/main" xmlns="" id="{4E95CA58-BC71-4CE1-ACB0-4410970492E6}"/>
+                <a16:creationId xmlns="" xmlns:a16="http://schemas.microsoft.com/office/drawing/2014/main" id="{4E95CA58-BC71-4CE1-ACB0-4410970492E6}"/>
               </a:ext>
             </a:extLst>
           </p:cNvPr>
@@ -2124,12 +2126,8 @@
               <a:t>Key Take-</a:t>
             </a:r>
             <a:r>
-              <a:rPr lang="en-US" dirty="0" err="1"/>
-              <a:t>A</a:t>
-            </a:r>
-            <a:r>
               <a:rPr lang="en-US" dirty="0" err="1" smtClean="0"/>
-              <a:t>ways</a:t>
+              <a:t>Aways</a:t>
             </a:r>
             <a:endParaRPr lang="en-US" dirty="0"/>
           </a:p>
@@ -2156,6 +2154,291 @@
             </a:pPr>
             <a:r>
               <a:rPr lang="en-US" dirty="0" smtClean="0"/>
+              <a:t>Cursors are usually inefficient</a:t>
+            </a:r>
+          </a:p>
+          <a:p>
+            <a:pPr marL="1147527" lvl="1" indent="-571500">
+              <a:buFont typeface="Arial" panose="020B0604020202020204" pitchFamily="34" charset="0"/>
+              <a:buChar char="•"/>
+            </a:pPr>
+            <a:r>
+              <a:rPr lang="en-US" dirty="0" smtClean="0"/>
+              <a:t>If necessary, declare as </a:t>
+            </a:r>
+            <a:r>
+              <a:rPr lang="en-US" dirty="0" err="1">
+                <a:solidFill>
+                  <a:srgbClr val="0000FF"/>
+                </a:solidFill>
+                <a:highlight>
+                  <a:srgbClr val="FFFFFF"/>
+                </a:highlight>
+                <a:latin typeface="Consolas" panose="020B0609020204030204" pitchFamily="49" charset="0"/>
+              </a:rPr>
+              <a:t>fast_forward</a:t>
+            </a:r>
+            <a:r>
+              <a:rPr lang="en-US" dirty="0">
+                <a:solidFill>
+                  <a:srgbClr val="000000"/>
+                </a:solidFill>
+                <a:highlight>
+                  <a:srgbClr val="FFFFFF"/>
+                </a:highlight>
+                <a:latin typeface="Consolas" panose="020B0609020204030204" pitchFamily="49" charset="0"/>
+              </a:rPr>
+              <a:t> </a:t>
+            </a:r>
+            <a:r>
+              <a:rPr lang="en-US" dirty="0" err="1">
+                <a:solidFill>
+                  <a:srgbClr val="0000FF"/>
+                </a:solidFill>
+                <a:highlight>
+                  <a:srgbClr val="FFFFFF"/>
+                </a:highlight>
+                <a:latin typeface="Consolas" panose="020B0609020204030204" pitchFamily="49" charset="0"/>
+              </a:rPr>
+              <a:t>read_only</a:t>
+            </a:r>
+            <a:endParaRPr lang="en-US" dirty="0" smtClean="0"/>
+          </a:p>
+          <a:p>
+            <a:pPr marL="1147527" lvl="1" indent="-571500">
+              <a:buFont typeface="Arial" panose="020B0604020202020204" pitchFamily="34" charset="0"/>
+              <a:buChar char="•"/>
+            </a:pPr>
+            <a:r>
+              <a:rPr lang="en-US" dirty="0" smtClean="0"/>
+              <a:t>Still necessary for lots of admin functionality</a:t>
+            </a:r>
+          </a:p>
+          <a:p>
+            <a:pPr marL="1147527" lvl="1" indent="-571500">
+              <a:buFont typeface="Arial" panose="020B0604020202020204" pitchFamily="34" charset="0"/>
+              <a:buChar char="•"/>
+            </a:pPr>
+            <a:r>
+              <a:rPr lang="en-US" dirty="0" smtClean="0"/>
+              <a:t>Pre-2012, still best way to do running totals, etc.</a:t>
+            </a:r>
+          </a:p>
+          <a:p>
+            <a:pPr marL="571500" indent="-571500">
+              <a:buFont typeface="Arial" panose="020B0604020202020204" pitchFamily="34" charset="0"/>
+              <a:buChar char="•"/>
+            </a:pPr>
+            <a:r>
+              <a:rPr lang="en-US" dirty="0" smtClean="0"/>
+              <a:t>Triangle joins are pure evil</a:t>
+            </a:r>
+          </a:p>
+          <a:p>
+            <a:pPr marL="1147527" lvl="1" indent="-571500">
+              <a:buFont typeface="Arial" panose="020B0604020202020204" pitchFamily="34" charset="0"/>
+              <a:buChar char="•"/>
+            </a:pPr>
+            <a:endParaRPr lang="en-US" dirty="0"/>
+          </a:p>
+        </p:txBody>
+      </p:sp>
+    </p:spTree>
+    <p:extLst>
+      <p:ext uri="{BB962C8B-B14F-4D97-AF65-F5344CB8AC3E}">
+        <p14:creationId xmlns:p14="http://schemas.microsoft.com/office/powerpoint/2010/main" val="2597850043"/>
+      </p:ext>
+    </p:extLst>
+  </p:cSld>
+  <p:clrMapOvr>
+    <a:masterClrMapping/>
+  </p:clrMapOvr>
+</p:sld>
+</file>
+
+<file path=ppt/slides/slide11.xml><?xml version="1.0" encoding="utf-8"?>
+<p:sld xmlns:a="http://schemas.openxmlformats.org/drawingml/2006/main" xmlns:r="http://schemas.openxmlformats.org/officeDocument/2006/relationships" xmlns:p="http://schemas.openxmlformats.org/presentationml/2006/main">
+  <p:cSld>
+    <p:spTree>
+      <p:nvGrpSpPr>
+        <p:cNvPr id="1" name=""/>
+        <p:cNvGrpSpPr/>
+        <p:nvPr/>
+      </p:nvGrpSpPr>
+      <p:grpSpPr>
+        <a:xfrm>
+          <a:off x="0" y="0"/>
+          <a:ext cx="0" cy="0"/>
+          <a:chOff x="0" y="0"/>
+          <a:chExt cx="0" cy="0"/>
+        </a:xfrm>
+      </p:grpSpPr>
+      <p:sp>
+        <p:nvSpPr>
+          <p:cNvPr id="2" name="Title 1"/>
+          <p:cNvSpPr>
+            <a:spLocks noGrp="1"/>
+          </p:cNvSpPr>
+          <p:nvPr>
+            <p:ph type="title"/>
+          </p:nvPr>
+        </p:nvSpPr>
+        <p:spPr/>
+        <p:txBody>
+          <a:bodyPr/>
+          <a:lstStyle/>
+          <a:p>
+            <a:r>
+              <a:rPr lang="en-US" dirty="0" smtClean="0"/>
+              <a:t>Key Take-</a:t>
+            </a:r>
+            <a:r>
+              <a:rPr lang="en-US" dirty="0" err="1" smtClean="0"/>
+              <a:t>Aways</a:t>
+            </a:r>
+            <a:endParaRPr lang="en-US" dirty="0"/>
+          </a:p>
+        </p:txBody>
+      </p:sp>
+      <p:sp>
+        <p:nvSpPr>
+          <p:cNvPr id="3" name="Content Placeholder 2"/>
+          <p:cNvSpPr>
+            <a:spLocks noGrp="1"/>
+          </p:cNvSpPr>
+          <p:nvPr>
+            <p:ph idx="1"/>
+          </p:nvPr>
+        </p:nvSpPr>
+        <p:spPr/>
+        <p:txBody>
+          <a:bodyPr/>
+          <a:lstStyle/>
+          <a:p>
+            <a:pPr marL="571500" indent="-571500">
+              <a:buFont typeface="Arial" panose="020B0604020202020204" pitchFamily="34" charset="0"/>
+              <a:buChar char="•"/>
+            </a:pPr>
+            <a:r>
+              <a:rPr lang="en-US" dirty="0" smtClean="0"/>
+              <a:t>Avoid most UDFs</a:t>
+            </a:r>
+          </a:p>
+          <a:p>
+            <a:pPr marL="1147527" lvl="1" indent="-571500">
+              <a:buFont typeface="Arial" panose="020B0604020202020204" pitchFamily="34" charset="0"/>
+              <a:buChar char="•"/>
+            </a:pPr>
+            <a:r>
+              <a:rPr lang="en-US" dirty="0" smtClean="0"/>
+              <a:t>Scalar and multi-statement TVFs with data access tend to perform poorly</a:t>
+            </a:r>
+          </a:p>
+          <a:p>
+            <a:pPr marL="1147527" lvl="1" indent="-571500">
+              <a:buFont typeface="Arial" panose="020B0604020202020204" pitchFamily="34" charset="0"/>
+              <a:buChar char="•"/>
+            </a:pPr>
+            <a:r>
+              <a:rPr lang="en-US" dirty="0" smtClean="0"/>
+              <a:t>CLR with data access tends to perform poorly</a:t>
+            </a:r>
+          </a:p>
+          <a:p>
+            <a:pPr marL="571500" indent="-571500">
+              <a:buFont typeface="Arial" panose="020B0604020202020204" pitchFamily="34" charset="0"/>
+              <a:buChar char="•"/>
+            </a:pPr>
+            <a:r>
+              <a:rPr lang="en-US" dirty="0" smtClean="0"/>
+              <a:t>Inline TVFs are generally optimized well and tend to perform nicely</a:t>
+            </a:r>
+            <a:endParaRPr lang="en-US" dirty="0"/>
+          </a:p>
+        </p:txBody>
+      </p:sp>
+    </p:spTree>
+    <p:extLst>
+      <p:ext uri="{BB962C8B-B14F-4D97-AF65-F5344CB8AC3E}">
+        <p14:creationId xmlns:p14="http://schemas.microsoft.com/office/powerpoint/2010/main" val="3534619094"/>
+      </p:ext>
+    </p:extLst>
+  </p:cSld>
+  <p:clrMapOvr>
+    <a:masterClrMapping/>
+  </p:clrMapOvr>
+</p:sld>
+</file>
+
+<file path=ppt/slides/slide12.xml><?xml version="1.0" encoding="utf-8"?>
+<p:sld xmlns:a="http://schemas.openxmlformats.org/drawingml/2006/main" xmlns:r="http://schemas.openxmlformats.org/officeDocument/2006/relationships" xmlns:p="http://schemas.openxmlformats.org/presentationml/2006/main">
+  <p:cSld>
+    <p:spTree>
+      <p:nvGrpSpPr>
+        <p:cNvPr id="1" name=""/>
+        <p:cNvGrpSpPr/>
+        <p:nvPr/>
+      </p:nvGrpSpPr>
+      <p:grpSpPr>
+        <a:xfrm>
+          <a:off x="0" y="0"/>
+          <a:ext cx="0" cy="0"/>
+          <a:chOff x="0" y="0"/>
+          <a:chExt cx="0" cy="0"/>
+        </a:xfrm>
+      </p:grpSpPr>
+      <p:sp>
+        <p:nvSpPr>
+          <p:cNvPr id="2" name="Title 1"/>
+          <p:cNvSpPr>
+            <a:spLocks noGrp="1"/>
+          </p:cNvSpPr>
+          <p:nvPr>
+            <p:ph type="title"/>
+          </p:nvPr>
+        </p:nvSpPr>
+        <p:spPr/>
+        <p:txBody>
+          <a:bodyPr/>
+          <a:lstStyle/>
+          <a:p>
+            <a:r>
+              <a:rPr lang="en-US" dirty="0" smtClean="0"/>
+              <a:t>Key Take-</a:t>
+            </a:r>
+            <a:r>
+              <a:rPr lang="en-US" dirty="0" err="1"/>
+              <a:t>A</a:t>
+            </a:r>
+            <a:r>
+              <a:rPr lang="en-US" dirty="0" err="1" smtClean="0"/>
+              <a:t>ways</a:t>
+            </a:r>
+            <a:endParaRPr lang="en-US" dirty="0"/>
+          </a:p>
+        </p:txBody>
+      </p:sp>
+      <p:sp>
+        <p:nvSpPr>
+          <p:cNvPr id="3" name="Content Placeholder 2"/>
+          <p:cNvSpPr>
+            <a:spLocks noGrp="1"/>
+          </p:cNvSpPr>
+          <p:nvPr>
+            <p:ph idx="1"/>
+          </p:nvPr>
+        </p:nvSpPr>
+        <p:spPr/>
+        <p:txBody>
+          <a:bodyPr/>
+          <a:lstStyle/>
+          <a:p>
+            <a:pPr marL="571500" indent="-571500">
+              <a:buFont typeface="Arial" panose="020B0604020202020204" pitchFamily="34" charset="0"/>
+              <a:buChar char="•"/>
+            </a:pPr>
+            <a:r>
+              <a:rPr lang="en-US" dirty="0" smtClean="0"/>
               <a:t>Embrace </a:t>
             </a:r>
             <a:r>
@@ -2250,7 +2533,7 @@
 </p:sld>
 </file>
 
-<file path=ppt/slides/slide11.xml><?xml version="1.0" encoding="utf-8"?>
+<file path=ppt/slides/slide13.xml><?xml version="1.0" encoding="utf-8"?>
 <p:sld xmlns:a="http://schemas.openxmlformats.org/drawingml/2006/main" xmlns:r="http://schemas.openxmlformats.org/officeDocument/2006/relationships" xmlns:p="http://schemas.openxmlformats.org/presentationml/2006/main">
   <p:cSld>
     <p:spTree>
@@ -3557,7 +3840,7 @@
           <p:cNvPr id="5" name="Content Placeholder 4">
             <a:extLst>
               <a:ext uri="{FF2B5EF4-FFF2-40B4-BE49-F238E27FC236}">
-                <a16:creationId xmlns:a16="http://schemas.microsoft.com/office/drawing/2014/main" xmlns="" id="{EA577935-A7F7-4DF4-95F2-8BF0108D9ACF}"/>
+                <a16:creationId xmlns="" xmlns:a16="http://schemas.microsoft.com/office/drawing/2014/main" id="{EA577935-A7F7-4DF4-95F2-8BF0108D9ACF}"/>
               </a:ext>
             </a:extLst>
           </p:cNvPr>
@@ -4637,7 +4920,7 @@
           <p:cNvPr id="5" name="Content Placeholder 4">
             <a:extLst>
               <a:ext uri="{FF2B5EF4-FFF2-40B4-BE49-F238E27FC236}">
-                <a16:creationId xmlns:a16="http://schemas.microsoft.com/office/drawing/2014/main" xmlns="" id="{EA577935-A7F7-4DF4-95F2-8BF0108D9ACF}"/>
+                <a16:creationId xmlns="" xmlns:a16="http://schemas.microsoft.com/office/drawing/2014/main" id="{EA577935-A7F7-4DF4-95F2-8BF0108D9ACF}"/>
               </a:ext>
             </a:extLst>
           </p:cNvPr>
@@ -6729,7 +7012,7 @@
           <p:cNvPr id="5" name="Content Placeholder 4">
             <a:extLst>
               <a:ext uri="{FF2B5EF4-FFF2-40B4-BE49-F238E27FC236}">
-                <a16:creationId xmlns:a16="http://schemas.microsoft.com/office/drawing/2014/main" xmlns="" id="{EA577935-A7F7-4DF4-95F2-8BF0108D9ACF}"/>
+                <a16:creationId xmlns="" xmlns:a16="http://schemas.microsoft.com/office/drawing/2014/main" id="{EA577935-A7F7-4DF4-95F2-8BF0108D9ACF}"/>
               </a:ext>
             </a:extLst>
           </p:cNvPr>
@@ -7760,130 +8043,40 @@
           <a:p>
             <a:r>
               <a:rPr lang="en-US" dirty="0" smtClean="0"/>
-              <a:t>Key Take-</a:t>
-            </a:r>
-            <a:r>
-              <a:rPr lang="en-US" dirty="0" err="1" smtClean="0"/>
-              <a:t>Aways</a:t>
+              <a:t>SSIS: Command Component</a:t>
             </a:r>
             <a:endParaRPr lang="en-US" dirty="0"/>
           </a:p>
         </p:txBody>
       </p:sp>
-      <p:sp>
-        <p:nvSpPr>
-          <p:cNvPr id="3" name="Content Placeholder 2"/>
-          <p:cNvSpPr>
-            <a:spLocks noGrp="1"/>
-          </p:cNvSpPr>
-          <p:nvPr>
-            <p:ph idx="1"/>
-          </p:nvPr>
-        </p:nvSpPr>
-        <p:spPr/>
-        <p:txBody>
-          <a:bodyPr/>
-          <a:lstStyle/>
-          <a:p>
-            <a:pPr marL="571500" indent="-571500">
-              <a:buFont typeface="Arial" panose="020B0604020202020204" pitchFamily="34" charset="0"/>
-              <a:buChar char="•"/>
-            </a:pPr>
-            <a:r>
-              <a:rPr lang="en-US" dirty="0" smtClean="0"/>
-              <a:t>Cursors are usually inefficient</a:t>
-            </a:r>
-          </a:p>
-          <a:p>
-            <a:pPr marL="1147527" lvl="1" indent="-571500">
-              <a:buFont typeface="Arial" panose="020B0604020202020204" pitchFamily="34" charset="0"/>
-              <a:buChar char="•"/>
-            </a:pPr>
-            <a:r>
-              <a:rPr lang="en-US" dirty="0" smtClean="0"/>
-              <a:t>If necessary, declare as </a:t>
-            </a:r>
-            <a:r>
-              <a:rPr lang="en-US" dirty="0" err="1">
-                <a:solidFill>
-                  <a:srgbClr val="0000FF"/>
-                </a:solidFill>
-                <a:highlight>
-                  <a:srgbClr val="FFFFFF"/>
-                </a:highlight>
-                <a:latin typeface="Consolas" panose="020B0609020204030204" pitchFamily="49" charset="0"/>
-              </a:rPr>
-              <a:t>fast_forward</a:t>
-            </a:r>
-            <a:r>
-              <a:rPr lang="en-US" dirty="0">
-                <a:solidFill>
-                  <a:srgbClr val="000000"/>
-                </a:solidFill>
-                <a:highlight>
-                  <a:srgbClr val="FFFFFF"/>
-                </a:highlight>
-                <a:latin typeface="Consolas" panose="020B0609020204030204" pitchFamily="49" charset="0"/>
-              </a:rPr>
-              <a:t> </a:t>
-            </a:r>
-            <a:r>
-              <a:rPr lang="en-US" dirty="0" err="1">
-                <a:solidFill>
-                  <a:srgbClr val="0000FF"/>
-                </a:solidFill>
-                <a:highlight>
-                  <a:srgbClr val="FFFFFF"/>
-                </a:highlight>
-                <a:latin typeface="Consolas" panose="020B0609020204030204" pitchFamily="49" charset="0"/>
-              </a:rPr>
-              <a:t>read_only</a:t>
-            </a:r>
-            <a:endParaRPr lang="en-US" dirty="0" smtClean="0"/>
-          </a:p>
-          <a:p>
-            <a:pPr marL="1147527" lvl="1" indent="-571500">
-              <a:buFont typeface="Arial" panose="020B0604020202020204" pitchFamily="34" charset="0"/>
-              <a:buChar char="•"/>
-            </a:pPr>
-            <a:r>
-              <a:rPr lang="en-US" dirty="0" smtClean="0"/>
-              <a:t>Still necessary for lots of admin functionality</a:t>
-            </a:r>
-          </a:p>
-          <a:p>
-            <a:pPr marL="1147527" lvl="1" indent="-571500">
-              <a:buFont typeface="Arial" panose="020B0604020202020204" pitchFamily="34" charset="0"/>
-              <a:buChar char="•"/>
-            </a:pPr>
-            <a:r>
-              <a:rPr lang="en-US" dirty="0" smtClean="0"/>
-              <a:t>Pre-2012, still best way to do running totals, etc.</a:t>
-            </a:r>
-          </a:p>
-          <a:p>
-            <a:pPr marL="571500" indent="-571500">
-              <a:buFont typeface="Arial" panose="020B0604020202020204" pitchFamily="34" charset="0"/>
-              <a:buChar char="•"/>
-            </a:pPr>
-            <a:r>
-              <a:rPr lang="en-US" dirty="0" smtClean="0"/>
-              <a:t>Triangle joins are pure evil</a:t>
-            </a:r>
-          </a:p>
-          <a:p>
-            <a:pPr marL="1147527" lvl="1" indent="-571500">
-              <a:buFont typeface="Arial" panose="020B0604020202020204" pitchFamily="34" charset="0"/>
-              <a:buChar char="•"/>
-            </a:pPr>
-            <a:endParaRPr lang="en-US" dirty="0"/>
-          </a:p>
-        </p:txBody>
-      </p:sp>
+      <p:pic>
+        <p:nvPicPr>
+          <p:cNvPr id="4" name="Picture 3"/>
+          <p:cNvPicPr>
+            <a:picLocks noChangeAspect="1"/>
+          </p:cNvPicPr>
+          <p:nvPr/>
+        </p:nvPicPr>
+        <p:blipFill>
+          <a:blip r:embed="rId2"/>
+          <a:stretch>
+            <a:fillRect/>
+          </a:stretch>
+        </p:blipFill>
+        <p:spPr>
+          <a:xfrm>
+            <a:off x="2403302" y="1388705"/>
+            <a:ext cx="6715471" cy="4256219"/>
+          </a:xfrm>
+          <a:prstGeom prst="rect">
+            <a:avLst/>
+          </a:prstGeom>
+        </p:spPr>
+      </p:pic>
     </p:spTree>
     <p:extLst>
       <p:ext uri="{BB962C8B-B14F-4D97-AF65-F5344CB8AC3E}">
-        <p14:creationId xmlns:p14="http://schemas.microsoft.com/office/powerpoint/2010/main" val="2597850043"/>
+        <p14:creationId xmlns:p14="http://schemas.microsoft.com/office/powerpoint/2010/main" val="3954811871"/>
       </p:ext>
     </p:extLst>
   </p:cSld>
@@ -7927,77 +8120,40 @@
           <a:p>
             <a:r>
               <a:rPr lang="en-US" dirty="0" smtClean="0"/>
-              <a:t>Key Take-</a:t>
-            </a:r>
-            <a:r>
-              <a:rPr lang="en-US" dirty="0" err="1" smtClean="0"/>
-              <a:t>Aways</a:t>
+              <a:t>SSIS: Staging Table</a:t>
             </a:r>
             <a:endParaRPr lang="en-US" dirty="0"/>
           </a:p>
         </p:txBody>
       </p:sp>
-      <p:sp>
-        <p:nvSpPr>
-          <p:cNvPr id="3" name="Content Placeholder 2"/>
-          <p:cNvSpPr>
-            <a:spLocks noGrp="1"/>
-          </p:cNvSpPr>
-          <p:nvPr>
-            <p:ph idx="1"/>
-          </p:nvPr>
-        </p:nvSpPr>
-        <p:spPr/>
-        <p:txBody>
-          <a:bodyPr/>
-          <a:lstStyle/>
-          <a:p>
-            <a:pPr marL="571500" indent="-571500">
-              <a:buFont typeface="Arial" panose="020B0604020202020204" pitchFamily="34" charset="0"/>
-              <a:buChar char="•"/>
-            </a:pPr>
-            <a:r>
-              <a:rPr lang="en-US" dirty="0" smtClean="0"/>
-              <a:t>Avoid most UDFs</a:t>
-            </a:r>
-          </a:p>
-          <a:p>
-            <a:pPr marL="1147527" lvl="1" indent="-571500">
-              <a:buFont typeface="Arial" panose="020B0604020202020204" pitchFamily="34" charset="0"/>
-              <a:buChar char="•"/>
-            </a:pPr>
-            <a:r>
-              <a:rPr lang="en-US" dirty="0" smtClean="0"/>
-              <a:t>Scalar and multi-statement TVFs with data access tend to perform poorly</a:t>
-            </a:r>
-          </a:p>
-          <a:p>
-            <a:pPr marL="1147527" lvl="1" indent="-571500">
-              <a:buFont typeface="Arial" panose="020B0604020202020204" pitchFamily="34" charset="0"/>
-              <a:buChar char="•"/>
-            </a:pPr>
-            <a:r>
-              <a:rPr lang="en-US" dirty="0" smtClean="0"/>
-              <a:t>CLR with data access tends to perform poorly</a:t>
-            </a:r>
-          </a:p>
-          <a:p>
-            <a:pPr marL="571500" indent="-571500">
-              <a:buFont typeface="Arial" panose="020B0604020202020204" pitchFamily="34" charset="0"/>
-              <a:buChar char="•"/>
-            </a:pPr>
-            <a:r>
-              <a:rPr lang="en-US" dirty="0" smtClean="0"/>
-              <a:t>Inline TVFs are generally optimized well and tend to perform nicely</a:t>
-            </a:r>
-            <a:endParaRPr lang="en-US" dirty="0"/>
-          </a:p>
-        </p:txBody>
-      </p:sp>
+      <p:pic>
+        <p:nvPicPr>
+          <p:cNvPr id="3" name="Picture 2"/>
+          <p:cNvPicPr>
+            <a:picLocks noChangeAspect="1"/>
+          </p:cNvPicPr>
+          <p:nvPr/>
+        </p:nvPicPr>
+        <p:blipFill>
+          <a:blip r:embed="rId2"/>
+          <a:stretch>
+            <a:fillRect/>
+          </a:stretch>
+        </p:blipFill>
+        <p:spPr>
+          <a:xfrm>
+            <a:off x="1022730" y="1080363"/>
+            <a:ext cx="9476615" cy="5104732"/>
+          </a:xfrm>
+          <a:prstGeom prst="rect">
+            <a:avLst/>
+          </a:prstGeom>
+        </p:spPr>
+      </p:pic>
     </p:spTree>
     <p:extLst>
       <p:ext uri="{BB962C8B-B14F-4D97-AF65-F5344CB8AC3E}">
-        <p14:creationId xmlns:p14="http://schemas.microsoft.com/office/powerpoint/2010/main" val="3534619094"/>
+        <p14:creationId xmlns:p14="http://schemas.microsoft.com/office/powerpoint/2010/main" val="2702876676"/>
       </p:ext>
     </p:extLst>
   </p:cSld>

</xml_diff>

<commit_message>
Add RBAR drawings to slide deck.
</commit_message>
<xml_diff>
--- a/HowToThinkInSets.pptx
+++ b/HowToThinkInSets.pptx
@@ -239,7 +239,7 @@
           <a:p>
             <a:fld id="{3CD51548-82AA-4A2B-B152-1D3266E0F652}" type="datetimeFigureOut">
               <a:rPr lang="en-US" smtClean="0"/>
-              <a:t>07/26/2017</a:t>
+              <a:t>7/26/2017</a:t>
             </a:fld>
             <a:endParaRPr lang="en-US"/>
           </a:p>
@@ -635,79 +635,79 @@
           <a:lstStyle/>
           <a:p>
             <a:r>
-              <a:rPr lang="en-US" dirty="0" smtClean="0"/>
+              <a:rPr lang="en-US" dirty="0"/>
               <a:t>Wikipedia: Mathematical topics typically emerge and evolve through interactions among many researchers. Set theory, however, was founded by a single paper in 1874 by [German Mathematician] </a:t>
             </a:r>
             <a:r>
-              <a:rPr lang="en-US" b="1" dirty="0" smtClean="0"/>
+              <a:rPr lang="en-US" b="1" dirty="0"/>
               <a:t>Georg Cantor</a:t>
             </a:r>
             <a:r>
-              <a:rPr lang="en-US" dirty="0" smtClean="0"/>
+              <a:rPr lang="en-US" dirty="0"/>
               <a:t>: "On a Property of the Collection of All Real Algebraic Numbers“</a:t>
             </a:r>
             <a:r>
-              <a:rPr lang="en-US" baseline="0" dirty="0" smtClean="0"/>
+              <a:rPr lang="en-US" baseline="0" dirty="0"/>
               <a:t> (https://en.wikipedia.org/wiki/Set_theory)</a:t>
             </a:r>
           </a:p>
           <a:p>
-            <a:endParaRPr lang="en-US" baseline="0" dirty="0" smtClean="0"/>
-          </a:p>
-          <a:p>
-            <a:r>
-              <a:rPr lang="en-US" dirty="0" smtClean="0"/>
+            <a:endParaRPr lang="en-US" baseline="0" dirty="0"/>
+          </a:p>
+          <a:p>
+            <a:r>
+              <a:rPr lang="en-US" dirty="0"/>
               <a:t>Wikipedia: Relational algebra, first created by Edgar F. </a:t>
             </a:r>
             <a:r>
-              <a:rPr lang="en-US" dirty="0" err="1" smtClean="0"/>
+              <a:rPr lang="en-US" dirty="0" err="1"/>
               <a:t>Codd</a:t>
             </a:r>
             <a:r>
-              <a:rPr lang="en-US" dirty="0" smtClean="0"/>
+              <a:rPr lang="en-US" dirty="0"/>
               <a:t> while at IBM, is a family of algebras with a well-founded semantics used for modelling the data stored in relational databases, and defining queries on it. Relational algebra received little attention outside of pure mathematics until the publication of E.F. </a:t>
             </a:r>
             <a:r>
-              <a:rPr lang="en-US" dirty="0" err="1" smtClean="0"/>
+              <a:rPr lang="en-US" dirty="0" err="1"/>
               <a:t>Codd's</a:t>
             </a:r>
             <a:r>
-              <a:rPr lang="en-US" dirty="0" smtClean="0"/>
+              <a:rPr lang="en-US" dirty="0"/>
               <a:t> relational model of data in 1970. (https://en.wikipedia.org/wiki/Relational_algebra)</a:t>
             </a:r>
           </a:p>
           <a:p>
-            <a:endParaRPr lang="en-US" dirty="0" smtClean="0"/>
-          </a:p>
-          <a:p>
-            <a:r>
-              <a:rPr lang="en-US" dirty="0" smtClean="0"/>
+            <a:endParaRPr lang="en-US" dirty="0"/>
+          </a:p>
+          <a:p>
+            <a:r>
+              <a:rPr lang="en-US" dirty="0"/>
               <a:t>Relational algebra</a:t>
             </a:r>
             <a:r>
-              <a:rPr lang="en-US" baseline="0" dirty="0" smtClean="0"/>
+              <a:rPr lang="en-US" baseline="0" dirty="0"/>
               <a:t> is also based on the mathematical study of predicate logic.</a:t>
             </a:r>
           </a:p>
           <a:p>
-            <a:endParaRPr lang="en-US" baseline="0" dirty="0" smtClean="0"/>
-          </a:p>
-          <a:p>
-            <a:r>
-              <a:rPr lang="en-US" baseline="0" dirty="0" smtClean="0"/>
+            <a:endParaRPr lang="en-US" baseline="0" dirty="0"/>
+          </a:p>
+          <a:p>
+            <a:r>
+              <a:rPr lang="en-US" baseline="0" dirty="0"/>
               <a:t>Technically a “set” is distinct; a “bag” can contain duplicate, so that better describes what we commonly think of as a set in SQL Server.</a:t>
             </a:r>
           </a:p>
           <a:p>
-            <a:endParaRPr lang="en-US" baseline="0" dirty="0" smtClean="0"/>
-          </a:p>
-          <a:p>
-            <a:r>
-              <a:rPr lang="en-US" baseline="0" dirty="0" smtClean="0"/>
+            <a:endParaRPr lang="en-US" baseline="0" dirty="0"/>
+          </a:p>
+          <a:p>
+            <a:r>
+              <a:rPr lang="en-US" baseline="0" dirty="0"/>
               <a:t>Sets </a:t>
             </a:r>
             <a:r>
-              <a:rPr lang="en-US" baseline="0" smtClean="0"/>
+              <a:rPr lang="en-US" baseline="0"/>
               <a:t>are unordered.</a:t>
             </a:r>
             <a:endParaRPr lang="en-US" dirty="0"/>
@@ -2306,7 +2306,7 @@
           <a:graphicData uri="http://schemas.openxmlformats.org/presentationml/2006/ole">
             <mc:AlternateContent xmlns:mc="http://schemas.openxmlformats.org/markup-compatibility/2006">
               <mc:Choice xmlns:v="urn:schemas-microsoft-com:vml" Requires="v">
-                <p:oleObj spid="_x0000_s1071" name="Image" r:id="rId10" imgW="2279520" imgH="1310400" progId="Photoshop.Image.18">
+                <p:oleObj spid="_x0000_s1076" name="Image" r:id="rId10" imgW="2279520" imgH="1310400" progId="Photoshop.Image.18">
                   <p:embed/>
                 </p:oleObj>
               </mc:Choice>
@@ -2728,7 +2728,7 @@
           <p:cNvPr id="4" name="TextBox 3">
             <a:extLst>
               <a:ext uri="{FF2B5EF4-FFF2-40B4-BE49-F238E27FC236}">
-                <a16:creationId xmlns:a16="http://schemas.microsoft.com/office/drawing/2014/main" xmlns="" id="{4E95CA58-BC71-4CE1-ACB0-4410970492E6}"/>
+                <a16:creationId xmlns:a16="http://schemas.microsoft.com/office/drawing/2014/main" id="{4E95CA58-BC71-4CE1-ACB0-4410970492E6}"/>
               </a:ext>
             </a:extLst>
           </p:cNvPr>
@@ -2783,13 +2783,6 @@
   <p:clrMapOvr>
     <a:masterClrMapping/>
   </p:clrMapOvr>
-  <p:timing>
-    <p:tnLst>
-      <p:par>
-        <p:cTn id="1" dur="indefinite" restart="never" nodeType="tmRoot"/>
-      </p:par>
-    </p:tnLst>
-  </p:timing>
 </p:sld>
 </file>
 
@@ -2815,7 +2808,7 @@
           <p:cNvPr id="2" name="Title 1">
             <a:extLst>
               <a:ext uri="{FF2B5EF4-FFF2-40B4-BE49-F238E27FC236}">
-                <a16:creationId xmlns:a16="http://schemas.microsoft.com/office/drawing/2014/main" xmlns="" id="{FEF5F440-7918-4A6B-9C7C-C25F5B4AB5DD}"/>
+                <a16:creationId xmlns:a16="http://schemas.microsoft.com/office/drawing/2014/main" id="{FEF5F440-7918-4A6B-9C7C-C25F5B4AB5DD}"/>
               </a:ext>
             </a:extLst>
           </p:cNvPr>
@@ -2843,7 +2836,7 @@
           <p:cNvPr id="3" name="Content Placeholder 2">
             <a:extLst>
               <a:ext uri="{FF2B5EF4-FFF2-40B4-BE49-F238E27FC236}">
-                <a16:creationId xmlns:a16="http://schemas.microsoft.com/office/drawing/2014/main" xmlns="" id="{9E20F2C1-4D76-4D3B-8502-4FA0575D48CD}"/>
+                <a16:creationId xmlns:a16="http://schemas.microsoft.com/office/drawing/2014/main" id="{9E20F2C1-4D76-4D3B-8502-4FA0575D48CD}"/>
               </a:ext>
             </a:extLst>
           </p:cNvPr>
@@ -2860,10 +2853,9 @@
           <a:lstStyle/>
           <a:p>
             <a:r>
-              <a:rPr lang="en-US" dirty="0" smtClean="0"/>
+              <a:rPr lang="en-US" dirty="0"/>
               <a:t>Cursors and Loops</a:t>
             </a:r>
-            <a:endParaRPr lang="en-US" dirty="0"/>
           </a:p>
         </p:txBody>
       </p:sp>
@@ -2872,7 +2864,7 @@
           <p:cNvPr id="4" name="Picture 3">
             <a:extLst>
               <a:ext uri="{FF2B5EF4-FFF2-40B4-BE49-F238E27FC236}">
-                <a16:creationId xmlns:a16="http://schemas.microsoft.com/office/drawing/2014/main" xmlns="" id="{91F19CE3-C79C-4B4E-9DFB-953E12007E9A}"/>
+                <a16:creationId xmlns:a16="http://schemas.microsoft.com/office/drawing/2014/main" id="{91F19CE3-C79C-4B4E-9DFB-953E12007E9A}"/>
               </a:ext>
             </a:extLst>
           </p:cNvPr>
@@ -2907,13 +2899,6 @@
   <p:clrMapOvr>
     <a:masterClrMapping/>
   </p:clrMapOvr>
-  <p:timing>
-    <p:tnLst>
-      <p:par>
-        <p:cTn id="1" dur="indefinite" restart="never" nodeType="tmRoot"/>
-      </p:par>
-    </p:tnLst>
-  </p:timing>
 </p:sld>
 </file>
 
@@ -2950,10 +2935,9 @@
           <a:lstStyle/>
           <a:p>
             <a:r>
-              <a:rPr lang="en-US" dirty="0" smtClean="0"/>
+              <a:rPr lang="en-US" dirty="0"/>
               <a:t>Subqueries</a:t>
             </a:r>
-            <a:endParaRPr lang="en-US" dirty="0"/>
           </a:p>
         </p:txBody>
       </p:sp>
@@ -3715,7 +3699,7 @@
               <a:t> oh</a:t>
             </a:r>
             <a:r>
-              <a:rPr lang="en-US" sz="2000" dirty="0" smtClean="0">
+              <a:rPr lang="en-US" sz="2000" dirty="0">
                 <a:solidFill>
                   <a:srgbClr val="808080"/>
                 </a:solidFill>
@@ -4701,13 +4685,6 @@
   <p:clrMapOvr>
     <a:masterClrMapping/>
   </p:clrMapOvr>
-  <p:timing>
-    <p:tnLst>
-      <p:par>
-        <p:cTn id="1" dur="indefinite" restart="never" nodeType="tmRoot"/>
-      </p:par>
-    </p:tnLst>
-  </p:timing>
 </p:sld>
 </file>
 
@@ -4733,7 +4710,7 @@
           <p:cNvPr id="2" name="Title 1">
             <a:extLst>
               <a:ext uri="{FF2B5EF4-FFF2-40B4-BE49-F238E27FC236}">
-                <a16:creationId xmlns:a16="http://schemas.microsoft.com/office/drawing/2014/main" xmlns="" id="{FEF5F440-7918-4A6B-9C7C-C25F5B4AB5DD}"/>
+                <a16:creationId xmlns:a16="http://schemas.microsoft.com/office/drawing/2014/main" id="{FEF5F440-7918-4A6B-9C7C-C25F5B4AB5DD}"/>
               </a:ext>
             </a:extLst>
           </p:cNvPr>
@@ -4761,7 +4738,7 @@
           <p:cNvPr id="3" name="Content Placeholder 2">
             <a:extLst>
               <a:ext uri="{FF2B5EF4-FFF2-40B4-BE49-F238E27FC236}">
-                <a16:creationId xmlns:a16="http://schemas.microsoft.com/office/drawing/2014/main" xmlns="" id="{9E20F2C1-4D76-4D3B-8502-4FA0575D48CD}"/>
+                <a16:creationId xmlns:a16="http://schemas.microsoft.com/office/drawing/2014/main" id="{9E20F2C1-4D76-4D3B-8502-4FA0575D48CD}"/>
               </a:ext>
             </a:extLst>
           </p:cNvPr>
@@ -4778,10 +4755,9 @@
           <a:lstStyle/>
           <a:p>
             <a:r>
-              <a:rPr lang="en-US" dirty="0" smtClean="0"/>
+              <a:rPr lang="en-US" dirty="0"/>
               <a:t>Subqueries</a:t>
             </a:r>
-            <a:endParaRPr lang="en-US" dirty="0"/>
           </a:p>
         </p:txBody>
       </p:sp>
@@ -4790,7 +4766,7 @@
           <p:cNvPr id="4" name="Picture 3">
             <a:extLst>
               <a:ext uri="{FF2B5EF4-FFF2-40B4-BE49-F238E27FC236}">
-                <a16:creationId xmlns:a16="http://schemas.microsoft.com/office/drawing/2014/main" xmlns="" id="{91F19CE3-C79C-4B4E-9DFB-953E12007E9A}"/>
+                <a16:creationId xmlns:a16="http://schemas.microsoft.com/office/drawing/2014/main" id="{91F19CE3-C79C-4B4E-9DFB-953E12007E9A}"/>
               </a:ext>
             </a:extLst>
           </p:cNvPr>
@@ -4825,13 +4801,6 @@
   <p:clrMapOvr>
     <a:masterClrMapping/>
   </p:clrMapOvr>
-  <p:timing>
-    <p:tnLst>
-      <p:par>
-        <p:cTn id="1" dur="indefinite" restart="never" nodeType="tmRoot"/>
-      </p:par>
-    </p:tnLst>
-  </p:timing>
 </p:sld>
 </file>
 
@@ -4868,10 +4837,9 @@
           <a:lstStyle/>
           <a:p>
             <a:r>
-              <a:rPr lang="en-US" dirty="0" smtClean="0"/>
+              <a:rPr lang="en-US" dirty="0"/>
               <a:t>User-Defined Functions (UDFs)</a:t>
             </a:r>
-            <a:endParaRPr lang="en-US" dirty="0"/>
           </a:p>
         </p:txBody>
       </p:sp>
@@ -4897,7 +4865,7 @@
               <a:buChar char="•"/>
             </a:pPr>
             <a:r>
-              <a:rPr lang="en-US" dirty="0" smtClean="0"/>
+              <a:rPr lang="en-US" dirty="0"/>
               <a:t>Scalar</a:t>
             </a:r>
           </a:p>
@@ -4907,7 +4875,7 @@
               <a:buChar char="•"/>
             </a:pPr>
             <a:r>
-              <a:rPr lang="en-US" dirty="0" smtClean="0"/>
+              <a:rPr lang="en-US" dirty="0"/>
               <a:t>Returns single value of any data type</a:t>
             </a:r>
           </a:p>
@@ -4917,7 +4885,7 @@
               <a:buChar char="•"/>
             </a:pPr>
             <a:r>
-              <a:rPr lang="en-US" dirty="0" smtClean="0"/>
+              <a:rPr lang="en-US" dirty="0"/>
               <a:t>Call as </a:t>
             </a:r>
             <a:r>
@@ -5040,7 +5008,7 @@
               </a:rPr>
               <a:t>)</a:t>
             </a:r>
-            <a:endParaRPr lang="en-US" sz="2000" dirty="0" smtClean="0"/>
+            <a:endParaRPr lang="en-US" sz="2000" dirty="0"/>
           </a:p>
           <a:p>
             <a:pPr marL="571500" indent="-571500">
@@ -5048,7 +5016,7 @@
               <a:buChar char="•"/>
             </a:pPr>
             <a:r>
-              <a:rPr lang="en-US" dirty="0" smtClean="0"/>
+              <a:rPr lang="en-US" dirty="0"/>
               <a:t>Multi-Statement Table-Valued *</a:t>
             </a:r>
           </a:p>
@@ -5058,7 +5026,7 @@
               <a:buChar char="•"/>
             </a:pPr>
             <a:r>
-              <a:rPr lang="en-US" dirty="0" smtClean="0"/>
+              <a:rPr lang="en-US" dirty="0"/>
               <a:t>Returns table variable populated by function code</a:t>
             </a:r>
           </a:p>
@@ -5068,7 +5036,7 @@
               <a:buChar char="•"/>
             </a:pPr>
             <a:r>
-              <a:rPr lang="en-US" dirty="0" smtClean="0"/>
+              <a:rPr lang="en-US" dirty="0"/>
               <a:t>Call as </a:t>
             </a:r>
             <a:r>
@@ -5251,7 +5219,7 @@
               </a:rPr>
               <a:t>)</a:t>
             </a:r>
-            <a:endParaRPr lang="en-US" sz="2000" dirty="0" smtClean="0"/>
+            <a:endParaRPr lang="en-US" sz="2000" dirty="0"/>
           </a:p>
           <a:p>
             <a:pPr marL="571500" indent="-571500">
@@ -5259,10 +5227,9 @@
               <a:buChar char="•"/>
             </a:pPr>
             <a:r>
-              <a:rPr lang="en-US" dirty="0" smtClean="0"/>
+              <a:rPr lang="en-US" dirty="0"/>
               <a:t>Inline Table-Valued: single select statement</a:t>
             </a:r>
-            <a:endParaRPr lang="en-US" dirty="0"/>
           </a:p>
         </p:txBody>
       </p:sp>
@@ -5289,10 +5256,9 @@
           <a:lstStyle/>
           <a:p>
             <a:r>
-              <a:rPr lang="en-US" dirty="0" smtClean="0"/>
+              <a:rPr lang="en-US" dirty="0"/>
               <a:t>* Improved performance in SQL 2017 under certain conditions (“adaptive join processing”)</a:t>
             </a:r>
-            <a:endParaRPr lang="en-US" dirty="0"/>
           </a:p>
         </p:txBody>
       </p:sp>
@@ -5306,13 +5272,6 @@
   <p:clrMapOvr>
     <a:masterClrMapping/>
   </p:clrMapOvr>
-  <p:timing>
-    <p:tnLst>
-      <p:par>
-        <p:cTn id="1" dur="indefinite" restart="never" nodeType="tmRoot"/>
-      </p:par>
-    </p:tnLst>
-  </p:timing>
 </p:sld>
 </file>
 
@@ -5338,7 +5297,7 @@
           <p:cNvPr id="2" name="Title 1">
             <a:extLst>
               <a:ext uri="{FF2B5EF4-FFF2-40B4-BE49-F238E27FC236}">
-                <a16:creationId xmlns:a16="http://schemas.microsoft.com/office/drawing/2014/main" xmlns="" id="{FEF5F440-7918-4A6B-9C7C-C25F5B4AB5DD}"/>
+                <a16:creationId xmlns:a16="http://schemas.microsoft.com/office/drawing/2014/main" id="{FEF5F440-7918-4A6B-9C7C-C25F5B4AB5DD}"/>
               </a:ext>
             </a:extLst>
           </p:cNvPr>
@@ -5366,7 +5325,7 @@
           <p:cNvPr id="3" name="Content Placeholder 2">
             <a:extLst>
               <a:ext uri="{FF2B5EF4-FFF2-40B4-BE49-F238E27FC236}">
-                <a16:creationId xmlns:a16="http://schemas.microsoft.com/office/drawing/2014/main" xmlns="" id="{9E20F2C1-4D76-4D3B-8502-4FA0575D48CD}"/>
+                <a16:creationId xmlns:a16="http://schemas.microsoft.com/office/drawing/2014/main" id="{9E20F2C1-4D76-4D3B-8502-4FA0575D48CD}"/>
               </a:ext>
             </a:extLst>
           </p:cNvPr>
@@ -5383,10 +5342,9 @@
           <a:lstStyle/>
           <a:p>
             <a:r>
-              <a:rPr lang="en-US" dirty="0" smtClean="0"/>
+              <a:rPr lang="en-US" dirty="0"/>
               <a:t>User-Defined Functions</a:t>
             </a:r>
-            <a:endParaRPr lang="en-US" dirty="0"/>
           </a:p>
         </p:txBody>
       </p:sp>
@@ -5395,7 +5353,7 @@
           <p:cNvPr id="4" name="Picture 3">
             <a:extLst>
               <a:ext uri="{FF2B5EF4-FFF2-40B4-BE49-F238E27FC236}">
-                <a16:creationId xmlns:a16="http://schemas.microsoft.com/office/drawing/2014/main" xmlns="" id="{91F19CE3-C79C-4B4E-9DFB-953E12007E9A}"/>
+                <a16:creationId xmlns:a16="http://schemas.microsoft.com/office/drawing/2014/main" id="{91F19CE3-C79C-4B4E-9DFB-953E12007E9A}"/>
               </a:ext>
             </a:extLst>
           </p:cNvPr>
@@ -5430,13 +5388,6 @@
   <p:clrMapOvr>
     <a:masterClrMapping/>
   </p:clrMapOvr>
-  <p:timing>
-    <p:tnLst>
-      <p:par>
-        <p:cTn id="1" dur="indefinite" restart="never" nodeType="tmRoot"/>
-      </p:par>
-    </p:tnLst>
-  </p:timing>
 </p:sld>
 </file>
 
@@ -5473,10 +5424,9 @@
           <a:lstStyle/>
           <a:p>
             <a:r>
-              <a:rPr lang="en-US" dirty="0" smtClean="0"/>
+              <a:rPr lang="en-US" dirty="0"/>
               <a:t>Triangle Joins</a:t>
             </a:r>
-            <a:endParaRPr lang="en-US" dirty="0"/>
           </a:p>
         </p:txBody>
       </p:sp>
@@ -6183,7 +6133,7 @@
               <a:t> </a:t>
             </a:r>
             <a:r>
-              <a:rPr lang="en-US" dirty="0" err="1" smtClean="0">
+              <a:rPr lang="en-US" dirty="0" err="1">
                 <a:solidFill>
                   <a:srgbClr val="000000"/>
                 </a:solidFill>
@@ -6204,19 +6154,7 @@
                 </a:highlight>
                 <a:latin typeface="Consolas" panose="020B0609020204030204" pitchFamily="49" charset="0"/>
               </a:rPr>
-              <a:t> </a:t>
-            </a:r>
-            <a:r>
-              <a:rPr lang="en-US" dirty="0" smtClean="0">
-                <a:solidFill>
-                  <a:srgbClr val="000000"/>
-                </a:solidFill>
-                <a:highlight>
-                  <a:srgbClr val="FFFF00"/>
-                </a:highlight>
-                <a:latin typeface="Consolas" panose="020B0609020204030204" pitchFamily="49" charset="0"/>
-              </a:rPr>
-              <a:t>&gt; </a:t>
+              <a:t> &gt; </a:t>
             </a:r>
             <a:r>
               <a:rPr lang="en-US" dirty="0" err="1">
@@ -6429,14 +6367,6 @@
   <p:clrMapOvr>
     <a:masterClrMapping/>
   </p:clrMapOvr>
-  <mc:AlternateContent xmlns:mc="http://schemas.openxmlformats.org/markup-compatibility/2006">
-    <mc:Choice xmlns:p14="http://schemas.microsoft.com/office/powerpoint/2010/main" Requires="p14">
-      <p:transition spd="slow" p14:dur="2000"/>
-    </mc:Choice>
-    <mc:Fallback>
-      <p:transition spd="slow"/>
-    </mc:Fallback>
-  </mc:AlternateContent>
   <p:timing>
     <p:tnLst>
       <p:par>
@@ -6551,10 +6481,9 @@
           <a:lstStyle/>
           <a:p>
             <a:r>
-              <a:rPr lang="en-US" dirty="0" smtClean="0"/>
+              <a:rPr lang="en-US" dirty="0"/>
               <a:t>Triangle Joins</a:t>
             </a:r>
-            <a:endParaRPr lang="en-US" dirty="0"/>
           </a:p>
         </p:txBody>
       </p:sp>
@@ -6727,10 +6656,9 @@
           <a:lstStyle/>
           <a:p>
             <a:r>
-              <a:rPr lang="en-US" dirty="0" smtClean="0"/>
+              <a:rPr lang="en-US" dirty="0"/>
               <a:t>Windowing Functions</a:t>
             </a:r>
-            <a:endParaRPr lang="en-US" dirty="0"/>
           </a:p>
         </p:txBody>
       </p:sp>
@@ -6790,7 +6718,7 @@
               <a:t> </a:t>
             </a:r>
             <a:r>
-              <a:rPr lang="en-US" dirty="0" smtClean="0">
+              <a:rPr lang="en-US" dirty="0">
                 <a:solidFill>
                   <a:srgbClr val="FF00FF"/>
                 </a:solidFill>
@@ -6856,7 +6784,7 @@
               <a:t>AVG</a:t>
             </a:r>
             <a:r>
-              <a:rPr lang="en-US" dirty="0" smtClean="0">
+              <a:rPr lang="en-US" dirty="0">
                 <a:solidFill>
                   <a:srgbClr val="808080"/>
                 </a:solidFill>
@@ -6868,7 +6796,7 @@
               <a:t>, </a:t>
             </a:r>
             <a:r>
-              <a:rPr lang="en-US" dirty="0" smtClean="0"/>
+              <a:rPr lang="en-US" dirty="0"/>
               <a:t>…</a:t>
             </a:r>
           </a:p>
@@ -6911,19 +6839,7 @@
                 </a:highlight>
                 <a:latin typeface="Consolas" panose="020B0609020204030204" pitchFamily="49" charset="0"/>
               </a:rPr>
-              <a:t> </a:t>
-            </a:r>
-            <a:r>
-              <a:rPr lang="en-US" dirty="0" smtClean="0">
-                <a:solidFill>
-                  <a:srgbClr val="000000"/>
-                </a:solidFill>
-                <a:highlight>
-                  <a:srgbClr val="FFFFFF"/>
-                </a:highlight>
-                <a:latin typeface="Consolas" panose="020B0609020204030204" pitchFamily="49" charset="0"/>
-              </a:rPr>
-              <a:t>LAG</a:t>
+              <a:t> LAG</a:t>
             </a:r>
           </a:p>
           <a:p>
@@ -7179,7 +7095,7 @@
               <a:t>…</a:t>
             </a:r>
             <a:r>
-              <a:rPr lang="en-US" dirty="0" smtClean="0">
+              <a:rPr lang="en-US" dirty="0">
                 <a:solidFill>
                   <a:srgbClr val="808080"/>
                 </a:solidFill>
@@ -7204,13 +7120,6 @@
   <p:clrMapOvr>
     <a:masterClrMapping/>
   </p:clrMapOvr>
-  <p:timing>
-    <p:tnLst>
-      <p:par>
-        <p:cTn id="1" dur="indefinite" restart="never" nodeType="tmRoot"/>
-      </p:par>
-    </p:tnLst>
-  </p:timing>
 </p:sld>
 </file>
 
@@ -7236,7 +7145,7 @@
           <p:cNvPr id="2" name="Title 1">
             <a:extLst>
               <a:ext uri="{FF2B5EF4-FFF2-40B4-BE49-F238E27FC236}">
-                <a16:creationId xmlns:a16="http://schemas.microsoft.com/office/drawing/2014/main" xmlns="" id="{FEF5F440-7918-4A6B-9C7C-C25F5B4AB5DD}"/>
+                <a16:creationId xmlns:a16="http://schemas.microsoft.com/office/drawing/2014/main" id="{FEF5F440-7918-4A6B-9C7C-C25F5B4AB5DD}"/>
               </a:ext>
             </a:extLst>
           </p:cNvPr>
@@ -7264,7 +7173,7 @@
           <p:cNvPr id="3" name="Content Placeholder 2">
             <a:extLst>
               <a:ext uri="{FF2B5EF4-FFF2-40B4-BE49-F238E27FC236}">
-                <a16:creationId xmlns:a16="http://schemas.microsoft.com/office/drawing/2014/main" xmlns="" id="{9E20F2C1-4D76-4D3B-8502-4FA0575D48CD}"/>
+                <a16:creationId xmlns:a16="http://schemas.microsoft.com/office/drawing/2014/main" id="{9E20F2C1-4D76-4D3B-8502-4FA0575D48CD}"/>
               </a:ext>
             </a:extLst>
           </p:cNvPr>
@@ -7281,10 +7190,9 @@
           <a:lstStyle/>
           <a:p>
             <a:r>
-              <a:rPr lang="en-US" dirty="0" smtClean="0"/>
+              <a:rPr lang="en-US" dirty="0"/>
               <a:t>Running Aggregations</a:t>
             </a:r>
-            <a:endParaRPr lang="en-US" dirty="0"/>
           </a:p>
         </p:txBody>
       </p:sp>
@@ -7293,7 +7201,7 @@
           <p:cNvPr id="4" name="Picture 3">
             <a:extLst>
               <a:ext uri="{FF2B5EF4-FFF2-40B4-BE49-F238E27FC236}">
-                <a16:creationId xmlns:a16="http://schemas.microsoft.com/office/drawing/2014/main" xmlns="" id="{91F19CE3-C79C-4B4E-9DFB-953E12007E9A}"/>
+                <a16:creationId xmlns:a16="http://schemas.microsoft.com/office/drawing/2014/main" id="{91F19CE3-C79C-4B4E-9DFB-953E12007E9A}"/>
               </a:ext>
             </a:extLst>
           </p:cNvPr>
@@ -7328,13 +7236,6 @@
   <p:clrMapOvr>
     <a:masterClrMapping/>
   </p:clrMapOvr>
-  <p:timing>
-    <p:tnLst>
-      <p:par>
-        <p:cTn id="1" dur="indefinite" restart="never" nodeType="tmRoot"/>
-      </p:par>
-    </p:tnLst>
-  </p:timing>
 </p:sld>
 </file>
 
@@ -7371,10 +7272,9 @@
           <a:lstStyle/>
           <a:p>
             <a:r>
-              <a:rPr lang="en-US" dirty="0" smtClean="0"/>
+              <a:rPr lang="en-US" dirty="0"/>
               <a:t>SSIS: Command Component</a:t>
             </a:r>
-            <a:endParaRPr lang="en-US" dirty="0"/>
           </a:p>
         </p:txBody>
       </p:sp>
@@ -7412,13 +7312,6 @@
   <p:clrMapOvr>
     <a:masterClrMapping/>
   </p:clrMapOvr>
-  <p:timing>
-    <p:tnLst>
-      <p:par>
-        <p:cTn id="1" dur="indefinite" restart="never" nodeType="tmRoot"/>
-      </p:par>
-    </p:tnLst>
-  </p:timing>
 </p:sld>
 </file>
 
@@ -8451,13 +8344,6 @@
   <p:clrMapOvr>
     <a:masterClrMapping/>
   </p:clrMapOvr>
-  <p:timing>
-    <p:tnLst>
-      <p:par>
-        <p:cTn id="1" dur="indefinite" restart="never" nodeType="tmRoot"/>
-      </p:par>
-    </p:tnLst>
-  </p:timing>
 </p:sld>
 </file>
 
@@ -8494,10 +8380,9 @@
           <a:lstStyle/>
           <a:p>
             <a:r>
-              <a:rPr lang="en-US" dirty="0" smtClean="0"/>
+              <a:rPr lang="en-US" dirty="0"/>
               <a:t>SSIS: Staging Table</a:t>
             </a:r>
-            <a:endParaRPr lang="en-US" dirty="0"/>
           </a:p>
         </p:txBody>
       </p:sp>
@@ -8535,13 +8420,6 @@
   <p:clrMapOvr>
     <a:masterClrMapping/>
   </p:clrMapOvr>
-  <p:timing>
-    <p:tnLst>
-      <p:par>
-        <p:cTn id="1" dur="indefinite" restart="never" nodeType="tmRoot"/>
-      </p:par>
-    </p:tnLst>
-  </p:timing>
 </p:sld>
 </file>
 
@@ -8567,7 +8445,7 @@
           <p:cNvPr id="2" name="Title 1">
             <a:extLst>
               <a:ext uri="{FF2B5EF4-FFF2-40B4-BE49-F238E27FC236}">
-                <a16:creationId xmlns:a16="http://schemas.microsoft.com/office/drawing/2014/main" xmlns="" id="{FEF5F440-7918-4A6B-9C7C-C25F5B4AB5DD}"/>
+                <a16:creationId xmlns:a16="http://schemas.microsoft.com/office/drawing/2014/main" id="{FEF5F440-7918-4A6B-9C7C-C25F5B4AB5DD}"/>
               </a:ext>
             </a:extLst>
           </p:cNvPr>
@@ -8595,7 +8473,7 @@
           <p:cNvPr id="3" name="Content Placeholder 2">
             <a:extLst>
               <a:ext uri="{FF2B5EF4-FFF2-40B4-BE49-F238E27FC236}">
-                <a16:creationId xmlns:a16="http://schemas.microsoft.com/office/drawing/2014/main" xmlns="" id="{9E20F2C1-4D76-4D3B-8502-4FA0575D48CD}"/>
+                <a16:creationId xmlns:a16="http://schemas.microsoft.com/office/drawing/2014/main" id="{9E20F2C1-4D76-4D3B-8502-4FA0575D48CD}"/>
               </a:ext>
             </a:extLst>
           </p:cNvPr>
@@ -8612,10 +8490,9 @@
           <a:lstStyle/>
           <a:p>
             <a:r>
-              <a:rPr lang="en-US" dirty="0" smtClean="0"/>
+              <a:rPr lang="en-US" dirty="0"/>
               <a:t>SSIS</a:t>
             </a:r>
-            <a:endParaRPr lang="en-US" dirty="0"/>
           </a:p>
         </p:txBody>
       </p:sp>
@@ -8624,7 +8501,7 @@
           <p:cNvPr id="4" name="Picture 3">
             <a:extLst>
               <a:ext uri="{FF2B5EF4-FFF2-40B4-BE49-F238E27FC236}">
-                <a16:creationId xmlns:a16="http://schemas.microsoft.com/office/drawing/2014/main" xmlns="" id="{91F19CE3-C79C-4B4E-9DFB-953E12007E9A}"/>
+                <a16:creationId xmlns:a16="http://schemas.microsoft.com/office/drawing/2014/main" id="{91F19CE3-C79C-4B4E-9DFB-953E12007E9A}"/>
               </a:ext>
             </a:extLst>
           </p:cNvPr>
@@ -8659,13 +8536,6 @@
   <p:clrMapOvr>
     <a:masterClrMapping/>
   </p:clrMapOvr>
-  <p:timing>
-    <p:tnLst>
-      <p:par>
-        <p:cTn id="1" dur="indefinite" restart="never" nodeType="tmRoot"/>
-      </p:par>
-    </p:tnLst>
-  </p:timing>
 </p:sld>
 </file>
 
@@ -8702,18 +8572,17 @@
           <a:lstStyle/>
           <a:p>
             <a:r>
-              <a:rPr lang="en-US" dirty="0" smtClean="0"/>
+              <a:rPr lang="en-US" dirty="0"/>
               <a:t>C</a:t>
             </a:r>
             <a:r>
-              <a:rPr lang="en-US" baseline="30000" dirty="0" smtClean="0"/>
+              <a:rPr lang="en-US" baseline="30000" dirty="0"/>
               <a:t>#</a:t>
             </a:r>
             <a:r>
-              <a:rPr lang="en-US" dirty="0" smtClean="0"/>
+              <a:rPr lang="en-US" dirty="0"/>
               <a:t>: Singleton Inserts</a:t>
             </a:r>
-            <a:endParaRPr lang="en-US" dirty="0"/>
           </a:p>
         </p:txBody>
       </p:sp>
@@ -8879,7 +8748,7 @@
               <a:t>LastWriteTime</a:t>
             </a:r>
             <a:r>
-              <a:rPr lang="en-US" dirty="0" smtClean="0">
+              <a:rPr lang="en-US" dirty="0">
                 <a:solidFill>
                   <a:srgbClr val="A31515"/>
                 </a:solidFill>
@@ -8891,7 +8760,7 @@
               <a:t>);"</a:t>
             </a:r>
             <a:r>
-              <a:rPr lang="en-US" dirty="0" smtClean="0">
+              <a:rPr lang="en-US" dirty="0">
                 <a:solidFill>
                   <a:srgbClr val="000000"/>
                 </a:solidFill>
@@ -9466,43 +9335,22 @@
               </a:rPr>
               <a:t> = </a:t>
             </a:r>
-            <a:endParaRPr lang="en-US" dirty="0" smtClean="0">
-              <a:solidFill>
-                <a:srgbClr val="000000"/>
-              </a:solidFill>
-              <a:highlight>
-                <a:srgbClr val="FFFFFF"/>
-              </a:highlight>
-              <a:latin typeface="Consolas" panose="020B0609020204030204" pitchFamily="49" charset="0"/>
-            </a:endParaRPr>
-          </a:p>
-          <a:p>
-            <a:r>
-              <a:rPr lang="en-US" dirty="0">
-                <a:solidFill>
-                  <a:srgbClr val="000000"/>
-                </a:solidFill>
-                <a:highlight>
-                  <a:srgbClr val="FFFFFF"/>
-                </a:highlight>
-                <a:latin typeface="Consolas" panose="020B0609020204030204" pitchFamily="49" charset="0"/>
-              </a:rPr>
-              <a:t>	</a:t>
-            </a:r>
-            <a:r>
-              <a:rPr lang="en-US" dirty="0" smtClean="0">
-                <a:solidFill>
-                  <a:srgbClr val="000000"/>
-                </a:solidFill>
-                <a:highlight>
-                  <a:srgbClr val="FFFFFF"/>
-                </a:highlight>
-                <a:latin typeface="Consolas" panose="020B0609020204030204" pitchFamily="49" charset="0"/>
-              </a:rPr>
-              <a:t>		</a:t>
-            </a:r>
-            <a:r>
-              <a:rPr lang="en-US" dirty="0" smtClean="0">
+          </a:p>
+          <a:p>
+            <a:r>
+              <a:rPr lang="en-US" dirty="0">
+                <a:solidFill>
+                  <a:srgbClr val="000000"/>
+                </a:solidFill>
+                <a:highlight>
+                  <a:srgbClr val="FFFFFF"/>
+                </a:highlight>
+                <a:latin typeface="Consolas" panose="020B0609020204030204" pitchFamily="49" charset="0"/>
+              </a:rPr>
+              <a:t>			</a:t>
+            </a:r>
+            <a:r>
+              <a:rPr lang="en-US" dirty="0">
                 <a:solidFill>
                   <a:srgbClr val="0000FF"/>
                 </a:solidFill>
@@ -9514,7 +9362,7 @@
               <a:t>new</a:t>
             </a:r>
             <a:r>
-              <a:rPr lang="en-US" dirty="0" smtClean="0">
+              <a:rPr lang="en-US" dirty="0">
                 <a:solidFill>
                   <a:srgbClr val="000000"/>
                 </a:solidFill>
@@ -9811,7 +9659,7 @@
           </a:p>
           <a:p>
             <a:r>
-              <a:rPr lang="en-US" dirty="0" smtClean="0">
+              <a:rPr lang="en-US" dirty="0">
                 <a:solidFill>
                   <a:srgbClr val="000000"/>
                 </a:solidFill>
@@ -9822,15 +9670,6 @@
               </a:rPr>
               <a:t>}</a:t>
             </a:r>
-            <a:endParaRPr lang="en-US" dirty="0">
-              <a:solidFill>
-                <a:srgbClr val="000000"/>
-              </a:solidFill>
-              <a:highlight>
-                <a:srgbClr val="FFFFFF"/>
-              </a:highlight>
-              <a:latin typeface="Consolas" panose="020B0609020204030204" pitchFamily="49" charset="0"/>
-            </a:endParaRPr>
           </a:p>
         </p:txBody>
       </p:sp>
@@ -9844,13 +9683,6 @@
   <p:clrMapOvr>
     <a:masterClrMapping/>
   </p:clrMapOvr>
-  <p:timing>
-    <p:tnLst>
-      <p:par>
-        <p:cTn id="1" dur="indefinite" restart="never" nodeType="tmRoot"/>
-      </p:par>
-    </p:tnLst>
-  </p:timing>
 </p:sld>
 </file>
 
@@ -9887,18 +9719,17 @@
           <a:lstStyle/>
           <a:p>
             <a:r>
-              <a:rPr lang="en-US" dirty="0" smtClean="0"/>
+              <a:rPr lang="en-US" dirty="0"/>
               <a:t>C</a:t>
             </a:r>
             <a:r>
-              <a:rPr lang="en-US" baseline="30000" dirty="0" smtClean="0"/>
+              <a:rPr lang="en-US" baseline="30000" dirty="0"/>
               <a:t>#</a:t>
             </a:r>
             <a:r>
-              <a:rPr lang="en-US" dirty="0" smtClean="0"/>
+              <a:rPr lang="en-US" dirty="0"/>
               <a:t>: Bulk Insert</a:t>
             </a:r>
-            <a:endParaRPr lang="en-US" dirty="0"/>
           </a:p>
         </p:txBody>
       </p:sp>
@@ -10028,16 +9859,30 @@
               <a:t>SqlBulkCopy</a:t>
             </a:r>
             <a:r>
-              <a:rPr lang="en-US" dirty="0" smtClean="0">
-                <a:solidFill>
-                  <a:srgbClr val="000000"/>
-                </a:solidFill>
-                <a:highlight>
-                  <a:srgbClr val="FFFFFF"/>
-                </a:highlight>
-                <a:latin typeface="Consolas" panose="020B0609020204030204" pitchFamily="49" charset="0"/>
-              </a:rPr>
-              <a:t>(_</a:t>
+              <a:rPr lang="en-US" dirty="0">
+                <a:solidFill>
+                  <a:srgbClr val="000000"/>
+                </a:solidFill>
+                <a:highlight>
+                  <a:srgbClr val="FFFFFF"/>
+                </a:highlight>
+                <a:latin typeface="Consolas" panose="020B0609020204030204" pitchFamily="49" charset="0"/>
+              </a:rPr>
+              <a:t>(</a:t>
+            </a:r>
+          </a:p>
+          <a:p>
+            <a:r>
+              <a:rPr lang="en-US" dirty="0">
+                <a:solidFill>
+                  <a:srgbClr val="000000"/>
+                </a:solidFill>
+                <a:highlight>
+                  <a:srgbClr val="FFFFFF"/>
+                </a:highlight>
+                <a:latin typeface="Consolas" panose="020B0609020204030204" pitchFamily="49" charset="0"/>
+              </a:rPr>
+              <a:t>	connection, </a:t>
             </a:r>
           </a:p>
           <a:p>
@@ -10054,54 +9899,7 @@
               <a:t>	</a:t>
             </a:r>
             <a:r>
-              <a:rPr lang="en-US" dirty="0" smtClean="0">
-                <a:solidFill>
-                  <a:srgbClr val="000000"/>
-                </a:solidFill>
-                <a:highlight>
-                  <a:srgbClr val="FFFFFF"/>
-                </a:highlight>
-                <a:latin typeface="Consolas" panose="020B0609020204030204" pitchFamily="49" charset="0"/>
-              </a:rPr>
-              <a:t>connection</a:t>
-            </a:r>
-            <a:r>
-              <a:rPr lang="en-US" dirty="0">
-                <a:solidFill>
-                  <a:srgbClr val="000000"/>
-                </a:solidFill>
-                <a:highlight>
-                  <a:srgbClr val="FFFFFF"/>
-                </a:highlight>
-                <a:latin typeface="Consolas" panose="020B0609020204030204" pitchFamily="49" charset="0"/>
-              </a:rPr>
-              <a:t>, </a:t>
-            </a:r>
-            <a:endParaRPr lang="en-US" dirty="0" smtClean="0">
-              <a:solidFill>
-                <a:srgbClr val="000000"/>
-              </a:solidFill>
-              <a:highlight>
-                <a:srgbClr val="FFFFFF"/>
-              </a:highlight>
-              <a:latin typeface="Consolas" panose="020B0609020204030204" pitchFamily="49" charset="0"/>
-            </a:endParaRPr>
-          </a:p>
-          <a:p>
-            <a:r>
-              <a:rPr lang="en-US" dirty="0">
-                <a:solidFill>
-                  <a:srgbClr val="000000"/>
-                </a:solidFill>
-                <a:highlight>
-                  <a:srgbClr val="FFFFFF"/>
-                </a:highlight>
-                <a:latin typeface="Consolas" panose="020B0609020204030204" pitchFamily="49" charset="0"/>
-              </a:rPr>
-              <a:t>	</a:t>
-            </a:r>
-            <a:r>
-              <a:rPr lang="en-US" dirty="0" err="1" smtClean="0">
+              <a:rPr lang="en-US" dirty="0" err="1">
                 <a:solidFill>
                   <a:srgbClr val="2B91AF"/>
                 </a:solidFill>
@@ -10113,7 +9911,7 @@
               <a:t>SqlBulkCopyOptions</a:t>
             </a:r>
             <a:r>
-              <a:rPr lang="en-US" dirty="0" err="1" smtClean="0">
+              <a:rPr lang="en-US" dirty="0" err="1">
                 <a:solidFill>
                   <a:srgbClr val="000000"/>
                 </a:solidFill>
@@ -10125,28 +9923,16 @@
               <a:t>.TableLock</a:t>
             </a:r>
             <a:r>
-              <a:rPr lang="en-US" dirty="0" smtClean="0">
-                <a:solidFill>
-                  <a:srgbClr val="000000"/>
-                </a:solidFill>
-                <a:highlight>
-                  <a:srgbClr val="FFFFFF"/>
-                </a:highlight>
-                <a:latin typeface="Consolas" panose="020B0609020204030204" pitchFamily="49" charset="0"/>
-              </a:rPr>
-              <a:t> </a:t>
-            </a:r>
-            <a:r>
-              <a:rPr lang="en-US" dirty="0">
-                <a:solidFill>
-                  <a:srgbClr val="000000"/>
-                </a:solidFill>
-                <a:highlight>
-                  <a:srgbClr val="FFFFFF"/>
-                </a:highlight>
-                <a:latin typeface="Consolas" panose="020B0609020204030204" pitchFamily="49" charset="0"/>
-              </a:rPr>
-              <a:t>| </a:t>
+              <a:rPr lang="en-US" dirty="0">
+                <a:solidFill>
+                  <a:srgbClr val="000000"/>
+                </a:solidFill>
+                <a:highlight>
+                  <a:srgbClr val="FFFFFF"/>
+                </a:highlight>
+                <a:latin typeface="Consolas" panose="020B0609020204030204" pitchFamily="49" charset="0"/>
+              </a:rPr>
+              <a:t> | </a:t>
             </a:r>
             <a:r>
               <a:rPr lang="en-US" dirty="0" err="1">
@@ -10182,22 +9968,10 @@
                 </a:highlight>
                 <a:latin typeface="Consolas" panose="020B0609020204030204" pitchFamily="49" charset="0"/>
               </a:rPr>
-              <a:t>, </a:t>
-            </a:r>
-            <a:r>
-              <a:rPr lang="en-US" dirty="0" smtClean="0">
-                <a:solidFill>
-                  <a:srgbClr val="000000"/>
-                </a:solidFill>
-                <a:highlight>
-                  <a:srgbClr val="FFFFFF"/>
-                </a:highlight>
-                <a:latin typeface="Consolas" panose="020B0609020204030204" pitchFamily="49" charset="0"/>
-              </a:rPr>
-              <a:t>	</a:t>
-            </a:r>
-            <a:r>
-              <a:rPr lang="en-US" dirty="0" smtClean="0">
+              <a:t>, 	</a:t>
+            </a:r>
+            <a:r>
+              <a:rPr lang="en-US" dirty="0">
                 <a:solidFill>
                   <a:srgbClr val="0000FF"/>
                 </a:solidFill>
@@ -10891,13 +10665,6 @@
   <p:clrMapOvr>
     <a:masterClrMapping/>
   </p:clrMapOvr>
-  <p:timing>
-    <p:tnLst>
-      <p:par>
-        <p:cTn id="1" dur="indefinite" restart="never" nodeType="tmRoot"/>
-      </p:par>
-    </p:tnLst>
-  </p:timing>
 </p:sld>
 </file>
 
@@ -10923,7 +10690,7 @@
           <p:cNvPr id="2" name="Title 1">
             <a:extLst>
               <a:ext uri="{FF2B5EF4-FFF2-40B4-BE49-F238E27FC236}">
-                <a16:creationId xmlns:a16="http://schemas.microsoft.com/office/drawing/2014/main" xmlns="" id="{FEF5F440-7918-4A6B-9C7C-C25F5B4AB5DD}"/>
+                <a16:creationId xmlns:a16="http://schemas.microsoft.com/office/drawing/2014/main" id="{FEF5F440-7918-4A6B-9C7C-C25F5B4AB5DD}"/>
               </a:ext>
             </a:extLst>
           </p:cNvPr>
@@ -10951,7 +10718,7 @@
           <p:cNvPr id="3" name="Content Placeholder 2">
             <a:extLst>
               <a:ext uri="{FF2B5EF4-FFF2-40B4-BE49-F238E27FC236}">
-                <a16:creationId xmlns:a16="http://schemas.microsoft.com/office/drawing/2014/main" xmlns="" id="{9E20F2C1-4D76-4D3B-8502-4FA0575D48CD}"/>
+                <a16:creationId xmlns:a16="http://schemas.microsoft.com/office/drawing/2014/main" id="{9E20F2C1-4D76-4D3B-8502-4FA0575D48CD}"/>
               </a:ext>
             </a:extLst>
           </p:cNvPr>
@@ -10968,10 +10735,9 @@
           <a:lstStyle/>
           <a:p>
             <a:r>
-              <a:rPr lang="en-US" dirty="0" smtClean="0"/>
+              <a:rPr lang="en-US" dirty="0"/>
               <a:t>.NET Code</a:t>
             </a:r>
-            <a:endParaRPr lang="en-US" dirty="0"/>
           </a:p>
         </p:txBody>
       </p:sp>
@@ -10980,7 +10746,7 @@
           <p:cNvPr id="4" name="Picture 3">
             <a:extLst>
               <a:ext uri="{FF2B5EF4-FFF2-40B4-BE49-F238E27FC236}">
-                <a16:creationId xmlns:a16="http://schemas.microsoft.com/office/drawing/2014/main" xmlns="" id="{91F19CE3-C79C-4B4E-9DFB-953E12007E9A}"/>
+                <a16:creationId xmlns:a16="http://schemas.microsoft.com/office/drawing/2014/main" id="{91F19CE3-C79C-4B4E-9DFB-953E12007E9A}"/>
               </a:ext>
             </a:extLst>
           </p:cNvPr>
@@ -11015,13 +10781,6 @@
   <p:clrMapOvr>
     <a:masterClrMapping/>
   </p:clrMapOvr>
-  <p:timing>
-    <p:tnLst>
-      <p:par>
-        <p:cTn id="1" dur="indefinite" restart="never" nodeType="tmRoot"/>
-      </p:par>
-    </p:tnLst>
-  </p:timing>
 </p:sld>
 </file>
 
@@ -11058,11 +10817,11 @@
           <a:lstStyle/>
           <a:p>
             <a:r>
-              <a:rPr lang="en-US" dirty="0" smtClean="0"/>
+              <a:rPr lang="en-US" dirty="0"/>
               <a:t>Key Take-</a:t>
             </a:r>
             <a:r>
-              <a:rPr lang="en-US" dirty="0" err="1" smtClean="0"/>
+              <a:rPr lang="en-US" dirty="0" err="1"/>
               <a:t>Aways</a:t>
             </a:r>
             <a:endParaRPr lang="en-US" dirty="0"/>
@@ -11089,7 +10848,7 @@
               <a:buChar char="•"/>
             </a:pPr>
             <a:r>
-              <a:rPr lang="en-US" dirty="0" smtClean="0"/>
+              <a:rPr lang="en-US" dirty="0"/>
               <a:t>Cursors are usually inefficient</a:t>
             </a:r>
           </a:p>
@@ -11099,7 +10858,7 @@
               <a:buChar char="•"/>
             </a:pPr>
             <a:r>
-              <a:rPr lang="en-US" dirty="0" smtClean="0"/>
+              <a:rPr lang="en-US" dirty="0"/>
               <a:t>If necessary, declare as </a:t>
             </a:r>
             <a:r>
@@ -11138,7 +10897,7 @@
               </a:rPr>
               <a:t>read_only</a:t>
             </a:r>
-            <a:endParaRPr lang="en-US" dirty="0" smtClean="0"/>
+            <a:endParaRPr lang="en-US" dirty="0"/>
           </a:p>
           <a:p>
             <a:pPr marL="1147527" lvl="1" indent="-571500">
@@ -11146,7 +10905,7 @@
               <a:buChar char="•"/>
             </a:pPr>
             <a:r>
-              <a:rPr lang="en-US" dirty="0" smtClean="0"/>
+              <a:rPr lang="en-US" dirty="0"/>
               <a:t>Still necessary for lots of admin functionality</a:t>
             </a:r>
           </a:p>
@@ -11156,7 +10915,7 @@
               <a:buChar char="•"/>
             </a:pPr>
             <a:r>
-              <a:rPr lang="en-US" dirty="0" smtClean="0"/>
+              <a:rPr lang="en-US" dirty="0"/>
               <a:t>Pre-2012, still best way to do running totals, etc.</a:t>
             </a:r>
           </a:p>
@@ -11166,7 +10925,7 @@
               <a:buChar char="•"/>
             </a:pPr>
             <a:r>
-              <a:rPr lang="en-US" dirty="0" smtClean="0"/>
+              <a:rPr lang="en-US" dirty="0"/>
               <a:t>Triangle joins are evil</a:t>
             </a:r>
           </a:p>
@@ -11189,13 +10948,6 @@
   <p:clrMapOvr>
     <a:masterClrMapping/>
   </p:clrMapOvr>
-  <p:timing>
-    <p:tnLst>
-      <p:par>
-        <p:cTn id="1" dur="indefinite" restart="never" nodeType="tmRoot"/>
-      </p:par>
-    </p:tnLst>
-  </p:timing>
 </p:sld>
 </file>
 
@@ -11232,11 +10984,11 @@
           <a:lstStyle/>
           <a:p>
             <a:r>
-              <a:rPr lang="en-US" dirty="0" smtClean="0"/>
+              <a:rPr lang="en-US" dirty="0"/>
               <a:t>Key Take-</a:t>
             </a:r>
             <a:r>
-              <a:rPr lang="en-US" dirty="0" err="1" smtClean="0"/>
+              <a:rPr lang="en-US" dirty="0" err="1"/>
               <a:t>Aways</a:t>
             </a:r>
             <a:endParaRPr lang="en-US" dirty="0"/>
@@ -11263,7 +11015,7 @@
               <a:buChar char="•"/>
             </a:pPr>
             <a:r>
-              <a:rPr lang="en-US" dirty="0" smtClean="0"/>
+              <a:rPr lang="en-US" dirty="0"/>
               <a:t>Avoid most UDFs</a:t>
             </a:r>
           </a:p>
@@ -11273,7 +11025,7 @@
               <a:buChar char="•"/>
             </a:pPr>
             <a:r>
-              <a:rPr lang="en-US" dirty="0" smtClean="0"/>
+              <a:rPr lang="en-US" dirty="0"/>
               <a:t>Scalar and multi-statement TVFs with data access tend to perform poorly</a:t>
             </a:r>
           </a:p>
@@ -11283,7 +11035,7 @@
               <a:buChar char="•"/>
             </a:pPr>
             <a:r>
-              <a:rPr lang="en-US" dirty="0" smtClean="0"/>
+              <a:rPr lang="en-US" dirty="0"/>
               <a:t>CLR with data access tends to perform poorly</a:t>
             </a:r>
           </a:p>
@@ -11293,10 +11045,9 @@
               <a:buChar char="•"/>
             </a:pPr>
             <a:r>
-              <a:rPr lang="en-US" dirty="0" smtClean="0"/>
+              <a:rPr lang="en-US" dirty="0"/>
               <a:t>Inline TVFs generally optimize well and tend to perform nicely</a:t>
             </a:r>
-            <a:endParaRPr lang="en-US" dirty="0"/>
           </a:p>
         </p:txBody>
       </p:sp>
@@ -11310,13 +11061,6 @@
   <p:clrMapOvr>
     <a:masterClrMapping/>
   </p:clrMapOvr>
-  <p:timing>
-    <p:tnLst>
-      <p:par>
-        <p:cTn id="1" dur="indefinite" restart="never" nodeType="tmRoot"/>
-      </p:par>
-    </p:tnLst>
-  </p:timing>
 </p:sld>
 </file>
 
@@ -11353,16 +11097,12 @@
           <a:lstStyle/>
           <a:p>
             <a:r>
-              <a:rPr lang="en-US" dirty="0" smtClean="0"/>
+              <a:rPr lang="en-US" dirty="0"/>
               <a:t>Key Take-</a:t>
             </a:r>
             <a:r>
               <a:rPr lang="en-US" dirty="0" err="1"/>
-              <a:t>A</a:t>
-            </a:r>
-            <a:r>
-              <a:rPr lang="en-US" dirty="0" err="1" smtClean="0"/>
-              <a:t>ways</a:t>
+              <a:t>Aways</a:t>
             </a:r>
             <a:endParaRPr lang="en-US" dirty="0"/>
           </a:p>
@@ -11388,7 +11128,7 @@
               <a:buChar char="•"/>
             </a:pPr>
             <a:r>
-              <a:rPr lang="en-US" dirty="0" smtClean="0"/>
+              <a:rPr lang="en-US" dirty="0"/>
               <a:t>Embrace </a:t>
             </a:r>
             <a:r>
@@ -11416,7 +11156,7 @@
               <a:t>()</a:t>
             </a:r>
             <a:r>
-              <a:rPr lang="en-US" dirty="0" smtClean="0"/>
+              <a:rPr lang="en-US" dirty="0"/>
               <a:t>: It is much more useful than just for counting rows</a:t>
             </a:r>
           </a:p>
@@ -11426,7 +11166,18 @@
               <a:buChar char="•"/>
             </a:pPr>
             <a:r>
-              <a:rPr lang="en-US" dirty="0" smtClean="0"/>
+              <a:rPr lang="en-US"/>
+              <a:t>Embrace windowing functions</a:t>
+            </a:r>
+            <a:endParaRPr lang="en-US" dirty="0"/>
+          </a:p>
+          <a:p>
+            <a:pPr marL="571500" indent="-571500">
+              <a:buFont typeface="Arial" panose="020B0604020202020204" pitchFamily="34" charset="0"/>
+              <a:buChar char="•"/>
+            </a:pPr>
+            <a:r>
+              <a:rPr lang="en-US" dirty="0"/>
               <a:t>Embrace </a:t>
             </a:r>
             <a:r>
@@ -11441,7 +11192,7 @@
               </a:rPr>
               <a:t>apply</a:t>
             </a:r>
-            <a:endParaRPr lang="en-US" dirty="0" smtClean="0"/>
+            <a:endParaRPr lang="en-US" dirty="0"/>
           </a:p>
           <a:p>
             <a:pPr marL="1147527" lvl="1" indent="-571500">
@@ -11449,7 +11200,7 @@
               <a:buChar char="•"/>
             </a:pPr>
             <a:r>
-              <a:rPr lang="en-US" dirty="0" smtClean="0"/>
+              <a:rPr lang="en-US" dirty="0"/>
               <a:t>Easy way to improve many scalar UDFs</a:t>
             </a:r>
           </a:p>
@@ -11459,10 +11210,9 @@
               <a:buChar char="•"/>
             </a:pPr>
             <a:r>
-              <a:rPr lang="en-US" dirty="0" smtClean="0"/>
+              <a:rPr lang="en-US" dirty="0"/>
               <a:t>Look for ways to employ tally tables</a:t>
             </a:r>
-            <a:endParaRPr lang="en-US" dirty="0"/>
           </a:p>
         </p:txBody>
       </p:sp>
@@ -11476,13 +11226,6 @@
   <p:clrMapOvr>
     <a:masterClrMapping/>
   </p:clrMapOvr>
-  <p:timing>
-    <p:tnLst>
-      <p:par>
-        <p:cTn id="1" dur="indefinite" restart="never" nodeType="tmRoot"/>
-      </p:par>
-    </p:tnLst>
-  </p:timing>
 </p:sld>
 </file>
 
@@ -11611,13 +11354,6 @@
   <p:clrMapOvr>
     <a:masterClrMapping/>
   </p:clrMapOvr>
-  <p:timing>
-    <p:tnLst>
-      <p:par>
-        <p:cTn id="1" dur="indefinite" restart="never" nodeType="tmRoot"/>
-      </p:par>
-    </p:tnLst>
-  </p:timing>
 </p:sld>
 </file>
 
@@ -11716,21 +11452,6 @@
   <p:clrMapOvr>
     <a:masterClrMapping/>
   </p:clrMapOvr>
-  <mc:AlternateContent xmlns:mc="http://schemas.openxmlformats.org/markup-compatibility/2006">
-    <mc:Choice xmlns:p14="http://schemas.microsoft.com/office/powerpoint/2010/main" Requires="p14">
-      <p:transition spd="slow" p14:dur="2000"/>
-    </mc:Choice>
-    <mc:Fallback>
-      <p:transition spd="slow"/>
-    </mc:Fallback>
-  </mc:AlternateContent>
-  <p:timing>
-    <p:tnLst>
-      <p:par>
-        <p:cTn id="1" dur="indefinite" restart="never" nodeType="tmRoot"/>
-      </p:par>
-    </p:tnLst>
-  </p:timing>
 </p:sld>
 </file>
 
@@ -11767,10 +11488,9 @@
           <a:lstStyle/>
           <a:p>
             <a:r>
-              <a:rPr lang="en-US" dirty="0" smtClean="0"/>
+              <a:rPr lang="en-US" dirty="0"/>
               <a:t>Why Sets?</a:t>
             </a:r>
-            <a:endParaRPr lang="en-US" dirty="0"/>
           </a:p>
         </p:txBody>
       </p:sp>
@@ -11801,7 +11521,7 @@
               <a:buChar char="•"/>
             </a:pPr>
             <a:r>
-              <a:rPr lang="en-US" dirty="0" smtClean="0"/>
+              <a:rPr lang="en-US" dirty="0"/>
               <a:t>Math: set theory (Cantor, 1874)</a:t>
             </a:r>
           </a:p>
@@ -11811,7 +11531,7 @@
               <a:buChar char="•"/>
             </a:pPr>
             <a:r>
-              <a:rPr lang="en-US" dirty="0" smtClean="0"/>
+              <a:rPr lang="en-US" dirty="0"/>
               <a:t>Rigorous proofs of set operations</a:t>
             </a:r>
           </a:p>
@@ -11821,15 +11541,15 @@
               <a:buChar char="•"/>
             </a:pPr>
             <a:r>
-              <a:rPr lang="en-US" dirty="0" smtClean="0"/>
+              <a:rPr lang="en-US" dirty="0"/>
               <a:t>Relational model / relational algebra (</a:t>
             </a:r>
             <a:r>
-              <a:rPr lang="en-US" dirty="0" err="1" smtClean="0"/>
+              <a:rPr lang="en-US" dirty="0" err="1"/>
               <a:t>Codd</a:t>
             </a:r>
             <a:r>
-              <a:rPr lang="en-US" dirty="0" smtClean="0"/>
+              <a:rPr lang="en-US" dirty="0"/>
               <a:t>, 1970)</a:t>
             </a:r>
           </a:p>
@@ -11839,7 +11559,7 @@
               <a:buChar char="•"/>
             </a:pPr>
             <a:r>
-              <a:rPr lang="en-US" dirty="0" smtClean="0"/>
+              <a:rPr lang="en-US" dirty="0"/>
               <a:t>Very stable, still basis for most RDBMS engines</a:t>
             </a:r>
           </a:p>
@@ -11849,7 +11569,7 @@
               <a:buChar char="•"/>
             </a:pPr>
             <a:r>
-              <a:rPr lang="en-US" dirty="0" smtClean="0"/>
+              <a:rPr lang="en-US" dirty="0"/>
               <a:t>SQL Server internal operators are optimized for sets</a:t>
             </a:r>
           </a:p>
@@ -11859,7 +11579,7 @@
               <a:buChar char="•"/>
             </a:pPr>
             <a:r>
-              <a:rPr lang="en-US" dirty="0" smtClean="0"/>
+              <a:rPr lang="en-US" dirty="0"/>
               <a:t>However, most code still operates row-by-row</a:t>
             </a:r>
           </a:p>
@@ -11869,7 +11589,7 @@
               <a:buChar char="•"/>
             </a:pPr>
             <a:r>
-              <a:rPr lang="en-US" dirty="0" smtClean="0"/>
+              <a:rPr lang="en-US" dirty="0"/>
               <a:t>Some newer operations run in “batch” mode</a:t>
             </a:r>
           </a:p>
@@ -11892,13 +11612,6 @@
   <p:clrMapOvr>
     <a:masterClrMapping/>
   </p:clrMapOvr>
-  <p:timing>
-    <p:tnLst>
-      <p:par>
-        <p:cTn id="1" dur="indefinite" restart="never" nodeType="tmRoot"/>
-      </p:par>
-    </p:tnLst>
-  </p:timing>
 </p:sld>
 </file>
 
@@ -11935,10 +11648,9 @@
           <a:lstStyle/>
           <a:p>
             <a:r>
-              <a:rPr lang="en-US" dirty="0" smtClean="0"/>
+              <a:rPr lang="en-US" dirty="0"/>
               <a:t>RBAR</a:t>
             </a:r>
-            <a:endParaRPr lang="en-US" dirty="0"/>
           </a:p>
         </p:txBody>
       </p:sp>
@@ -11952,46 +11664,143 @@
             <p:ph idx="1"/>
           </p:nvPr>
         </p:nvSpPr>
-        <p:spPr/>
+        <p:spPr>
+          <a:xfrm>
+            <a:off x="360125" y="5400135"/>
+            <a:ext cx="10800000" cy="719677"/>
+          </a:xfrm>
+        </p:spPr>
         <p:txBody>
           <a:bodyPr/>
           <a:lstStyle/>
           <a:p>
             <a:r>
-              <a:rPr lang="en-US" dirty="0" smtClean="0"/>
-              <a:t>ROW</a:t>
-            </a:r>
-          </a:p>
-          <a:p>
-            <a:r>
-              <a:rPr lang="en-US" dirty="0" smtClean="0"/>
-              <a:t>BY</a:t>
-            </a:r>
-          </a:p>
-          <a:p>
-            <a:r>
-              <a:rPr lang="en-US" dirty="0" smtClean="0"/>
-              <a:t>AGONIZING</a:t>
-            </a:r>
-          </a:p>
-          <a:p>
-            <a:r>
-              <a:rPr lang="en-US" dirty="0" smtClean="0"/>
-              <a:t>ROW</a:t>
-            </a:r>
-          </a:p>
-          <a:p>
-            <a:endParaRPr lang="en-US" dirty="0"/>
-          </a:p>
-          <a:p>
-            <a:r>
-              <a:rPr lang="en-US" dirty="0" smtClean="0"/>
+              <a:rPr lang="en-US" dirty="0"/>
               <a:t>Can be external or internal</a:t>
             </a:r>
-            <a:endParaRPr lang="en-US" dirty="0"/>
           </a:p>
         </p:txBody>
       </p:sp>
+      <p:pic>
+        <p:nvPicPr>
+          <p:cNvPr id="4" name="Picture 3">
+            <a:extLst>
+              <a:ext uri="{FF2B5EF4-FFF2-40B4-BE49-F238E27FC236}">
+                <a16:creationId xmlns:a16="http://schemas.microsoft.com/office/drawing/2014/main" id="{90DA072C-7926-41E0-B73D-643B0D73A159}"/>
+              </a:ext>
+            </a:extLst>
+          </p:cNvPr>
+          <p:cNvPicPr>
+            <a:picLocks noChangeAspect="1"/>
+          </p:cNvPicPr>
+          <p:nvPr/>
+        </p:nvPicPr>
+        <p:blipFill>
+          <a:blip r:embed="rId2"/>
+          <a:stretch>
+            <a:fillRect/>
+          </a:stretch>
+        </p:blipFill>
+        <p:spPr>
+          <a:xfrm>
+            <a:off x="0" y="1080363"/>
+            <a:ext cx="3271913" cy="1840451"/>
+          </a:xfrm>
+          <a:prstGeom prst="rect">
+            <a:avLst/>
+          </a:prstGeom>
+        </p:spPr>
+      </p:pic>
+      <p:pic>
+        <p:nvPicPr>
+          <p:cNvPr id="5" name="Picture 4">
+            <a:extLst>
+              <a:ext uri="{FF2B5EF4-FFF2-40B4-BE49-F238E27FC236}">
+                <a16:creationId xmlns:a16="http://schemas.microsoft.com/office/drawing/2014/main" id="{B4DA9823-AE8A-4DEE-9F72-FF82E5364AF8}"/>
+              </a:ext>
+            </a:extLst>
+          </p:cNvPr>
+          <p:cNvPicPr>
+            <a:picLocks noChangeAspect="1"/>
+          </p:cNvPicPr>
+          <p:nvPr/>
+        </p:nvPicPr>
+        <p:blipFill>
+          <a:blip r:embed="rId3"/>
+          <a:stretch>
+            <a:fillRect/>
+          </a:stretch>
+        </p:blipFill>
+        <p:spPr>
+          <a:xfrm>
+            <a:off x="4102900" y="1063109"/>
+            <a:ext cx="2075717" cy="1167591"/>
+          </a:xfrm>
+          <a:prstGeom prst="rect">
+            <a:avLst/>
+          </a:prstGeom>
+        </p:spPr>
+      </p:pic>
+      <p:pic>
+        <p:nvPicPr>
+          <p:cNvPr id="6" name="Picture 5">
+            <a:extLst>
+              <a:ext uri="{FF2B5EF4-FFF2-40B4-BE49-F238E27FC236}">
+                <a16:creationId xmlns:a16="http://schemas.microsoft.com/office/drawing/2014/main" id="{6CBAB9CC-BE18-4833-9C69-EF84E94F5264}"/>
+              </a:ext>
+            </a:extLst>
+          </p:cNvPr>
+          <p:cNvPicPr>
+            <a:picLocks noChangeAspect="1"/>
+          </p:cNvPicPr>
+          <p:nvPr/>
+        </p:nvPicPr>
+        <p:blipFill>
+          <a:blip r:embed="rId2"/>
+          <a:stretch>
+            <a:fillRect/>
+          </a:stretch>
+        </p:blipFill>
+        <p:spPr>
+          <a:xfrm>
+            <a:off x="6178617" y="3919522"/>
+            <a:ext cx="3271913" cy="1840451"/>
+          </a:xfrm>
+          <a:prstGeom prst="rect">
+            <a:avLst/>
+          </a:prstGeom>
+        </p:spPr>
+      </p:pic>
+      <p:pic>
+        <p:nvPicPr>
+          <p:cNvPr id="7" name="Picture 6">
+            <a:extLst>
+              <a:ext uri="{FF2B5EF4-FFF2-40B4-BE49-F238E27FC236}">
+                <a16:creationId xmlns:a16="http://schemas.microsoft.com/office/drawing/2014/main" id="{BFB3D48D-7586-44AA-B3A8-BA0BC32CCCDD}"/>
+              </a:ext>
+            </a:extLst>
+          </p:cNvPr>
+          <p:cNvPicPr>
+            <a:picLocks noChangeAspect="1"/>
+          </p:cNvPicPr>
+          <p:nvPr/>
+        </p:nvPicPr>
+        <p:blipFill>
+          <a:blip r:embed="rId4"/>
+          <a:stretch>
+            <a:fillRect/>
+          </a:stretch>
+        </p:blipFill>
+        <p:spPr>
+          <a:xfrm>
+            <a:off x="1228946" y="2375214"/>
+            <a:ext cx="9484654" cy="2672198"/>
+          </a:xfrm>
+          <a:prstGeom prst="rect">
+            <a:avLst/>
+          </a:prstGeom>
+        </p:spPr>
+      </p:pic>
     </p:spTree>
     <p:extLst>
       <p:ext uri="{BB962C8B-B14F-4D97-AF65-F5344CB8AC3E}">
@@ -12005,9 +11814,228 @@
   <p:timing>
     <p:tnLst>
       <p:par>
-        <p:cTn id="1" dur="indefinite" restart="never" nodeType="tmRoot"/>
+        <p:cTn id="1" dur="indefinite" restart="never" nodeType="tmRoot">
+          <p:childTnLst>
+            <p:seq concurrent="1" nextAc="seek">
+              <p:cTn id="2" dur="indefinite" nodeType="mainSeq">
+                <p:childTnLst>
+                  <p:par>
+                    <p:cTn id="3" fill="hold">
+                      <p:stCondLst>
+                        <p:cond delay="indefinite"/>
+                      </p:stCondLst>
+                      <p:childTnLst>
+                        <p:par>
+                          <p:cTn id="4" fill="hold">
+                            <p:stCondLst>
+                              <p:cond delay="0"/>
+                            </p:stCondLst>
+                            <p:childTnLst>
+                              <p:par>
+                                <p:cTn id="5" presetID="1" presetClass="entr" presetSubtype="0" fill="hold" nodeType="clickEffect">
+                                  <p:stCondLst>
+                                    <p:cond delay="0"/>
+                                  </p:stCondLst>
+                                  <p:childTnLst>
+                                    <p:set>
+                                      <p:cBhvr>
+                                        <p:cTn id="6" dur="1" fill="hold">
+                                          <p:stCondLst>
+                                            <p:cond delay="0"/>
+                                          </p:stCondLst>
+                                        </p:cTn>
+                                        <p:tgtEl>
+                                          <p:spTgt spid="4"/>
+                                        </p:tgtEl>
+                                        <p:attrNameLst>
+                                          <p:attrName>style.visibility</p:attrName>
+                                        </p:attrNameLst>
+                                      </p:cBhvr>
+                                      <p:to>
+                                        <p:strVal val="visible"/>
+                                      </p:to>
+                                    </p:set>
+                                  </p:childTnLst>
+                                </p:cTn>
+                              </p:par>
+                            </p:childTnLst>
+                          </p:cTn>
+                        </p:par>
+                        <p:par>
+                          <p:cTn id="7" fill="hold">
+                            <p:stCondLst>
+                              <p:cond delay="0"/>
+                            </p:stCondLst>
+                            <p:childTnLst>
+                              <p:par>
+                                <p:cTn id="8" presetID="1" presetClass="entr" presetSubtype="0" fill="hold" nodeType="afterEffect">
+                                  <p:stCondLst>
+                                    <p:cond delay="750"/>
+                                  </p:stCondLst>
+                                  <p:childTnLst>
+                                    <p:set>
+                                      <p:cBhvr>
+                                        <p:cTn id="9" dur="1" fill="hold">
+                                          <p:stCondLst>
+                                            <p:cond delay="0"/>
+                                          </p:stCondLst>
+                                        </p:cTn>
+                                        <p:tgtEl>
+                                          <p:spTgt spid="5"/>
+                                        </p:tgtEl>
+                                        <p:attrNameLst>
+                                          <p:attrName>style.visibility</p:attrName>
+                                        </p:attrNameLst>
+                                      </p:cBhvr>
+                                      <p:to>
+                                        <p:strVal val="visible"/>
+                                      </p:to>
+                                    </p:set>
+                                  </p:childTnLst>
+                                </p:cTn>
+                              </p:par>
+                            </p:childTnLst>
+                          </p:cTn>
+                        </p:par>
+                        <p:par>
+                          <p:cTn id="10" fill="hold">
+                            <p:stCondLst>
+                              <p:cond delay="750"/>
+                            </p:stCondLst>
+                            <p:childTnLst>
+                              <p:par>
+                                <p:cTn id="11" presetID="1" presetClass="entr" presetSubtype="0" fill="hold" nodeType="afterEffect">
+                                  <p:stCondLst>
+                                    <p:cond delay="750"/>
+                                  </p:stCondLst>
+                                  <p:childTnLst>
+                                    <p:set>
+                                      <p:cBhvr>
+                                        <p:cTn id="12" dur="1" fill="hold">
+                                          <p:stCondLst>
+                                            <p:cond delay="0"/>
+                                          </p:stCondLst>
+                                        </p:cTn>
+                                        <p:tgtEl>
+                                          <p:spTgt spid="7"/>
+                                        </p:tgtEl>
+                                        <p:attrNameLst>
+                                          <p:attrName>style.visibility</p:attrName>
+                                        </p:attrNameLst>
+                                      </p:cBhvr>
+                                      <p:to>
+                                        <p:strVal val="visible"/>
+                                      </p:to>
+                                    </p:set>
+                                  </p:childTnLst>
+                                </p:cTn>
+                              </p:par>
+                            </p:childTnLst>
+                          </p:cTn>
+                        </p:par>
+                        <p:par>
+                          <p:cTn id="13" fill="hold">
+                            <p:stCondLst>
+                              <p:cond delay="1500"/>
+                            </p:stCondLst>
+                            <p:childTnLst>
+                              <p:par>
+                                <p:cTn id="14" presetID="1" presetClass="entr" presetSubtype="0" fill="hold" nodeType="afterEffect">
+                                  <p:stCondLst>
+                                    <p:cond delay="750"/>
+                                  </p:stCondLst>
+                                  <p:childTnLst>
+                                    <p:set>
+                                      <p:cBhvr>
+                                        <p:cTn id="15" dur="1" fill="hold">
+                                          <p:stCondLst>
+                                            <p:cond delay="0"/>
+                                          </p:stCondLst>
+                                        </p:cTn>
+                                        <p:tgtEl>
+                                          <p:spTgt spid="6"/>
+                                        </p:tgtEl>
+                                        <p:attrNameLst>
+                                          <p:attrName>style.visibility</p:attrName>
+                                        </p:attrNameLst>
+                                      </p:cBhvr>
+                                      <p:to>
+                                        <p:strVal val="visible"/>
+                                      </p:to>
+                                    </p:set>
+                                  </p:childTnLst>
+                                </p:cTn>
+                              </p:par>
+                            </p:childTnLst>
+                          </p:cTn>
+                        </p:par>
+                        <p:par>
+                          <p:cTn id="16" fill="hold">
+                            <p:stCondLst>
+                              <p:cond delay="2250"/>
+                            </p:stCondLst>
+                            <p:childTnLst>
+                              <p:par>
+                                <p:cTn id="17" presetID="1" presetClass="entr" presetSubtype="0" fill="hold" grpId="0" nodeType="afterEffect">
+                                  <p:stCondLst>
+                                    <p:cond delay="750"/>
+                                  </p:stCondLst>
+                                  <p:childTnLst>
+                                    <p:set>
+                                      <p:cBhvr>
+                                        <p:cTn id="18" dur="1" fill="hold">
+                                          <p:stCondLst>
+                                            <p:cond delay="0"/>
+                                          </p:stCondLst>
+                                        </p:cTn>
+                                        <p:tgtEl>
+                                          <p:spTgt spid="3">
+                                            <p:txEl>
+                                              <p:pRg st="0" end="0"/>
+                                            </p:txEl>
+                                          </p:spTgt>
+                                        </p:tgtEl>
+                                        <p:attrNameLst>
+                                          <p:attrName>style.visibility</p:attrName>
+                                        </p:attrNameLst>
+                                      </p:cBhvr>
+                                      <p:to>
+                                        <p:strVal val="visible"/>
+                                      </p:to>
+                                    </p:set>
+                                  </p:childTnLst>
+                                </p:cTn>
+                              </p:par>
+                            </p:childTnLst>
+                          </p:cTn>
+                        </p:par>
+                      </p:childTnLst>
+                    </p:cTn>
+                  </p:par>
+                </p:childTnLst>
+              </p:cTn>
+              <p:prevCondLst>
+                <p:cond evt="onPrev" delay="0">
+                  <p:tgtEl>
+                    <p:sldTgt/>
+                  </p:tgtEl>
+                </p:cond>
+              </p:prevCondLst>
+              <p:nextCondLst>
+                <p:cond evt="onNext" delay="0">
+                  <p:tgtEl>
+                    <p:sldTgt/>
+                  </p:tgtEl>
+                </p:cond>
+              </p:nextCondLst>
+            </p:seq>
+          </p:childTnLst>
+        </p:cTn>
       </p:par>
     </p:tnLst>
+    <p:bldLst>
+      <p:bldP spid="3" grpId="0" build="p"/>
+    </p:bldLst>
   </p:timing>
 </p:sld>
 </file>
@@ -12046,13 +12074,8 @@
           <a:p>
             <a:r>
               <a:rPr lang="en-US" dirty="0"/>
-              <a:t>Test </a:t>
-            </a:r>
-            <a:r>
-              <a:rPr lang="en-US" dirty="0" smtClean="0"/>
-              <a:t>Harness (SQL)</a:t>
-            </a:r>
-            <a:endParaRPr lang="en-US" dirty="0"/>
+              <a:t>Test Harness (SQL)</a:t>
+            </a:r>
           </a:p>
         </p:txBody>
       </p:sp>
@@ -12061,7 +12084,7 @@
           <p:cNvPr id="5" name="Content Placeholder 4">
             <a:extLst>
               <a:ext uri="{FF2B5EF4-FFF2-40B4-BE49-F238E27FC236}">
-                <a16:creationId xmlns:a16="http://schemas.microsoft.com/office/drawing/2014/main" xmlns="" id="{EA577935-A7F7-4DF4-95F2-8BF0108D9ACF}"/>
+                <a16:creationId xmlns:a16="http://schemas.microsoft.com/office/drawing/2014/main" id="{EA577935-A7F7-4DF4-95F2-8BF0108D9ACF}"/>
               </a:ext>
             </a:extLst>
           </p:cNvPr>
@@ -13089,13 +13112,6 @@
   <p:clrMapOvr>
     <a:masterClrMapping/>
   </p:clrMapOvr>
-  <p:timing>
-    <p:tnLst>
-      <p:par>
-        <p:cTn id="1" dur="indefinite" restart="never" nodeType="tmRoot"/>
-      </p:par>
-    </p:tnLst>
-  </p:timing>
 </p:sld>
 </file>
 
@@ -13133,13 +13149,8 @@
           <a:p>
             <a:r>
               <a:rPr lang="en-US" dirty="0"/>
-              <a:t>Test </a:t>
-            </a:r>
-            <a:r>
-              <a:rPr lang="en-US" dirty="0" smtClean="0"/>
-              <a:t>Harness (SQL) – Results</a:t>
-            </a:r>
-            <a:endParaRPr lang="en-US" dirty="0"/>
+              <a:t>Test Harness (SQL) – Results</a:t>
+            </a:r>
           </a:p>
         </p:txBody>
       </p:sp>
@@ -13148,7 +13159,7 @@
           <p:cNvPr id="5" name="Content Placeholder 4">
             <a:extLst>
               <a:ext uri="{FF2B5EF4-FFF2-40B4-BE49-F238E27FC236}">
-                <a16:creationId xmlns:a16="http://schemas.microsoft.com/office/drawing/2014/main" xmlns="" id="{EA577935-A7F7-4DF4-95F2-8BF0108D9ACF}"/>
+                <a16:creationId xmlns:a16="http://schemas.microsoft.com/office/drawing/2014/main" id="{EA577935-A7F7-4DF4-95F2-8BF0108D9ACF}"/>
               </a:ext>
             </a:extLst>
           </p:cNvPr>
@@ -14964,7 +14975,7 @@
           </a:p>
           <a:p>
             <a:r>
-              <a:rPr lang="en-US" sz="1800" dirty="0" smtClean="0">
+              <a:rPr lang="en-US" sz="1800" dirty="0">
                 <a:solidFill>
                   <a:srgbClr val="808080"/>
                 </a:solidFill>
@@ -15180,13 +15191,6 @@
   <p:clrMapOvr>
     <a:masterClrMapping/>
   </p:clrMapOvr>
-  <p:timing>
-    <p:tnLst>
-      <p:par>
-        <p:cTn id="1" dur="indefinite" restart="never" nodeType="tmRoot"/>
-      </p:par>
-    </p:tnLst>
-  </p:timing>
 </p:sld>
 </file>
 
@@ -15224,21 +15228,16 @@
           <a:p>
             <a:r>
               <a:rPr lang="en-US" dirty="0"/>
-              <a:t>Test </a:t>
-            </a:r>
-            <a:r>
-              <a:rPr lang="en-US" dirty="0" smtClean="0"/>
-              <a:t>Harness (C</a:t>
-            </a:r>
-            <a:r>
-              <a:rPr lang="en-US" baseline="30000" dirty="0" smtClean="0"/>
+              <a:t>Test Harness (C</a:t>
+            </a:r>
+            <a:r>
+              <a:rPr lang="en-US" baseline="30000" dirty="0"/>
               <a:t>#</a:t>
             </a:r>
             <a:r>
-              <a:rPr lang="en-US" dirty="0" smtClean="0"/>
+              <a:rPr lang="en-US" dirty="0"/>
               <a:t>)</a:t>
             </a:r>
-            <a:endParaRPr lang="en-US" dirty="0"/>
           </a:p>
         </p:txBody>
       </p:sp>
@@ -15247,7 +15246,7 @@
           <p:cNvPr id="5" name="Content Placeholder 4">
             <a:extLst>
               <a:ext uri="{FF2B5EF4-FFF2-40B4-BE49-F238E27FC236}">
-                <a16:creationId xmlns:a16="http://schemas.microsoft.com/office/drawing/2014/main" xmlns="" id="{EA577935-A7F7-4DF4-95F2-8BF0108D9ACF}"/>
+                <a16:creationId xmlns:a16="http://schemas.microsoft.com/office/drawing/2014/main" id="{EA577935-A7F7-4DF4-95F2-8BF0108D9ACF}"/>
               </a:ext>
             </a:extLst>
           </p:cNvPr>
@@ -15767,13 +15766,6 @@
   <p:clrMapOvr>
     <a:masterClrMapping/>
   </p:clrMapOvr>
-  <p:timing>
-    <p:tnLst>
-      <p:par>
-        <p:cTn id="1" dur="indefinite" restart="never" nodeType="tmRoot"/>
-      </p:par>
-    </p:tnLst>
-  </p:timing>
 </p:sld>
 </file>
 
@@ -15810,10 +15802,9 @@
           <a:lstStyle/>
           <a:p>
             <a:r>
-              <a:rPr lang="en-US" dirty="0" smtClean="0"/>
+              <a:rPr lang="en-US" dirty="0"/>
               <a:t>Cursors and Loops</a:t>
             </a:r>
-            <a:endParaRPr lang="en-US" dirty="0"/>
           </a:p>
         </p:txBody>
       </p:sp>
@@ -15837,7 +15828,7 @@
               <a:buChar char="•"/>
             </a:pPr>
             <a:r>
-              <a:rPr lang="en-US" dirty="0" smtClean="0"/>
+              <a:rPr lang="en-US" dirty="0"/>
               <a:t>Cursors – heavyweight objects</a:t>
             </a:r>
           </a:p>
@@ -15847,7 +15838,7 @@
               <a:buChar char="•"/>
             </a:pPr>
             <a:r>
-              <a:rPr lang="en-US" dirty="0" smtClean="0"/>
+              <a:rPr lang="en-US" dirty="0"/>
               <a:t>Many infrequently used features enabled by default</a:t>
             </a:r>
           </a:p>
@@ -15857,7 +15848,7 @@
               <a:buChar char="•"/>
             </a:pPr>
             <a:r>
-              <a:rPr lang="en-US" dirty="0" smtClean="0"/>
+              <a:rPr lang="en-US" dirty="0"/>
               <a:t>If necessary, declare as </a:t>
             </a:r>
             <a:r>
@@ -15896,7 +15887,7 @@
               </a:rPr>
               <a:t>read_only</a:t>
             </a:r>
-            <a:endParaRPr lang="en-US" dirty="0" smtClean="0"/>
+            <a:endParaRPr lang="en-US" dirty="0"/>
           </a:p>
           <a:p>
             <a:pPr marL="571500" indent="-571500">
@@ -15904,7 +15895,7 @@
               <a:buChar char="•"/>
             </a:pPr>
             <a:r>
-              <a:rPr lang="en-US" dirty="0" smtClean="0"/>
+              <a:rPr lang="en-US" dirty="0"/>
               <a:t>WHILE loops</a:t>
             </a:r>
           </a:p>
@@ -15914,7 +15905,7 @@
               <a:buChar char="•"/>
             </a:pPr>
             <a:r>
-              <a:rPr lang="en-US" dirty="0" smtClean="0"/>
+              <a:rPr lang="en-US" dirty="0"/>
               <a:t>More lightweight</a:t>
             </a:r>
           </a:p>
@@ -15924,18 +15915,9 @@
               <a:buChar char="•"/>
             </a:pPr>
             <a:r>
-              <a:rPr lang="en-US" dirty="0" smtClean="0"/>
-              <a:t>However, still tend be slow (compared to procedural </a:t>
-            </a:r>
-            <a:r>
-              <a:rPr lang="en-US" dirty="0" err="1" smtClean="0"/>
-              <a:t>languanges</a:t>
-            </a:r>
-            <a:r>
-              <a:rPr lang="en-US" dirty="0" smtClean="0"/>
-              <a:t>)</a:t>
-            </a:r>
-            <a:endParaRPr lang="en-US" dirty="0"/>
+              <a:rPr lang="en-US" dirty="0"/>
+              <a:t>However, still tend be slow (compared to procedural languages)</a:t>
+            </a:r>
           </a:p>
         </p:txBody>
       </p:sp>
@@ -15949,13 +15931,6 @@
   <p:clrMapOvr>
     <a:masterClrMapping/>
   </p:clrMapOvr>
-  <p:timing>
-    <p:tnLst>
-      <p:par>
-        <p:cTn id="1" dur="indefinite" restart="never" nodeType="tmRoot"/>
-      </p:par>
-    </p:tnLst>
-  </p:timing>
 </p:sld>
 </file>
 

</xml_diff>

<commit_message>
Change font color on final slide.
</commit_message>
<xml_diff>
--- a/HowToThinkInSets.pptx
+++ b/HowToThinkInSets.pptx
@@ -239,7 +239,7 @@
           <a:p>
             <a:fld id="{3CD51548-82AA-4A2B-B152-1D3266E0F652}" type="datetimeFigureOut">
               <a:rPr lang="en-US" smtClean="0"/>
-              <a:t>7/26/2017</a:t>
+              <a:t>07/27/2017</a:t>
             </a:fld>
             <a:endParaRPr lang="en-US"/>
           </a:p>
@@ -2306,7 +2306,7 @@
           <a:graphicData uri="http://schemas.openxmlformats.org/presentationml/2006/ole">
             <mc:AlternateContent xmlns:mc="http://schemas.openxmlformats.org/markup-compatibility/2006">
               <mc:Choice xmlns:v="urn:schemas-microsoft-com:vml" Requires="v">
-                <p:oleObj spid="_x0000_s1076" name="Image" r:id="rId10" imgW="2279520" imgH="1310400" progId="Photoshop.Image.18">
+                <p:oleObj spid="_x0000_s1077" name="Image" r:id="rId10" imgW="2279520" imgH="1310400" progId="Photoshop.Image.18">
                   <p:embed/>
                 </p:oleObj>
               </mc:Choice>
@@ -2728,7 +2728,7 @@
           <p:cNvPr id="4" name="TextBox 3">
             <a:extLst>
               <a:ext uri="{FF2B5EF4-FFF2-40B4-BE49-F238E27FC236}">
-                <a16:creationId xmlns:a16="http://schemas.microsoft.com/office/drawing/2014/main" id="{4E95CA58-BC71-4CE1-ACB0-4410970492E6}"/>
+                <a16:creationId xmlns:a16="http://schemas.microsoft.com/office/drawing/2014/main" xmlns="" id="{4E95CA58-BC71-4CE1-ACB0-4410970492E6}"/>
               </a:ext>
             </a:extLst>
           </p:cNvPr>
@@ -2783,6 +2783,13 @@
   <p:clrMapOvr>
     <a:masterClrMapping/>
   </p:clrMapOvr>
+  <p:timing>
+    <p:tnLst>
+      <p:par>
+        <p:cTn id="1" dur="indefinite" restart="never" nodeType="tmRoot"/>
+      </p:par>
+    </p:tnLst>
+  </p:timing>
 </p:sld>
 </file>
 
@@ -2808,7 +2815,7 @@
           <p:cNvPr id="2" name="Title 1">
             <a:extLst>
               <a:ext uri="{FF2B5EF4-FFF2-40B4-BE49-F238E27FC236}">
-                <a16:creationId xmlns:a16="http://schemas.microsoft.com/office/drawing/2014/main" id="{FEF5F440-7918-4A6B-9C7C-C25F5B4AB5DD}"/>
+                <a16:creationId xmlns:a16="http://schemas.microsoft.com/office/drawing/2014/main" xmlns="" id="{FEF5F440-7918-4A6B-9C7C-C25F5B4AB5DD}"/>
               </a:ext>
             </a:extLst>
           </p:cNvPr>
@@ -2836,7 +2843,7 @@
           <p:cNvPr id="3" name="Content Placeholder 2">
             <a:extLst>
               <a:ext uri="{FF2B5EF4-FFF2-40B4-BE49-F238E27FC236}">
-                <a16:creationId xmlns:a16="http://schemas.microsoft.com/office/drawing/2014/main" id="{9E20F2C1-4D76-4D3B-8502-4FA0575D48CD}"/>
+                <a16:creationId xmlns:a16="http://schemas.microsoft.com/office/drawing/2014/main" xmlns="" id="{9E20F2C1-4D76-4D3B-8502-4FA0575D48CD}"/>
               </a:ext>
             </a:extLst>
           </p:cNvPr>
@@ -2864,7 +2871,7 @@
           <p:cNvPr id="4" name="Picture 3">
             <a:extLst>
               <a:ext uri="{FF2B5EF4-FFF2-40B4-BE49-F238E27FC236}">
-                <a16:creationId xmlns:a16="http://schemas.microsoft.com/office/drawing/2014/main" id="{91F19CE3-C79C-4B4E-9DFB-953E12007E9A}"/>
+                <a16:creationId xmlns:a16="http://schemas.microsoft.com/office/drawing/2014/main" xmlns="" id="{91F19CE3-C79C-4B4E-9DFB-953E12007E9A}"/>
               </a:ext>
             </a:extLst>
           </p:cNvPr>
@@ -2899,6 +2906,13 @@
   <p:clrMapOvr>
     <a:masterClrMapping/>
   </p:clrMapOvr>
+  <p:timing>
+    <p:tnLst>
+      <p:par>
+        <p:cTn id="1" dur="indefinite" restart="never" nodeType="tmRoot"/>
+      </p:par>
+    </p:tnLst>
+  </p:timing>
 </p:sld>
 </file>
 
@@ -4685,6 +4699,13 @@
   <p:clrMapOvr>
     <a:masterClrMapping/>
   </p:clrMapOvr>
+  <p:timing>
+    <p:tnLst>
+      <p:par>
+        <p:cTn id="1" dur="indefinite" restart="never" nodeType="tmRoot"/>
+      </p:par>
+    </p:tnLst>
+  </p:timing>
 </p:sld>
 </file>
 
@@ -4710,7 +4731,7 @@
           <p:cNvPr id="2" name="Title 1">
             <a:extLst>
               <a:ext uri="{FF2B5EF4-FFF2-40B4-BE49-F238E27FC236}">
-                <a16:creationId xmlns:a16="http://schemas.microsoft.com/office/drawing/2014/main" id="{FEF5F440-7918-4A6B-9C7C-C25F5B4AB5DD}"/>
+                <a16:creationId xmlns:a16="http://schemas.microsoft.com/office/drawing/2014/main" xmlns="" id="{FEF5F440-7918-4A6B-9C7C-C25F5B4AB5DD}"/>
               </a:ext>
             </a:extLst>
           </p:cNvPr>
@@ -4738,7 +4759,7 @@
           <p:cNvPr id="3" name="Content Placeholder 2">
             <a:extLst>
               <a:ext uri="{FF2B5EF4-FFF2-40B4-BE49-F238E27FC236}">
-                <a16:creationId xmlns:a16="http://schemas.microsoft.com/office/drawing/2014/main" id="{9E20F2C1-4D76-4D3B-8502-4FA0575D48CD}"/>
+                <a16:creationId xmlns:a16="http://schemas.microsoft.com/office/drawing/2014/main" xmlns="" id="{9E20F2C1-4D76-4D3B-8502-4FA0575D48CD}"/>
               </a:ext>
             </a:extLst>
           </p:cNvPr>
@@ -4766,7 +4787,7 @@
           <p:cNvPr id="4" name="Picture 3">
             <a:extLst>
               <a:ext uri="{FF2B5EF4-FFF2-40B4-BE49-F238E27FC236}">
-                <a16:creationId xmlns:a16="http://schemas.microsoft.com/office/drawing/2014/main" id="{91F19CE3-C79C-4B4E-9DFB-953E12007E9A}"/>
+                <a16:creationId xmlns:a16="http://schemas.microsoft.com/office/drawing/2014/main" xmlns="" id="{91F19CE3-C79C-4B4E-9DFB-953E12007E9A}"/>
               </a:ext>
             </a:extLst>
           </p:cNvPr>
@@ -4801,6 +4822,13 @@
   <p:clrMapOvr>
     <a:masterClrMapping/>
   </p:clrMapOvr>
+  <p:timing>
+    <p:tnLst>
+      <p:par>
+        <p:cTn id="1" dur="indefinite" restart="never" nodeType="tmRoot"/>
+      </p:par>
+    </p:tnLst>
+  </p:timing>
 </p:sld>
 </file>
 
@@ -5272,6 +5300,13 @@
   <p:clrMapOvr>
     <a:masterClrMapping/>
   </p:clrMapOvr>
+  <p:timing>
+    <p:tnLst>
+      <p:par>
+        <p:cTn id="1" dur="indefinite" restart="never" nodeType="tmRoot"/>
+      </p:par>
+    </p:tnLst>
+  </p:timing>
 </p:sld>
 </file>
 
@@ -5297,7 +5332,7 @@
           <p:cNvPr id="2" name="Title 1">
             <a:extLst>
               <a:ext uri="{FF2B5EF4-FFF2-40B4-BE49-F238E27FC236}">
-                <a16:creationId xmlns:a16="http://schemas.microsoft.com/office/drawing/2014/main" id="{FEF5F440-7918-4A6B-9C7C-C25F5B4AB5DD}"/>
+                <a16:creationId xmlns:a16="http://schemas.microsoft.com/office/drawing/2014/main" xmlns="" id="{FEF5F440-7918-4A6B-9C7C-C25F5B4AB5DD}"/>
               </a:ext>
             </a:extLst>
           </p:cNvPr>
@@ -5325,7 +5360,7 @@
           <p:cNvPr id="3" name="Content Placeholder 2">
             <a:extLst>
               <a:ext uri="{FF2B5EF4-FFF2-40B4-BE49-F238E27FC236}">
-                <a16:creationId xmlns:a16="http://schemas.microsoft.com/office/drawing/2014/main" id="{9E20F2C1-4D76-4D3B-8502-4FA0575D48CD}"/>
+                <a16:creationId xmlns:a16="http://schemas.microsoft.com/office/drawing/2014/main" xmlns="" id="{9E20F2C1-4D76-4D3B-8502-4FA0575D48CD}"/>
               </a:ext>
             </a:extLst>
           </p:cNvPr>
@@ -5353,7 +5388,7 @@
           <p:cNvPr id="4" name="Picture 3">
             <a:extLst>
               <a:ext uri="{FF2B5EF4-FFF2-40B4-BE49-F238E27FC236}">
-                <a16:creationId xmlns:a16="http://schemas.microsoft.com/office/drawing/2014/main" id="{91F19CE3-C79C-4B4E-9DFB-953E12007E9A}"/>
+                <a16:creationId xmlns:a16="http://schemas.microsoft.com/office/drawing/2014/main" xmlns="" id="{91F19CE3-C79C-4B4E-9DFB-953E12007E9A}"/>
               </a:ext>
             </a:extLst>
           </p:cNvPr>
@@ -5388,6 +5423,13 @@
   <p:clrMapOvr>
     <a:masterClrMapping/>
   </p:clrMapOvr>
+  <p:timing>
+    <p:tnLst>
+      <p:par>
+        <p:cTn id="1" dur="indefinite" restart="never" nodeType="tmRoot"/>
+      </p:par>
+    </p:tnLst>
+  </p:timing>
 </p:sld>
 </file>
 
@@ -7120,6 +7162,13 @@
   <p:clrMapOvr>
     <a:masterClrMapping/>
   </p:clrMapOvr>
+  <p:timing>
+    <p:tnLst>
+      <p:par>
+        <p:cTn id="1" dur="indefinite" restart="never" nodeType="tmRoot"/>
+      </p:par>
+    </p:tnLst>
+  </p:timing>
 </p:sld>
 </file>
 
@@ -7145,7 +7194,7 @@
           <p:cNvPr id="2" name="Title 1">
             <a:extLst>
               <a:ext uri="{FF2B5EF4-FFF2-40B4-BE49-F238E27FC236}">
-                <a16:creationId xmlns:a16="http://schemas.microsoft.com/office/drawing/2014/main" id="{FEF5F440-7918-4A6B-9C7C-C25F5B4AB5DD}"/>
+                <a16:creationId xmlns:a16="http://schemas.microsoft.com/office/drawing/2014/main" xmlns="" id="{FEF5F440-7918-4A6B-9C7C-C25F5B4AB5DD}"/>
               </a:ext>
             </a:extLst>
           </p:cNvPr>
@@ -7173,7 +7222,7 @@
           <p:cNvPr id="3" name="Content Placeholder 2">
             <a:extLst>
               <a:ext uri="{FF2B5EF4-FFF2-40B4-BE49-F238E27FC236}">
-                <a16:creationId xmlns:a16="http://schemas.microsoft.com/office/drawing/2014/main" id="{9E20F2C1-4D76-4D3B-8502-4FA0575D48CD}"/>
+                <a16:creationId xmlns:a16="http://schemas.microsoft.com/office/drawing/2014/main" xmlns="" id="{9E20F2C1-4D76-4D3B-8502-4FA0575D48CD}"/>
               </a:ext>
             </a:extLst>
           </p:cNvPr>
@@ -7201,7 +7250,7 @@
           <p:cNvPr id="4" name="Picture 3">
             <a:extLst>
               <a:ext uri="{FF2B5EF4-FFF2-40B4-BE49-F238E27FC236}">
-                <a16:creationId xmlns:a16="http://schemas.microsoft.com/office/drawing/2014/main" id="{91F19CE3-C79C-4B4E-9DFB-953E12007E9A}"/>
+                <a16:creationId xmlns:a16="http://schemas.microsoft.com/office/drawing/2014/main" xmlns="" id="{91F19CE3-C79C-4B4E-9DFB-953E12007E9A}"/>
               </a:ext>
             </a:extLst>
           </p:cNvPr>
@@ -7236,6 +7285,13 @@
   <p:clrMapOvr>
     <a:masterClrMapping/>
   </p:clrMapOvr>
+  <p:timing>
+    <p:tnLst>
+      <p:par>
+        <p:cTn id="1" dur="indefinite" restart="never" nodeType="tmRoot"/>
+      </p:par>
+    </p:tnLst>
+  </p:timing>
 </p:sld>
 </file>
 
@@ -7312,6 +7368,13 @@
   <p:clrMapOvr>
     <a:masterClrMapping/>
   </p:clrMapOvr>
+  <p:timing>
+    <p:tnLst>
+      <p:par>
+        <p:cTn id="1" dur="indefinite" restart="never" nodeType="tmRoot"/>
+      </p:par>
+    </p:tnLst>
+  </p:timing>
 </p:sld>
 </file>
 
@@ -8344,6 +8407,13 @@
   <p:clrMapOvr>
     <a:masterClrMapping/>
   </p:clrMapOvr>
+  <p:timing>
+    <p:tnLst>
+      <p:par>
+        <p:cTn id="1" dur="indefinite" restart="never" nodeType="tmRoot"/>
+      </p:par>
+    </p:tnLst>
+  </p:timing>
 </p:sld>
 </file>
 
@@ -8420,6 +8490,13 @@
   <p:clrMapOvr>
     <a:masterClrMapping/>
   </p:clrMapOvr>
+  <p:timing>
+    <p:tnLst>
+      <p:par>
+        <p:cTn id="1" dur="indefinite" restart="never" nodeType="tmRoot"/>
+      </p:par>
+    </p:tnLst>
+  </p:timing>
 </p:sld>
 </file>
 
@@ -8445,7 +8522,7 @@
           <p:cNvPr id="2" name="Title 1">
             <a:extLst>
               <a:ext uri="{FF2B5EF4-FFF2-40B4-BE49-F238E27FC236}">
-                <a16:creationId xmlns:a16="http://schemas.microsoft.com/office/drawing/2014/main" id="{FEF5F440-7918-4A6B-9C7C-C25F5B4AB5DD}"/>
+                <a16:creationId xmlns:a16="http://schemas.microsoft.com/office/drawing/2014/main" xmlns="" id="{FEF5F440-7918-4A6B-9C7C-C25F5B4AB5DD}"/>
               </a:ext>
             </a:extLst>
           </p:cNvPr>
@@ -8473,7 +8550,7 @@
           <p:cNvPr id="3" name="Content Placeholder 2">
             <a:extLst>
               <a:ext uri="{FF2B5EF4-FFF2-40B4-BE49-F238E27FC236}">
-                <a16:creationId xmlns:a16="http://schemas.microsoft.com/office/drawing/2014/main" id="{9E20F2C1-4D76-4D3B-8502-4FA0575D48CD}"/>
+                <a16:creationId xmlns:a16="http://schemas.microsoft.com/office/drawing/2014/main" xmlns="" id="{9E20F2C1-4D76-4D3B-8502-4FA0575D48CD}"/>
               </a:ext>
             </a:extLst>
           </p:cNvPr>
@@ -8501,7 +8578,7 @@
           <p:cNvPr id="4" name="Picture 3">
             <a:extLst>
               <a:ext uri="{FF2B5EF4-FFF2-40B4-BE49-F238E27FC236}">
-                <a16:creationId xmlns:a16="http://schemas.microsoft.com/office/drawing/2014/main" id="{91F19CE3-C79C-4B4E-9DFB-953E12007E9A}"/>
+                <a16:creationId xmlns:a16="http://schemas.microsoft.com/office/drawing/2014/main" xmlns="" id="{91F19CE3-C79C-4B4E-9DFB-953E12007E9A}"/>
               </a:ext>
             </a:extLst>
           </p:cNvPr>
@@ -8536,6 +8613,13 @@
   <p:clrMapOvr>
     <a:masterClrMapping/>
   </p:clrMapOvr>
+  <p:timing>
+    <p:tnLst>
+      <p:par>
+        <p:cTn id="1" dur="indefinite" restart="never" nodeType="tmRoot"/>
+      </p:par>
+    </p:tnLst>
+  </p:timing>
 </p:sld>
 </file>
 
@@ -9683,6 +9767,13 @@
   <p:clrMapOvr>
     <a:masterClrMapping/>
   </p:clrMapOvr>
+  <p:timing>
+    <p:tnLst>
+      <p:par>
+        <p:cTn id="1" dur="indefinite" restart="never" nodeType="tmRoot"/>
+      </p:par>
+    </p:tnLst>
+  </p:timing>
 </p:sld>
 </file>
 
@@ -10665,6 +10756,13 @@
   <p:clrMapOvr>
     <a:masterClrMapping/>
   </p:clrMapOvr>
+  <p:timing>
+    <p:tnLst>
+      <p:par>
+        <p:cTn id="1" dur="indefinite" restart="never" nodeType="tmRoot"/>
+      </p:par>
+    </p:tnLst>
+  </p:timing>
 </p:sld>
 </file>
 
@@ -10690,7 +10788,7 @@
           <p:cNvPr id="2" name="Title 1">
             <a:extLst>
               <a:ext uri="{FF2B5EF4-FFF2-40B4-BE49-F238E27FC236}">
-                <a16:creationId xmlns:a16="http://schemas.microsoft.com/office/drawing/2014/main" id="{FEF5F440-7918-4A6B-9C7C-C25F5B4AB5DD}"/>
+                <a16:creationId xmlns:a16="http://schemas.microsoft.com/office/drawing/2014/main" xmlns="" id="{FEF5F440-7918-4A6B-9C7C-C25F5B4AB5DD}"/>
               </a:ext>
             </a:extLst>
           </p:cNvPr>
@@ -10718,7 +10816,7 @@
           <p:cNvPr id="3" name="Content Placeholder 2">
             <a:extLst>
               <a:ext uri="{FF2B5EF4-FFF2-40B4-BE49-F238E27FC236}">
-                <a16:creationId xmlns:a16="http://schemas.microsoft.com/office/drawing/2014/main" id="{9E20F2C1-4D76-4D3B-8502-4FA0575D48CD}"/>
+                <a16:creationId xmlns:a16="http://schemas.microsoft.com/office/drawing/2014/main" xmlns="" id="{9E20F2C1-4D76-4D3B-8502-4FA0575D48CD}"/>
               </a:ext>
             </a:extLst>
           </p:cNvPr>
@@ -10746,7 +10844,7 @@
           <p:cNvPr id="4" name="Picture 3">
             <a:extLst>
               <a:ext uri="{FF2B5EF4-FFF2-40B4-BE49-F238E27FC236}">
-                <a16:creationId xmlns:a16="http://schemas.microsoft.com/office/drawing/2014/main" id="{91F19CE3-C79C-4B4E-9DFB-953E12007E9A}"/>
+                <a16:creationId xmlns:a16="http://schemas.microsoft.com/office/drawing/2014/main" xmlns="" id="{91F19CE3-C79C-4B4E-9DFB-953E12007E9A}"/>
               </a:ext>
             </a:extLst>
           </p:cNvPr>
@@ -10781,6 +10879,13 @@
   <p:clrMapOvr>
     <a:masterClrMapping/>
   </p:clrMapOvr>
+  <p:timing>
+    <p:tnLst>
+      <p:par>
+        <p:cTn id="1" dur="indefinite" restart="never" nodeType="tmRoot"/>
+      </p:par>
+    </p:tnLst>
+  </p:timing>
 </p:sld>
 </file>
 
@@ -10948,6 +11053,13 @@
   <p:clrMapOvr>
     <a:masterClrMapping/>
   </p:clrMapOvr>
+  <p:timing>
+    <p:tnLst>
+      <p:par>
+        <p:cTn id="1" dur="indefinite" restart="never" nodeType="tmRoot"/>
+      </p:par>
+    </p:tnLst>
+  </p:timing>
 </p:sld>
 </file>
 
@@ -11061,6 +11173,13 @@
   <p:clrMapOvr>
     <a:masterClrMapping/>
   </p:clrMapOvr>
+  <p:timing>
+    <p:tnLst>
+      <p:par>
+        <p:cTn id="1" dur="indefinite" restart="never" nodeType="tmRoot"/>
+      </p:par>
+    </p:tnLst>
+  </p:timing>
 </p:sld>
 </file>
 
@@ -11226,6 +11345,13 @@
   <p:clrMapOvr>
     <a:masterClrMapping/>
   </p:clrMapOvr>
+  <p:timing>
+    <p:tnLst>
+      <p:par>
+        <p:cTn id="1" dur="indefinite" restart="never" nodeType="tmRoot"/>
+      </p:par>
+    </p:tnLst>
+  </p:timing>
 </p:sld>
 </file>
 
@@ -11333,10 +11459,7 @@
             <a:r>
               <a:rPr lang="en-US" dirty="0">
                 <a:solidFill>
-                  <a:schemeClr val="accent1">
-                    <a:lumMod val="60000"/>
-                    <a:lumOff val="40000"/>
-                  </a:schemeClr>
+                  <a:schemeClr val="tx1"/>
                 </a:solidFill>
               </a:rPr>
               <a:t>brian@tf3604.com	• @tf3604</a:t>
@@ -11354,6 +11477,13 @@
   <p:clrMapOvr>
     <a:masterClrMapping/>
   </p:clrMapOvr>
+  <p:timing>
+    <p:tnLst>
+      <p:par>
+        <p:cTn id="1" dur="indefinite" restart="never" nodeType="tmRoot"/>
+      </p:par>
+    </p:tnLst>
+  </p:timing>
 </p:sld>
 </file>
 
@@ -11452,6 +11582,14 @@
   <p:clrMapOvr>
     <a:masterClrMapping/>
   </p:clrMapOvr>
+  <mc:AlternateContent xmlns:mc="http://schemas.openxmlformats.org/markup-compatibility/2006">
+    <mc:Choice xmlns:p14="http://schemas.microsoft.com/office/powerpoint/2010/main" Requires="p14">
+      <p:transition spd="slow" p14:dur="2000"/>
+    </mc:Choice>
+    <mc:Fallback>
+      <p:transition spd="slow"/>
+    </mc:Fallback>
+  </mc:AlternateContent>
 </p:sld>
 </file>
 
@@ -11612,6 +11750,13 @@
   <p:clrMapOvr>
     <a:masterClrMapping/>
   </p:clrMapOvr>
+  <p:timing>
+    <p:tnLst>
+      <p:par>
+        <p:cTn id="1" dur="indefinite" restart="never" nodeType="tmRoot"/>
+      </p:par>
+    </p:tnLst>
+  </p:timing>
 </p:sld>
 </file>
 
@@ -11686,7 +11831,7 @@
           <p:cNvPr id="4" name="Picture 3">
             <a:extLst>
               <a:ext uri="{FF2B5EF4-FFF2-40B4-BE49-F238E27FC236}">
-                <a16:creationId xmlns:a16="http://schemas.microsoft.com/office/drawing/2014/main" id="{90DA072C-7926-41E0-B73D-643B0D73A159}"/>
+                <a16:creationId xmlns:a16="http://schemas.microsoft.com/office/drawing/2014/main" xmlns="" id="{90DA072C-7926-41E0-B73D-643B0D73A159}"/>
               </a:ext>
             </a:extLst>
           </p:cNvPr>
@@ -11716,7 +11861,7 @@
           <p:cNvPr id="5" name="Picture 4">
             <a:extLst>
               <a:ext uri="{FF2B5EF4-FFF2-40B4-BE49-F238E27FC236}">
-                <a16:creationId xmlns:a16="http://schemas.microsoft.com/office/drawing/2014/main" id="{B4DA9823-AE8A-4DEE-9F72-FF82E5364AF8}"/>
+                <a16:creationId xmlns:a16="http://schemas.microsoft.com/office/drawing/2014/main" xmlns="" id="{B4DA9823-AE8A-4DEE-9F72-FF82E5364AF8}"/>
               </a:ext>
             </a:extLst>
           </p:cNvPr>
@@ -11746,7 +11891,7 @@
           <p:cNvPr id="6" name="Picture 5">
             <a:extLst>
               <a:ext uri="{FF2B5EF4-FFF2-40B4-BE49-F238E27FC236}">
-                <a16:creationId xmlns:a16="http://schemas.microsoft.com/office/drawing/2014/main" id="{6CBAB9CC-BE18-4833-9C69-EF84E94F5264}"/>
+                <a16:creationId xmlns:a16="http://schemas.microsoft.com/office/drawing/2014/main" xmlns="" id="{6CBAB9CC-BE18-4833-9C69-EF84E94F5264}"/>
               </a:ext>
             </a:extLst>
           </p:cNvPr>
@@ -11776,7 +11921,7 @@
           <p:cNvPr id="7" name="Picture 6">
             <a:extLst>
               <a:ext uri="{FF2B5EF4-FFF2-40B4-BE49-F238E27FC236}">
-                <a16:creationId xmlns:a16="http://schemas.microsoft.com/office/drawing/2014/main" id="{BFB3D48D-7586-44AA-B3A8-BA0BC32CCCDD}"/>
+                <a16:creationId xmlns:a16="http://schemas.microsoft.com/office/drawing/2014/main" xmlns="" id="{BFB3D48D-7586-44AA-B3A8-BA0BC32CCCDD}"/>
               </a:ext>
             </a:extLst>
           </p:cNvPr>
@@ -12084,7 +12229,7 @@
           <p:cNvPr id="5" name="Content Placeholder 4">
             <a:extLst>
               <a:ext uri="{FF2B5EF4-FFF2-40B4-BE49-F238E27FC236}">
-                <a16:creationId xmlns:a16="http://schemas.microsoft.com/office/drawing/2014/main" id="{EA577935-A7F7-4DF4-95F2-8BF0108D9ACF}"/>
+                <a16:creationId xmlns:a16="http://schemas.microsoft.com/office/drawing/2014/main" xmlns="" id="{EA577935-A7F7-4DF4-95F2-8BF0108D9ACF}"/>
               </a:ext>
             </a:extLst>
           </p:cNvPr>
@@ -13112,6 +13257,13 @@
   <p:clrMapOvr>
     <a:masterClrMapping/>
   </p:clrMapOvr>
+  <p:timing>
+    <p:tnLst>
+      <p:par>
+        <p:cTn id="1" dur="indefinite" restart="never" nodeType="tmRoot"/>
+      </p:par>
+    </p:tnLst>
+  </p:timing>
 </p:sld>
 </file>
 
@@ -13159,7 +13311,7 @@
           <p:cNvPr id="5" name="Content Placeholder 4">
             <a:extLst>
               <a:ext uri="{FF2B5EF4-FFF2-40B4-BE49-F238E27FC236}">
-                <a16:creationId xmlns:a16="http://schemas.microsoft.com/office/drawing/2014/main" id="{EA577935-A7F7-4DF4-95F2-8BF0108D9ACF}"/>
+                <a16:creationId xmlns:a16="http://schemas.microsoft.com/office/drawing/2014/main" xmlns="" id="{EA577935-A7F7-4DF4-95F2-8BF0108D9ACF}"/>
               </a:ext>
             </a:extLst>
           </p:cNvPr>
@@ -15191,6 +15343,13 @@
   <p:clrMapOvr>
     <a:masterClrMapping/>
   </p:clrMapOvr>
+  <p:timing>
+    <p:tnLst>
+      <p:par>
+        <p:cTn id="1" dur="indefinite" restart="never" nodeType="tmRoot"/>
+      </p:par>
+    </p:tnLst>
+  </p:timing>
 </p:sld>
 </file>
 
@@ -15246,7 +15405,7 @@
           <p:cNvPr id="5" name="Content Placeholder 4">
             <a:extLst>
               <a:ext uri="{FF2B5EF4-FFF2-40B4-BE49-F238E27FC236}">
-                <a16:creationId xmlns:a16="http://schemas.microsoft.com/office/drawing/2014/main" id="{EA577935-A7F7-4DF4-95F2-8BF0108D9ACF}"/>
+                <a16:creationId xmlns:a16="http://schemas.microsoft.com/office/drawing/2014/main" xmlns="" id="{EA577935-A7F7-4DF4-95F2-8BF0108D9ACF}"/>
               </a:ext>
             </a:extLst>
           </p:cNvPr>
@@ -15766,6 +15925,13 @@
   <p:clrMapOvr>
     <a:masterClrMapping/>
   </p:clrMapOvr>
+  <p:timing>
+    <p:tnLst>
+      <p:par>
+        <p:cTn id="1" dur="indefinite" restart="never" nodeType="tmRoot"/>
+      </p:par>
+    </p:tnLst>
+  </p:timing>
 </p:sld>
 </file>
 
@@ -15931,6 +16097,13 @@
   <p:clrMapOvr>
     <a:masterClrMapping/>
   </p:clrMapOvr>
+  <p:timing>
+    <p:tnLst>
+      <p:par>
+        <p:cTn id="1" dur="indefinite" restart="never" nodeType="tmRoot"/>
+      </p:par>
+    </p:tnLst>
+  </p:timing>
 </p:sld>
 </file>
 

</xml_diff>

<commit_message>
Add slide on why we might break up realy large sets.
</commit_message>
<xml_diff>
--- a/HowToThinkInSets.pptx
+++ b/HowToThinkInSets.pptx
@@ -5,7 +5,7 @@
     <p:sldMasterId id="2147483648" r:id="rId1"/>
   </p:sldMasterIdLst>
   <p:notesMasterIdLst>
-    <p:notesMasterId r:id="rId30"/>
+    <p:notesMasterId r:id="rId31"/>
   </p:notesMasterIdLst>
   <p:sldIdLst>
     <p:sldId id="263" r:id="rId2"/>
@@ -32,10 +32,11 @@
     <p:sldId id="280" r:id="rId23"/>
     <p:sldId id="281" r:id="rId24"/>
     <p:sldId id="282" r:id="rId25"/>
-    <p:sldId id="275" r:id="rId26"/>
-    <p:sldId id="277" r:id="rId27"/>
-    <p:sldId id="276" r:id="rId28"/>
-    <p:sldId id="267" r:id="rId29"/>
+    <p:sldId id="295" r:id="rId26"/>
+    <p:sldId id="275" r:id="rId27"/>
+    <p:sldId id="277" r:id="rId28"/>
+    <p:sldId id="276" r:id="rId29"/>
+    <p:sldId id="267" r:id="rId30"/>
   </p:sldIdLst>
   <p:sldSz cx="11520488" cy="6480175"/>
   <p:notesSz cx="6858000" cy="9144000"/>
@@ -1272,6 +1273,129 @@
 </p:notes>
 </file>
 
+<file path=ppt/notesSlides/notesSlide9.xml><?xml version="1.0" encoding="utf-8"?>
+<p:notes xmlns:a="http://schemas.openxmlformats.org/drawingml/2006/main" xmlns:r="http://schemas.openxmlformats.org/officeDocument/2006/relationships" xmlns:p="http://schemas.openxmlformats.org/presentationml/2006/main">
+  <p:cSld>
+    <p:spTree>
+      <p:nvGrpSpPr>
+        <p:cNvPr id="1" name=""/>
+        <p:cNvGrpSpPr/>
+        <p:nvPr/>
+      </p:nvGrpSpPr>
+      <p:grpSpPr>
+        <a:xfrm>
+          <a:off x="0" y="0"/>
+          <a:ext cx="0" cy="0"/>
+          <a:chOff x="0" y="0"/>
+          <a:chExt cx="0" cy="0"/>
+        </a:xfrm>
+      </p:grpSpPr>
+      <p:sp>
+        <p:nvSpPr>
+          <p:cNvPr id="2" name="Slide Image Placeholder 1"/>
+          <p:cNvSpPr>
+            <a:spLocks noGrp="1" noRot="1" noChangeAspect="1"/>
+          </p:cNvSpPr>
+          <p:nvPr>
+            <p:ph type="sldImg"/>
+          </p:nvPr>
+        </p:nvSpPr>
+        <p:spPr/>
+      </p:sp>
+      <p:sp>
+        <p:nvSpPr>
+          <p:cNvPr id="3" name="Notes Placeholder 2"/>
+          <p:cNvSpPr>
+            <a:spLocks noGrp="1"/>
+          </p:cNvSpPr>
+          <p:nvPr>
+            <p:ph type="body" idx="1"/>
+          </p:nvPr>
+        </p:nvSpPr>
+        <p:spPr/>
+        <p:txBody>
+          <a:bodyPr/>
+          <a:lstStyle/>
+          <a:p>
+            <a:r>
+              <a:rPr lang="en-US" dirty="0" smtClean="0"/>
+              <a:t>Example:  We have a database we restore to multiple test environments daily.  It has a 33MM row table that contains prod data</a:t>
+            </a:r>
+            <a:r>
+              <a:rPr lang="en-US" baseline="0" dirty="0" smtClean="0"/>
+              <a:t> that need to converted to equivalent test data.  Not every row needs to be updated, but about 17.5MM rows do need to be updated.</a:t>
+            </a:r>
+          </a:p>
+          <a:p>
+            <a:endParaRPr lang="en-US" baseline="0" dirty="0" smtClean="0"/>
+          </a:p>
+          <a:p>
+            <a:r>
+              <a:rPr lang="en-US" baseline="0" dirty="0" smtClean="0"/>
+              <a:t>Originally, I updated this all in a single operation, but this caused problems with the transaction log.</a:t>
+            </a:r>
+          </a:p>
+          <a:p>
+            <a:endParaRPr lang="en-US" baseline="0" dirty="0" smtClean="0"/>
+          </a:p>
+          <a:p>
+            <a:r>
+              <a:rPr lang="en-US" baseline="0" dirty="0" smtClean="0"/>
+              <a:t>So … I split up the update into multiple operations.  In this case, the table had a unique integer column as the clustering, with relatively few gaps in the values.  I determine the min value and the max value of the clustering key (very quick operations), and then operate in chunks of 100,000 rows to do the update process.</a:t>
+            </a:r>
+          </a:p>
+          <a:p>
+            <a:endParaRPr lang="en-US" baseline="0" dirty="0" smtClean="0"/>
+          </a:p>
+          <a:p>
+            <a:r>
+              <a:rPr lang="en-US" baseline="0" dirty="0" smtClean="0"/>
+              <a:t>While chunking up the operation adds overhead to the process, the reduced impact on the t-log makes this overall a more </a:t>
+            </a:r>
+            <a:r>
+              <a:rPr lang="en-US" baseline="0" smtClean="0"/>
+              <a:t>performant solution.</a:t>
+            </a:r>
+            <a:endParaRPr lang="en-US" dirty="0"/>
+          </a:p>
+        </p:txBody>
+      </p:sp>
+      <p:sp>
+        <p:nvSpPr>
+          <p:cNvPr id="4" name="Slide Number Placeholder 3"/>
+          <p:cNvSpPr>
+            <a:spLocks noGrp="1"/>
+          </p:cNvSpPr>
+          <p:nvPr>
+            <p:ph type="sldNum" sz="quarter" idx="10"/>
+          </p:nvPr>
+        </p:nvSpPr>
+        <p:spPr/>
+        <p:txBody>
+          <a:bodyPr/>
+          <a:lstStyle/>
+          <a:p>
+            <a:fld id="{FF7EEA9B-F69F-4E8E-9D98-532317352FF8}" type="slidenum">
+              <a:rPr lang="en-US" smtClean="0"/>
+              <a:t>25</a:t>
+            </a:fld>
+            <a:endParaRPr lang="en-US"/>
+          </a:p>
+        </p:txBody>
+      </p:sp>
+    </p:spTree>
+    <p:extLst>
+      <p:ext uri="{BB962C8B-B14F-4D97-AF65-F5344CB8AC3E}">
+        <p14:creationId xmlns:p14="http://schemas.microsoft.com/office/powerpoint/2010/main" val="47333760"/>
+      </p:ext>
+    </p:extLst>
+  </p:cSld>
+  <p:clrMapOvr>
+    <a:masterClrMapping/>
+  </p:clrMapOvr>
+</p:notes>
+</file>
+
 <file path=ppt/slideLayouts/slideLayout1.xml><?xml version="1.0" encoding="utf-8"?>
 <p:sldLayout xmlns:a="http://schemas.openxmlformats.org/drawingml/2006/main" xmlns:r="http://schemas.openxmlformats.org/officeDocument/2006/relationships" xmlns:p="http://schemas.openxmlformats.org/presentationml/2006/main" showMasterSp="0" preserve="1" userDrawn="1">
   <p:cSld name="Title">
@@ -2306,7 +2430,7 @@
           <a:graphicData uri="http://schemas.openxmlformats.org/presentationml/2006/ole">
             <mc:AlternateContent xmlns:mc="http://schemas.openxmlformats.org/markup-compatibility/2006">
               <mc:Choice xmlns:v="urn:schemas-microsoft-com:vml" Requires="v">
-                <p:oleObj spid="_x0000_s1077" name="Image" r:id="rId10" imgW="2279520" imgH="1310400" progId="Photoshop.Image.18">
+                <p:oleObj spid="_x0000_s1080" name="Image" r:id="rId10" imgW="2279520" imgH="1310400" progId="Photoshop.Image.18">
                   <p:embed/>
                 </p:oleObj>
               </mc:Choice>
@@ -2728,7 +2852,7 @@
           <p:cNvPr id="4" name="TextBox 3">
             <a:extLst>
               <a:ext uri="{FF2B5EF4-FFF2-40B4-BE49-F238E27FC236}">
-                <a16:creationId xmlns:a16="http://schemas.microsoft.com/office/drawing/2014/main" xmlns="" id="{4E95CA58-BC71-4CE1-ACB0-4410970492E6}"/>
+                <a16:creationId xmlns="" xmlns:a16="http://schemas.microsoft.com/office/drawing/2014/main" id="{4E95CA58-BC71-4CE1-ACB0-4410970492E6}"/>
               </a:ext>
             </a:extLst>
           </p:cNvPr>
@@ -2815,7 +2939,7 @@
           <p:cNvPr id="2" name="Title 1">
             <a:extLst>
               <a:ext uri="{FF2B5EF4-FFF2-40B4-BE49-F238E27FC236}">
-                <a16:creationId xmlns:a16="http://schemas.microsoft.com/office/drawing/2014/main" xmlns="" id="{FEF5F440-7918-4A6B-9C7C-C25F5B4AB5DD}"/>
+                <a16:creationId xmlns="" xmlns:a16="http://schemas.microsoft.com/office/drawing/2014/main" id="{FEF5F440-7918-4A6B-9C7C-C25F5B4AB5DD}"/>
               </a:ext>
             </a:extLst>
           </p:cNvPr>
@@ -2843,7 +2967,7 @@
           <p:cNvPr id="3" name="Content Placeholder 2">
             <a:extLst>
               <a:ext uri="{FF2B5EF4-FFF2-40B4-BE49-F238E27FC236}">
-                <a16:creationId xmlns:a16="http://schemas.microsoft.com/office/drawing/2014/main" xmlns="" id="{9E20F2C1-4D76-4D3B-8502-4FA0575D48CD}"/>
+                <a16:creationId xmlns="" xmlns:a16="http://schemas.microsoft.com/office/drawing/2014/main" id="{9E20F2C1-4D76-4D3B-8502-4FA0575D48CD}"/>
               </a:ext>
             </a:extLst>
           </p:cNvPr>
@@ -2871,7 +2995,7 @@
           <p:cNvPr id="4" name="Picture 3">
             <a:extLst>
               <a:ext uri="{FF2B5EF4-FFF2-40B4-BE49-F238E27FC236}">
-                <a16:creationId xmlns:a16="http://schemas.microsoft.com/office/drawing/2014/main" xmlns="" id="{91F19CE3-C79C-4B4E-9DFB-953E12007E9A}"/>
+                <a16:creationId xmlns="" xmlns:a16="http://schemas.microsoft.com/office/drawing/2014/main" id="{91F19CE3-C79C-4B4E-9DFB-953E12007E9A}"/>
               </a:ext>
             </a:extLst>
           </p:cNvPr>
@@ -4731,7 +4855,7 @@
           <p:cNvPr id="2" name="Title 1">
             <a:extLst>
               <a:ext uri="{FF2B5EF4-FFF2-40B4-BE49-F238E27FC236}">
-                <a16:creationId xmlns:a16="http://schemas.microsoft.com/office/drawing/2014/main" xmlns="" id="{FEF5F440-7918-4A6B-9C7C-C25F5B4AB5DD}"/>
+                <a16:creationId xmlns="" xmlns:a16="http://schemas.microsoft.com/office/drawing/2014/main" id="{FEF5F440-7918-4A6B-9C7C-C25F5B4AB5DD}"/>
               </a:ext>
             </a:extLst>
           </p:cNvPr>
@@ -4759,7 +4883,7 @@
           <p:cNvPr id="3" name="Content Placeholder 2">
             <a:extLst>
               <a:ext uri="{FF2B5EF4-FFF2-40B4-BE49-F238E27FC236}">
-                <a16:creationId xmlns:a16="http://schemas.microsoft.com/office/drawing/2014/main" xmlns="" id="{9E20F2C1-4D76-4D3B-8502-4FA0575D48CD}"/>
+                <a16:creationId xmlns="" xmlns:a16="http://schemas.microsoft.com/office/drawing/2014/main" id="{9E20F2C1-4D76-4D3B-8502-4FA0575D48CD}"/>
               </a:ext>
             </a:extLst>
           </p:cNvPr>
@@ -4787,7 +4911,7 @@
           <p:cNvPr id="4" name="Picture 3">
             <a:extLst>
               <a:ext uri="{FF2B5EF4-FFF2-40B4-BE49-F238E27FC236}">
-                <a16:creationId xmlns:a16="http://schemas.microsoft.com/office/drawing/2014/main" xmlns="" id="{91F19CE3-C79C-4B4E-9DFB-953E12007E9A}"/>
+                <a16:creationId xmlns="" xmlns:a16="http://schemas.microsoft.com/office/drawing/2014/main" id="{91F19CE3-C79C-4B4E-9DFB-953E12007E9A}"/>
               </a:ext>
             </a:extLst>
           </p:cNvPr>
@@ -5332,7 +5456,7 @@
           <p:cNvPr id="2" name="Title 1">
             <a:extLst>
               <a:ext uri="{FF2B5EF4-FFF2-40B4-BE49-F238E27FC236}">
-                <a16:creationId xmlns:a16="http://schemas.microsoft.com/office/drawing/2014/main" xmlns="" id="{FEF5F440-7918-4A6B-9C7C-C25F5B4AB5DD}"/>
+                <a16:creationId xmlns="" xmlns:a16="http://schemas.microsoft.com/office/drawing/2014/main" id="{FEF5F440-7918-4A6B-9C7C-C25F5B4AB5DD}"/>
               </a:ext>
             </a:extLst>
           </p:cNvPr>
@@ -5360,7 +5484,7 @@
           <p:cNvPr id="3" name="Content Placeholder 2">
             <a:extLst>
               <a:ext uri="{FF2B5EF4-FFF2-40B4-BE49-F238E27FC236}">
-                <a16:creationId xmlns:a16="http://schemas.microsoft.com/office/drawing/2014/main" xmlns="" id="{9E20F2C1-4D76-4D3B-8502-4FA0575D48CD}"/>
+                <a16:creationId xmlns="" xmlns:a16="http://schemas.microsoft.com/office/drawing/2014/main" id="{9E20F2C1-4D76-4D3B-8502-4FA0575D48CD}"/>
               </a:ext>
             </a:extLst>
           </p:cNvPr>
@@ -5388,7 +5512,7 @@
           <p:cNvPr id="4" name="Picture 3">
             <a:extLst>
               <a:ext uri="{FF2B5EF4-FFF2-40B4-BE49-F238E27FC236}">
-                <a16:creationId xmlns:a16="http://schemas.microsoft.com/office/drawing/2014/main" xmlns="" id="{91F19CE3-C79C-4B4E-9DFB-953E12007E9A}"/>
+                <a16:creationId xmlns="" xmlns:a16="http://schemas.microsoft.com/office/drawing/2014/main" id="{91F19CE3-C79C-4B4E-9DFB-953E12007E9A}"/>
               </a:ext>
             </a:extLst>
           </p:cNvPr>
@@ -7194,7 +7318,7 @@
           <p:cNvPr id="2" name="Title 1">
             <a:extLst>
               <a:ext uri="{FF2B5EF4-FFF2-40B4-BE49-F238E27FC236}">
-                <a16:creationId xmlns:a16="http://schemas.microsoft.com/office/drawing/2014/main" xmlns="" id="{FEF5F440-7918-4A6B-9C7C-C25F5B4AB5DD}"/>
+                <a16:creationId xmlns="" xmlns:a16="http://schemas.microsoft.com/office/drawing/2014/main" id="{FEF5F440-7918-4A6B-9C7C-C25F5B4AB5DD}"/>
               </a:ext>
             </a:extLst>
           </p:cNvPr>
@@ -7222,7 +7346,7 @@
           <p:cNvPr id="3" name="Content Placeholder 2">
             <a:extLst>
               <a:ext uri="{FF2B5EF4-FFF2-40B4-BE49-F238E27FC236}">
-                <a16:creationId xmlns:a16="http://schemas.microsoft.com/office/drawing/2014/main" xmlns="" id="{9E20F2C1-4D76-4D3B-8502-4FA0575D48CD}"/>
+                <a16:creationId xmlns="" xmlns:a16="http://schemas.microsoft.com/office/drawing/2014/main" id="{9E20F2C1-4D76-4D3B-8502-4FA0575D48CD}"/>
               </a:ext>
             </a:extLst>
           </p:cNvPr>
@@ -7250,7 +7374,7 @@
           <p:cNvPr id="4" name="Picture 3">
             <a:extLst>
               <a:ext uri="{FF2B5EF4-FFF2-40B4-BE49-F238E27FC236}">
-                <a16:creationId xmlns:a16="http://schemas.microsoft.com/office/drawing/2014/main" xmlns="" id="{91F19CE3-C79C-4B4E-9DFB-953E12007E9A}"/>
+                <a16:creationId xmlns="" xmlns:a16="http://schemas.microsoft.com/office/drawing/2014/main" id="{91F19CE3-C79C-4B4E-9DFB-953E12007E9A}"/>
               </a:ext>
             </a:extLst>
           </p:cNvPr>
@@ -8522,7 +8646,7 @@
           <p:cNvPr id="2" name="Title 1">
             <a:extLst>
               <a:ext uri="{FF2B5EF4-FFF2-40B4-BE49-F238E27FC236}">
-                <a16:creationId xmlns:a16="http://schemas.microsoft.com/office/drawing/2014/main" xmlns="" id="{FEF5F440-7918-4A6B-9C7C-C25F5B4AB5DD}"/>
+                <a16:creationId xmlns="" xmlns:a16="http://schemas.microsoft.com/office/drawing/2014/main" id="{FEF5F440-7918-4A6B-9C7C-C25F5B4AB5DD}"/>
               </a:ext>
             </a:extLst>
           </p:cNvPr>
@@ -8550,7 +8674,7 @@
           <p:cNvPr id="3" name="Content Placeholder 2">
             <a:extLst>
               <a:ext uri="{FF2B5EF4-FFF2-40B4-BE49-F238E27FC236}">
-                <a16:creationId xmlns:a16="http://schemas.microsoft.com/office/drawing/2014/main" xmlns="" id="{9E20F2C1-4D76-4D3B-8502-4FA0575D48CD}"/>
+                <a16:creationId xmlns="" xmlns:a16="http://schemas.microsoft.com/office/drawing/2014/main" id="{9E20F2C1-4D76-4D3B-8502-4FA0575D48CD}"/>
               </a:ext>
             </a:extLst>
           </p:cNvPr>
@@ -8578,7 +8702,7 @@
           <p:cNvPr id="4" name="Picture 3">
             <a:extLst>
               <a:ext uri="{FF2B5EF4-FFF2-40B4-BE49-F238E27FC236}">
-                <a16:creationId xmlns:a16="http://schemas.microsoft.com/office/drawing/2014/main" xmlns="" id="{91F19CE3-C79C-4B4E-9DFB-953E12007E9A}"/>
+                <a16:creationId xmlns="" xmlns:a16="http://schemas.microsoft.com/office/drawing/2014/main" id="{91F19CE3-C79C-4B4E-9DFB-953E12007E9A}"/>
               </a:ext>
             </a:extLst>
           </p:cNvPr>
@@ -10788,7 +10912,7 @@
           <p:cNvPr id="2" name="Title 1">
             <a:extLst>
               <a:ext uri="{FF2B5EF4-FFF2-40B4-BE49-F238E27FC236}">
-                <a16:creationId xmlns:a16="http://schemas.microsoft.com/office/drawing/2014/main" xmlns="" id="{FEF5F440-7918-4A6B-9C7C-C25F5B4AB5DD}"/>
+                <a16:creationId xmlns="" xmlns:a16="http://schemas.microsoft.com/office/drawing/2014/main" id="{FEF5F440-7918-4A6B-9C7C-C25F5B4AB5DD}"/>
               </a:ext>
             </a:extLst>
           </p:cNvPr>
@@ -10816,7 +10940,7 @@
           <p:cNvPr id="3" name="Content Placeholder 2">
             <a:extLst>
               <a:ext uri="{FF2B5EF4-FFF2-40B4-BE49-F238E27FC236}">
-                <a16:creationId xmlns:a16="http://schemas.microsoft.com/office/drawing/2014/main" xmlns="" id="{9E20F2C1-4D76-4D3B-8502-4FA0575D48CD}"/>
+                <a16:creationId xmlns="" xmlns:a16="http://schemas.microsoft.com/office/drawing/2014/main" id="{9E20F2C1-4D76-4D3B-8502-4FA0575D48CD}"/>
               </a:ext>
             </a:extLst>
           </p:cNvPr>
@@ -10844,7 +10968,7 @@
           <p:cNvPr id="4" name="Picture 3">
             <a:extLst>
               <a:ext uri="{FF2B5EF4-FFF2-40B4-BE49-F238E27FC236}">
-                <a16:creationId xmlns:a16="http://schemas.microsoft.com/office/drawing/2014/main" xmlns="" id="{91F19CE3-C79C-4B4E-9DFB-953E12007E9A}"/>
+                <a16:creationId xmlns="" xmlns:a16="http://schemas.microsoft.com/office/drawing/2014/main" id="{91F19CE3-C79C-4B4E-9DFB-953E12007E9A}"/>
               </a:ext>
             </a:extLst>
           </p:cNvPr>
@@ -10922,14 +11046,10 @@
           <a:lstStyle/>
           <a:p>
             <a:r>
-              <a:rPr lang="en-US" dirty="0"/>
-              <a:t>Key Take-</a:t>
-            </a:r>
-            <a:r>
-              <a:rPr lang="en-US" dirty="0" err="1"/>
-              <a:t>Aways</a:t>
-            </a:r>
-            <a:endParaRPr lang="en-US" dirty="0"/>
+              <a:rPr lang="en-US" sz="3600" dirty="0" smtClean="0"/>
+              <a:t>So if sets are good, really big sets are better, right?</a:t>
+            </a:r>
+            <a:endParaRPr lang="en-US" sz="3600" dirty="0"/>
           </a:p>
         </p:txBody>
       </p:sp>
@@ -10953,8 +11073,8 @@
               <a:buChar char="•"/>
             </a:pPr>
             <a:r>
-              <a:rPr lang="en-US" dirty="0"/>
-              <a:t>Cursors are usually inefficient</a:t>
+              <a:rPr lang="en-US" dirty="0" smtClean="0"/>
+              <a:t>Transaction log impacts</a:t>
             </a:r>
           </a:p>
           <a:p>
@@ -10963,46 +11083,9 @@
               <a:buChar char="•"/>
             </a:pPr>
             <a:r>
-              <a:rPr lang="en-US" dirty="0"/>
-              <a:t>If necessary, declare as </a:t>
-            </a:r>
-            <a:r>
-              <a:rPr lang="en-US" dirty="0" err="1">
-                <a:solidFill>
-                  <a:srgbClr val="0000FF"/>
-                </a:solidFill>
-                <a:highlight>
-                  <a:srgbClr val="FFFFFF"/>
-                </a:highlight>
-                <a:latin typeface="Consolas" panose="020B0609020204030204" pitchFamily="49" charset="0"/>
-              </a:rPr>
-              <a:t>fast_forward</a:t>
-            </a:r>
-            <a:r>
-              <a:rPr lang="en-US" dirty="0">
-                <a:solidFill>
-                  <a:srgbClr val="000000"/>
-                </a:solidFill>
-                <a:highlight>
-                  <a:srgbClr val="FFFFFF"/>
-                </a:highlight>
-                <a:latin typeface="Consolas" panose="020B0609020204030204" pitchFamily="49" charset="0"/>
-              </a:rPr>
-              <a:t> </a:t>
-            </a:r>
-            <a:r>
-              <a:rPr lang="en-US" dirty="0" err="1">
-                <a:solidFill>
-                  <a:srgbClr val="0000FF"/>
-                </a:solidFill>
-                <a:highlight>
-                  <a:srgbClr val="FFFFFF"/>
-                </a:highlight>
-                <a:latin typeface="Consolas" panose="020B0609020204030204" pitchFamily="49" charset="0"/>
-              </a:rPr>
-              <a:t>read_only</a:t>
-            </a:r>
-            <a:endParaRPr lang="en-US" dirty="0"/>
+              <a:rPr lang="en-US" dirty="0" smtClean="0"/>
+              <a:t>Long-running transactions and clearing the log</a:t>
+            </a:r>
           </a:p>
           <a:p>
             <a:pPr marL="1147527" lvl="1" indent="-571500">
@@ -11010,8 +11093,8 @@
               <a:buChar char="•"/>
             </a:pPr>
             <a:r>
-              <a:rPr lang="en-US" dirty="0"/>
-              <a:t>Still necessary for lots of admin functionality</a:t>
+              <a:rPr lang="en-US" dirty="0" smtClean="0"/>
+              <a:t>Log growth</a:t>
             </a:r>
           </a:p>
           <a:p>
@@ -11020,8 +11103,18 @@
               <a:buChar char="•"/>
             </a:pPr>
             <a:r>
-              <a:rPr lang="en-US" dirty="0"/>
-              <a:t>Pre-2012, still best way to do running totals, etc.</a:t>
+              <a:rPr lang="en-US" dirty="0" smtClean="0"/>
+              <a:t>Log space reservation</a:t>
+            </a:r>
+          </a:p>
+          <a:p>
+            <a:pPr marL="1147527" lvl="1" indent="-571500">
+              <a:buFont typeface="Arial" panose="020B0604020202020204" pitchFamily="34" charset="0"/>
+              <a:buChar char="•"/>
+            </a:pPr>
+            <a:r>
+              <a:rPr lang="en-US" dirty="0" smtClean="0"/>
+              <a:t>What if DB is restored to point in the middle of the operation?</a:t>
             </a:r>
           </a:p>
           <a:p>
@@ -11030,15 +11123,13 @@
               <a:buChar char="•"/>
             </a:pPr>
             <a:r>
-              <a:rPr lang="en-US" dirty="0"/>
-              <a:t>Triangle joins are evil</a:t>
-            </a:r>
-          </a:p>
-          <a:p>
-            <a:pPr marL="1147527" lvl="1" indent="-571500">
-              <a:buFont typeface="Arial" panose="020B0604020202020204" pitchFamily="34" charset="0"/>
-              <a:buChar char="•"/>
-            </a:pPr>
+              <a:rPr lang="en-US" dirty="0" smtClean="0"/>
+              <a:t>Splitting up sets is a bit </a:t>
+            </a:r>
+            <a:r>
+              <a:rPr lang="en-US" smtClean="0"/>
+              <a:t>of an art</a:t>
+            </a:r>
             <a:endParaRPr lang="en-US" dirty="0"/>
           </a:p>
         </p:txBody>
@@ -11046,20 +11137,13 @@
     </p:spTree>
     <p:extLst>
       <p:ext uri="{BB962C8B-B14F-4D97-AF65-F5344CB8AC3E}">
-        <p14:creationId xmlns:p14="http://schemas.microsoft.com/office/powerpoint/2010/main" val="2597850043"/>
+        <p14:creationId xmlns:p14="http://schemas.microsoft.com/office/powerpoint/2010/main" val="1634642505"/>
       </p:ext>
     </p:extLst>
   </p:cSld>
   <p:clrMapOvr>
     <a:masterClrMapping/>
   </p:clrMapOvr>
-  <p:timing>
-    <p:tnLst>
-      <p:par>
-        <p:cTn id="1" dur="indefinite" restart="never" nodeType="tmRoot"/>
-      </p:par>
-    </p:tnLst>
-  </p:timing>
 </p:sld>
 </file>
 
@@ -11128,7 +11212,7 @@
             </a:pPr>
             <a:r>
               <a:rPr lang="en-US" dirty="0"/>
-              <a:t>Avoid most UDFs</a:t>
+              <a:t>Cursors are usually inefficient</a:t>
             </a:r>
           </a:p>
           <a:p>
@@ -11138,8 +11222,45 @@
             </a:pPr>
             <a:r>
               <a:rPr lang="en-US" dirty="0"/>
-              <a:t>Scalar and multi-statement TVFs with data access tend to perform poorly</a:t>
-            </a:r>
+              <a:t>If necessary, declare as </a:t>
+            </a:r>
+            <a:r>
+              <a:rPr lang="en-US" dirty="0" err="1">
+                <a:solidFill>
+                  <a:srgbClr val="0000FF"/>
+                </a:solidFill>
+                <a:highlight>
+                  <a:srgbClr val="FFFFFF"/>
+                </a:highlight>
+                <a:latin typeface="Consolas" panose="020B0609020204030204" pitchFamily="49" charset="0"/>
+              </a:rPr>
+              <a:t>fast_forward</a:t>
+            </a:r>
+            <a:r>
+              <a:rPr lang="en-US" dirty="0">
+                <a:solidFill>
+                  <a:srgbClr val="000000"/>
+                </a:solidFill>
+                <a:highlight>
+                  <a:srgbClr val="FFFFFF"/>
+                </a:highlight>
+                <a:latin typeface="Consolas" panose="020B0609020204030204" pitchFamily="49" charset="0"/>
+              </a:rPr>
+              <a:t> </a:t>
+            </a:r>
+            <a:r>
+              <a:rPr lang="en-US" dirty="0" err="1">
+                <a:solidFill>
+                  <a:srgbClr val="0000FF"/>
+                </a:solidFill>
+                <a:highlight>
+                  <a:srgbClr val="FFFFFF"/>
+                </a:highlight>
+                <a:latin typeface="Consolas" panose="020B0609020204030204" pitchFamily="49" charset="0"/>
+              </a:rPr>
+              <a:t>read_only</a:t>
+            </a:r>
+            <a:endParaRPr lang="en-US" dirty="0"/>
           </a:p>
           <a:p>
             <a:pPr marL="1147527" lvl="1" indent="-571500">
@@ -11148,7 +11269,17 @@
             </a:pPr>
             <a:r>
               <a:rPr lang="en-US" dirty="0"/>
-              <a:t>CLR with data access tends to perform poorly</a:t>
+              <a:t>Still necessary for lots of admin functionality</a:t>
+            </a:r>
+          </a:p>
+          <a:p>
+            <a:pPr marL="1147527" lvl="1" indent="-571500">
+              <a:buFont typeface="Arial" panose="020B0604020202020204" pitchFamily="34" charset="0"/>
+              <a:buChar char="•"/>
+            </a:pPr>
+            <a:r>
+              <a:rPr lang="en-US" dirty="0"/>
+              <a:t>Pre-2012, still best way to do running totals, etc.</a:t>
             </a:r>
           </a:p>
           <a:p>
@@ -11158,15 +11289,22 @@
             </a:pPr>
             <a:r>
               <a:rPr lang="en-US" dirty="0"/>
-              <a:t>Inline TVFs generally optimize well and tend to perform nicely</a:t>
-            </a:r>
+              <a:t>Triangle joins are evil</a:t>
+            </a:r>
+          </a:p>
+          <a:p>
+            <a:pPr marL="1147527" lvl="1" indent="-571500">
+              <a:buFont typeface="Arial" panose="020B0604020202020204" pitchFamily="34" charset="0"/>
+              <a:buChar char="•"/>
+            </a:pPr>
+            <a:endParaRPr lang="en-US" dirty="0"/>
           </a:p>
         </p:txBody>
       </p:sp>
     </p:spTree>
     <p:extLst>
       <p:ext uri="{BB962C8B-B14F-4D97-AF65-F5344CB8AC3E}">
-        <p14:creationId xmlns:p14="http://schemas.microsoft.com/office/powerpoint/2010/main" val="3534619094"/>
+        <p14:creationId xmlns:p14="http://schemas.microsoft.com/office/powerpoint/2010/main" val="2597850043"/>
       </p:ext>
     </p:extLst>
   </p:cSld>
@@ -11248,35 +11386,27 @@
             </a:pPr>
             <a:r>
               <a:rPr lang="en-US" dirty="0"/>
-              <a:t>Embrace </a:t>
-            </a:r>
-            <a:r>
-              <a:rPr lang="en-US" dirty="0" err="1">
-                <a:solidFill>
-                  <a:srgbClr val="FF00FF"/>
-                </a:solidFill>
-                <a:highlight>
-                  <a:srgbClr val="FFFFFF"/>
-                </a:highlight>
-                <a:latin typeface="Consolas" panose="020B0609020204030204" pitchFamily="49" charset="0"/>
-              </a:rPr>
-              <a:t>row_number</a:t>
-            </a:r>
-            <a:r>
-              <a:rPr lang="en-US" dirty="0">
-                <a:solidFill>
-                  <a:srgbClr val="808080"/>
-                </a:solidFill>
-                <a:highlight>
-                  <a:srgbClr val="FFFFFF"/>
-                </a:highlight>
-                <a:latin typeface="Consolas" panose="020B0609020204030204" pitchFamily="49" charset="0"/>
-              </a:rPr>
-              <a:t>()</a:t>
-            </a:r>
+              <a:t>Avoid most UDFs</a:t>
+            </a:r>
+          </a:p>
+          <a:p>
+            <a:pPr marL="1147527" lvl="1" indent="-571500">
+              <a:buFont typeface="Arial" panose="020B0604020202020204" pitchFamily="34" charset="0"/>
+              <a:buChar char="•"/>
+            </a:pPr>
             <a:r>
               <a:rPr lang="en-US" dirty="0"/>
-              <a:t>: It is much more useful than just for counting rows</a:t>
+              <a:t>Scalar and multi-statement TVFs with data access tend to perform poorly</a:t>
+            </a:r>
+          </a:p>
+          <a:p>
+            <a:pPr marL="1147527" lvl="1" indent="-571500">
+              <a:buFont typeface="Arial" panose="020B0604020202020204" pitchFamily="34" charset="0"/>
+              <a:buChar char="•"/>
+            </a:pPr>
+            <a:r>
+              <a:rPr lang="en-US" dirty="0"/>
+              <a:t>CLR with data access tends to perform poorly</a:t>
             </a:r>
           </a:p>
           <a:p>
@@ -11285,11 +11415,90 @@
               <a:buChar char="•"/>
             </a:pPr>
             <a:r>
-              <a:rPr lang="en-US"/>
-              <a:t>Embrace windowing functions</a:t>
+              <a:rPr lang="en-US" dirty="0"/>
+              <a:t>Inline TVFs generally optimize well and tend to perform nicely</a:t>
+            </a:r>
+          </a:p>
+        </p:txBody>
+      </p:sp>
+    </p:spTree>
+    <p:extLst>
+      <p:ext uri="{BB962C8B-B14F-4D97-AF65-F5344CB8AC3E}">
+        <p14:creationId xmlns:p14="http://schemas.microsoft.com/office/powerpoint/2010/main" val="3534619094"/>
+      </p:ext>
+    </p:extLst>
+  </p:cSld>
+  <p:clrMapOvr>
+    <a:masterClrMapping/>
+  </p:clrMapOvr>
+  <p:timing>
+    <p:tnLst>
+      <p:par>
+        <p:cTn id="1" dur="indefinite" restart="never" nodeType="tmRoot"/>
+      </p:par>
+    </p:tnLst>
+  </p:timing>
+</p:sld>
+</file>
+
+<file path=ppt/slides/slide28.xml><?xml version="1.0" encoding="utf-8"?>
+<p:sld xmlns:a="http://schemas.openxmlformats.org/drawingml/2006/main" xmlns:r="http://schemas.openxmlformats.org/officeDocument/2006/relationships" xmlns:p="http://schemas.openxmlformats.org/presentationml/2006/main">
+  <p:cSld>
+    <p:spTree>
+      <p:nvGrpSpPr>
+        <p:cNvPr id="1" name=""/>
+        <p:cNvGrpSpPr/>
+        <p:nvPr/>
+      </p:nvGrpSpPr>
+      <p:grpSpPr>
+        <a:xfrm>
+          <a:off x="0" y="0"/>
+          <a:ext cx="0" cy="0"/>
+          <a:chOff x="0" y="0"/>
+          <a:chExt cx="0" cy="0"/>
+        </a:xfrm>
+      </p:grpSpPr>
+      <p:sp>
+        <p:nvSpPr>
+          <p:cNvPr id="2" name="Title 1"/>
+          <p:cNvSpPr>
+            <a:spLocks noGrp="1"/>
+          </p:cNvSpPr>
+          <p:nvPr>
+            <p:ph type="title"/>
+          </p:nvPr>
+        </p:nvSpPr>
+        <p:spPr/>
+        <p:txBody>
+          <a:bodyPr/>
+          <a:lstStyle/>
+          <a:p>
+            <a:r>
+              <a:rPr lang="en-US" dirty="0"/>
+              <a:t>Key Take-</a:t>
+            </a:r>
+            <a:r>
+              <a:rPr lang="en-US" dirty="0" err="1"/>
+              <a:t>Aways</a:t>
             </a:r>
             <a:endParaRPr lang="en-US" dirty="0"/>
           </a:p>
+        </p:txBody>
+      </p:sp>
+      <p:sp>
+        <p:nvSpPr>
+          <p:cNvPr id="3" name="Content Placeholder 2"/>
+          <p:cNvSpPr>
+            <a:spLocks noGrp="1"/>
+          </p:cNvSpPr>
+          <p:nvPr>
+            <p:ph idx="1"/>
+          </p:nvPr>
+        </p:nvSpPr>
+        <p:spPr/>
+        <p:txBody>
+          <a:bodyPr/>
+          <a:lstStyle/>
           <a:p>
             <a:pPr marL="571500" indent="-571500">
               <a:buFont typeface="Arial" panose="020B0604020202020204" pitchFamily="34" charset="0"/>
@@ -11300,6 +11509,54 @@
               <a:t>Embrace </a:t>
             </a:r>
             <a:r>
+              <a:rPr lang="en-US" dirty="0" err="1">
+                <a:solidFill>
+                  <a:srgbClr val="FF00FF"/>
+                </a:solidFill>
+                <a:highlight>
+                  <a:srgbClr val="FFFFFF"/>
+                </a:highlight>
+                <a:latin typeface="Consolas" panose="020B0609020204030204" pitchFamily="49" charset="0"/>
+              </a:rPr>
+              <a:t>row_number</a:t>
+            </a:r>
+            <a:r>
+              <a:rPr lang="en-US" dirty="0">
+                <a:solidFill>
+                  <a:srgbClr val="808080"/>
+                </a:solidFill>
+                <a:highlight>
+                  <a:srgbClr val="FFFFFF"/>
+                </a:highlight>
+                <a:latin typeface="Consolas" panose="020B0609020204030204" pitchFamily="49" charset="0"/>
+              </a:rPr>
+              <a:t>()</a:t>
+            </a:r>
+            <a:r>
+              <a:rPr lang="en-US" dirty="0"/>
+              <a:t>: It is much more useful than just for counting rows</a:t>
+            </a:r>
+          </a:p>
+          <a:p>
+            <a:pPr marL="571500" indent="-571500">
+              <a:buFont typeface="Arial" panose="020B0604020202020204" pitchFamily="34" charset="0"/>
+              <a:buChar char="•"/>
+            </a:pPr>
+            <a:r>
+              <a:rPr lang="en-US" dirty="0"/>
+              <a:t>Embrace windowing functions</a:t>
+            </a:r>
+          </a:p>
+          <a:p>
+            <a:pPr marL="571500" indent="-571500">
+              <a:buFont typeface="Arial" panose="020B0604020202020204" pitchFamily="34" charset="0"/>
+              <a:buChar char="•"/>
+            </a:pPr>
+            <a:r>
+              <a:rPr lang="en-US" dirty="0"/>
+              <a:t>Embrace </a:t>
+            </a:r>
+            <a:r>
               <a:rPr lang="en-US" dirty="0">
                 <a:solidFill>
                   <a:srgbClr val="808080"/>
@@ -11329,9 +11586,10 @@
               <a:buChar char="•"/>
             </a:pPr>
             <a:r>
-              <a:rPr lang="en-US" dirty="0"/>
-              <a:t>Look for ways to employ tally tables</a:t>
-            </a:r>
+              <a:rPr lang="en-US" dirty="0" smtClean="0"/>
+              <a:t>May need to split up very large sets</a:t>
+            </a:r>
+            <a:endParaRPr lang="en-US" dirty="0"/>
           </a:p>
         </p:txBody>
       </p:sp>
@@ -11355,7 +11613,7 @@
 </p:sld>
 </file>
 
-<file path=ppt/slides/slide28.xml><?xml version="1.0" encoding="utf-8"?>
+<file path=ppt/slides/slide29.xml><?xml version="1.0" encoding="utf-8"?>
 <p:sld xmlns:a="http://schemas.openxmlformats.org/drawingml/2006/main" xmlns:r="http://schemas.openxmlformats.org/officeDocument/2006/relationships" xmlns:p="http://schemas.openxmlformats.org/presentationml/2006/main">
   <p:cSld>
     <p:spTree>
@@ -11582,11 +11840,11 @@
   <p:clrMapOvr>
     <a:masterClrMapping/>
   </p:clrMapOvr>
-  <mc:AlternateContent xmlns:mc="http://schemas.openxmlformats.org/markup-compatibility/2006">
-    <mc:Choice xmlns:p14="http://schemas.microsoft.com/office/powerpoint/2010/main" Requires="p14">
+  <mc:AlternateContent xmlns:mc="http://schemas.openxmlformats.org/markup-compatibility/2006" xmlns:p14="http://schemas.microsoft.com/office/powerpoint/2010/main">
+    <mc:Choice Requires="p14">
       <p:transition spd="slow" p14:dur="2000"/>
     </mc:Choice>
-    <mc:Fallback>
+    <mc:Fallback xmlns="">
       <p:transition spd="slow"/>
     </mc:Fallback>
   </mc:AlternateContent>
@@ -11831,7 +12089,7 @@
           <p:cNvPr id="4" name="Picture 3">
             <a:extLst>
               <a:ext uri="{FF2B5EF4-FFF2-40B4-BE49-F238E27FC236}">
-                <a16:creationId xmlns:a16="http://schemas.microsoft.com/office/drawing/2014/main" xmlns="" id="{90DA072C-7926-41E0-B73D-643B0D73A159}"/>
+                <a16:creationId xmlns="" xmlns:a16="http://schemas.microsoft.com/office/drawing/2014/main" id="{90DA072C-7926-41E0-B73D-643B0D73A159}"/>
               </a:ext>
             </a:extLst>
           </p:cNvPr>
@@ -11861,7 +12119,7 @@
           <p:cNvPr id="5" name="Picture 4">
             <a:extLst>
               <a:ext uri="{FF2B5EF4-FFF2-40B4-BE49-F238E27FC236}">
-                <a16:creationId xmlns:a16="http://schemas.microsoft.com/office/drawing/2014/main" xmlns="" id="{B4DA9823-AE8A-4DEE-9F72-FF82E5364AF8}"/>
+                <a16:creationId xmlns="" xmlns:a16="http://schemas.microsoft.com/office/drawing/2014/main" id="{B4DA9823-AE8A-4DEE-9F72-FF82E5364AF8}"/>
               </a:ext>
             </a:extLst>
           </p:cNvPr>
@@ -11891,7 +12149,7 @@
           <p:cNvPr id="6" name="Picture 5">
             <a:extLst>
               <a:ext uri="{FF2B5EF4-FFF2-40B4-BE49-F238E27FC236}">
-                <a16:creationId xmlns:a16="http://schemas.microsoft.com/office/drawing/2014/main" xmlns="" id="{6CBAB9CC-BE18-4833-9C69-EF84E94F5264}"/>
+                <a16:creationId xmlns="" xmlns:a16="http://schemas.microsoft.com/office/drawing/2014/main" id="{6CBAB9CC-BE18-4833-9C69-EF84E94F5264}"/>
               </a:ext>
             </a:extLst>
           </p:cNvPr>
@@ -11921,7 +12179,7 @@
           <p:cNvPr id="7" name="Picture 6">
             <a:extLst>
               <a:ext uri="{FF2B5EF4-FFF2-40B4-BE49-F238E27FC236}">
-                <a16:creationId xmlns:a16="http://schemas.microsoft.com/office/drawing/2014/main" xmlns="" id="{BFB3D48D-7586-44AA-B3A8-BA0BC32CCCDD}"/>
+                <a16:creationId xmlns="" xmlns:a16="http://schemas.microsoft.com/office/drawing/2014/main" id="{BFB3D48D-7586-44AA-B3A8-BA0BC32CCCDD}"/>
               </a:ext>
             </a:extLst>
           </p:cNvPr>
@@ -12229,7 +12487,7 @@
           <p:cNvPr id="5" name="Content Placeholder 4">
             <a:extLst>
               <a:ext uri="{FF2B5EF4-FFF2-40B4-BE49-F238E27FC236}">
-                <a16:creationId xmlns:a16="http://schemas.microsoft.com/office/drawing/2014/main" xmlns="" id="{EA577935-A7F7-4DF4-95F2-8BF0108D9ACF}"/>
+                <a16:creationId xmlns="" xmlns:a16="http://schemas.microsoft.com/office/drawing/2014/main" id="{EA577935-A7F7-4DF4-95F2-8BF0108D9ACF}"/>
               </a:ext>
             </a:extLst>
           </p:cNvPr>
@@ -13311,7 +13569,7 @@
           <p:cNvPr id="5" name="Content Placeholder 4">
             <a:extLst>
               <a:ext uri="{FF2B5EF4-FFF2-40B4-BE49-F238E27FC236}">
-                <a16:creationId xmlns:a16="http://schemas.microsoft.com/office/drawing/2014/main" xmlns="" id="{EA577935-A7F7-4DF4-95F2-8BF0108D9ACF}"/>
+                <a16:creationId xmlns="" xmlns:a16="http://schemas.microsoft.com/office/drawing/2014/main" id="{EA577935-A7F7-4DF4-95F2-8BF0108D9ACF}"/>
               </a:ext>
             </a:extLst>
           </p:cNvPr>
@@ -15405,7 +15663,7 @@
           <p:cNvPr id="5" name="Content Placeholder 4">
             <a:extLst>
               <a:ext uri="{FF2B5EF4-FFF2-40B4-BE49-F238E27FC236}">
-                <a16:creationId xmlns:a16="http://schemas.microsoft.com/office/drawing/2014/main" xmlns="" id="{EA577935-A7F7-4DF4-95F2-8BF0108D9ACF}"/>
+                <a16:creationId xmlns="" xmlns:a16="http://schemas.microsoft.com/office/drawing/2014/main" id="{EA577935-A7F7-4DF4-95F2-8BF0108D9ACF}"/>
               </a:ext>
             </a:extLst>
           </p:cNvPr>

</xml_diff>

<commit_message>
Late-breaking thoughts on how Hekaton changes things.
</commit_message>
<xml_diff>
--- a/HowToThinkInSets.pptx
+++ b/HowToThinkInSets.pptx
@@ -5,7 +5,7 @@
     <p:sldMasterId id="2147483648" r:id="rId1"/>
   </p:sldMasterIdLst>
   <p:notesMasterIdLst>
-    <p:notesMasterId r:id="rId31"/>
+    <p:notesMasterId r:id="rId32"/>
   </p:notesMasterIdLst>
   <p:sldIdLst>
     <p:sldId id="263" r:id="rId2"/>
@@ -33,10 +33,11 @@
     <p:sldId id="281" r:id="rId24"/>
     <p:sldId id="282" r:id="rId25"/>
     <p:sldId id="295" r:id="rId26"/>
-    <p:sldId id="275" r:id="rId27"/>
-    <p:sldId id="277" r:id="rId28"/>
-    <p:sldId id="276" r:id="rId29"/>
-    <p:sldId id="267" r:id="rId30"/>
+    <p:sldId id="296" r:id="rId27"/>
+    <p:sldId id="275" r:id="rId28"/>
+    <p:sldId id="277" r:id="rId29"/>
+    <p:sldId id="276" r:id="rId30"/>
+    <p:sldId id="267" r:id="rId31"/>
   </p:sldIdLst>
   <p:sldSz cx="11520488" cy="6480175"/>
   <p:notesSz cx="6858000" cy="9144000"/>
@@ -240,7 +241,7 @@
           <a:p>
             <a:fld id="{3CD51548-82AA-4A2B-B152-1D3266E0F652}" type="datetimeFigureOut">
               <a:rPr lang="en-US" smtClean="0"/>
-              <a:t>07/27/2017</a:t>
+              <a:t>7/29/2017</a:t>
             </a:fld>
             <a:endParaRPr lang="en-US"/>
           </a:p>
@@ -1318,42 +1319,42 @@
           <a:lstStyle/>
           <a:p>
             <a:r>
-              <a:rPr lang="en-US" dirty="0" smtClean="0"/>
+              <a:rPr lang="en-US" dirty="0"/>
               <a:t>Example:  We have a database we restore to multiple test environments daily.  It has a 33MM row table that contains prod data</a:t>
             </a:r>
             <a:r>
-              <a:rPr lang="en-US" baseline="0" dirty="0" smtClean="0"/>
+              <a:rPr lang="en-US" baseline="0" dirty="0"/>
               <a:t> that need to converted to equivalent test data.  Not every row needs to be updated, but about 17.5MM rows do need to be updated.</a:t>
             </a:r>
           </a:p>
           <a:p>
-            <a:endParaRPr lang="en-US" baseline="0" dirty="0" smtClean="0"/>
-          </a:p>
-          <a:p>
-            <a:r>
-              <a:rPr lang="en-US" baseline="0" dirty="0" smtClean="0"/>
+            <a:endParaRPr lang="en-US" baseline="0" dirty="0"/>
+          </a:p>
+          <a:p>
+            <a:r>
+              <a:rPr lang="en-US" baseline="0" dirty="0"/>
               <a:t>Originally, I updated this all in a single operation, but this caused problems with the transaction log.</a:t>
             </a:r>
           </a:p>
           <a:p>
-            <a:endParaRPr lang="en-US" baseline="0" dirty="0" smtClean="0"/>
-          </a:p>
-          <a:p>
-            <a:r>
-              <a:rPr lang="en-US" baseline="0" dirty="0" smtClean="0"/>
+            <a:endParaRPr lang="en-US" baseline="0" dirty="0"/>
+          </a:p>
+          <a:p>
+            <a:r>
+              <a:rPr lang="en-US" baseline="0" dirty="0"/>
               <a:t>So … I split up the update into multiple operations.  In this case, the table had a unique integer column as the clustering, with relatively few gaps in the values.  I determine the min value and the max value of the clustering key (very quick operations), and then operate in chunks of 100,000 rows to do the update process.</a:t>
             </a:r>
           </a:p>
           <a:p>
-            <a:endParaRPr lang="en-US" baseline="0" dirty="0" smtClean="0"/>
-          </a:p>
-          <a:p>
-            <a:r>
-              <a:rPr lang="en-US" baseline="0" dirty="0" smtClean="0"/>
+            <a:endParaRPr lang="en-US" baseline="0" dirty="0"/>
+          </a:p>
+          <a:p>
+            <a:r>
+              <a:rPr lang="en-US" baseline="0" dirty="0"/>
               <a:t>While chunking up the operation adds overhead to the process, the reduced impact on the t-log makes this overall a more </a:t>
             </a:r>
             <a:r>
-              <a:rPr lang="en-US" baseline="0" smtClean="0"/>
+              <a:rPr lang="en-US" baseline="0"/>
               <a:t>performant solution.</a:t>
             </a:r>
             <a:endParaRPr lang="en-US" dirty="0"/>
@@ -2430,7 +2431,7 @@
           <a:graphicData uri="http://schemas.openxmlformats.org/presentationml/2006/ole">
             <mc:AlternateContent xmlns:mc="http://schemas.openxmlformats.org/markup-compatibility/2006">
               <mc:Choice xmlns:v="urn:schemas-microsoft-com:vml" Requires="v">
-                <p:oleObj spid="_x0000_s1080" name="Image" r:id="rId10" imgW="2279520" imgH="1310400" progId="Photoshop.Image.18">
+                <p:oleObj spid="_x0000_s1082" name="Image" r:id="rId10" imgW="2279520" imgH="1310400" progId="Photoshop.Image.18">
                   <p:embed/>
                 </p:oleObj>
               </mc:Choice>
@@ -2852,7 +2853,7 @@
           <p:cNvPr id="4" name="TextBox 3">
             <a:extLst>
               <a:ext uri="{FF2B5EF4-FFF2-40B4-BE49-F238E27FC236}">
-                <a16:creationId xmlns="" xmlns:a16="http://schemas.microsoft.com/office/drawing/2014/main" id="{4E95CA58-BC71-4CE1-ACB0-4410970492E6}"/>
+                <a16:creationId xmlns:a16="http://schemas.microsoft.com/office/drawing/2014/main" id="{4E95CA58-BC71-4CE1-ACB0-4410970492E6}"/>
               </a:ext>
             </a:extLst>
           </p:cNvPr>
@@ -2907,13 +2908,6 @@
   <p:clrMapOvr>
     <a:masterClrMapping/>
   </p:clrMapOvr>
-  <p:timing>
-    <p:tnLst>
-      <p:par>
-        <p:cTn id="1" dur="indefinite" restart="never" nodeType="tmRoot"/>
-      </p:par>
-    </p:tnLst>
-  </p:timing>
 </p:sld>
 </file>
 
@@ -2939,7 +2933,7 @@
           <p:cNvPr id="2" name="Title 1">
             <a:extLst>
               <a:ext uri="{FF2B5EF4-FFF2-40B4-BE49-F238E27FC236}">
-                <a16:creationId xmlns="" xmlns:a16="http://schemas.microsoft.com/office/drawing/2014/main" id="{FEF5F440-7918-4A6B-9C7C-C25F5B4AB5DD}"/>
+                <a16:creationId xmlns:a16="http://schemas.microsoft.com/office/drawing/2014/main" id="{FEF5F440-7918-4A6B-9C7C-C25F5B4AB5DD}"/>
               </a:ext>
             </a:extLst>
           </p:cNvPr>
@@ -2967,7 +2961,7 @@
           <p:cNvPr id="3" name="Content Placeholder 2">
             <a:extLst>
               <a:ext uri="{FF2B5EF4-FFF2-40B4-BE49-F238E27FC236}">
-                <a16:creationId xmlns="" xmlns:a16="http://schemas.microsoft.com/office/drawing/2014/main" id="{9E20F2C1-4D76-4D3B-8502-4FA0575D48CD}"/>
+                <a16:creationId xmlns:a16="http://schemas.microsoft.com/office/drawing/2014/main" id="{9E20F2C1-4D76-4D3B-8502-4FA0575D48CD}"/>
               </a:ext>
             </a:extLst>
           </p:cNvPr>
@@ -2995,7 +2989,7 @@
           <p:cNvPr id="4" name="Picture 3">
             <a:extLst>
               <a:ext uri="{FF2B5EF4-FFF2-40B4-BE49-F238E27FC236}">
-                <a16:creationId xmlns="" xmlns:a16="http://schemas.microsoft.com/office/drawing/2014/main" id="{91F19CE3-C79C-4B4E-9DFB-953E12007E9A}"/>
+                <a16:creationId xmlns:a16="http://schemas.microsoft.com/office/drawing/2014/main" id="{91F19CE3-C79C-4B4E-9DFB-953E12007E9A}"/>
               </a:ext>
             </a:extLst>
           </p:cNvPr>
@@ -3030,13 +3024,6 @@
   <p:clrMapOvr>
     <a:masterClrMapping/>
   </p:clrMapOvr>
-  <p:timing>
-    <p:tnLst>
-      <p:par>
-        <p:cTn id="1" dur="indefinite" restart="never" nodeType="tmRoot"/>
-      </p:par>
-    </p:tnLst>
-  </p:timing>
 </p:sld>
 </file>
 
@@ -4823,13 +4810,6 @@
   <p:clrMapOvr>
     <a:masterClrMapping/>
   </p:clrMapOvr>
-  <p:timing>
-    <p:tnLst>
-      <p:par>
-        <p:cTn id="1" dur="indefinite" restart="never" nodeType="tmRoot"/>
-      </p:par>
-    </p:tnLst>
-  </p:timing>
 </p:sld>
 </file>
 
@@ -4855,7 +4835,7 @@
           <p:cNvPr id="2" name="Title 1">
             <a:extLst>
               <a:ext uri="{FF2B5EF4-FFF2-40B4-BE49-F238E27FC236}">
-                <a16:creationId xmlns="" xmlns:a16="http://schemas.microsoft.com/office/drawing/2014/main" id="{FEF5F440-7918-4A6B-9C7C-C25F5B4AB5DD}"/>
+                <a16:creationId xmlns:a16="http://schemas.microsoft.com/office/drawing/2014/main" id="{FEF5F440-7918-4A6B-9C7C-C25F5B4AB5DD}"/>
               </a:ext>
             </a:extLst>
           </p:cNvPr>
@@ -4883,7 +4863,7 @@
           <p:cNvPr id="3" name="Content Placeholder 2">
             <a:extLst>
               <a:ext uri="{FF2B5EF4-FFF2-40B4-BE49-F238E27FC236}">
-                <a16:creationId xmlns="" xmlns:a16="http://schemas.microsoft.com/office/drawing/2014/main" id="{9E20F2C1-4D76-4D3B-8502-4FA0575D48CD}"/>
+                <a16:creationId xmlns:a16="http://schemas.microsoft.com/office/drawing/2014/main" id="{9E20F2C1-4D76-4D3B-8502-4FA0575D48CD}"/>
               </a:ext>
             </a:extLst>
           </p:cNvPr>
@@ -4911,7 +4891,7 @@
           <p:cNvPr id="4" name="Picture 3">
             <a:extLst>
               <a:ext uri="{FF2B5EF4-FFF2-40B4-BE49-F238E27FC236}">
-                <a16:creationId xmlns="" xmlns:a16="http://schemas.microsoft.com/office/drawing/2014/main" id="{91F19CE3-C79C-4B4E-9DFB-953E12007E9A}"/>
+                <a16:creationId xmlns:a16="http://schemas.microsoft.com/office/drawing/2014/main" id="{91F19CE3-C79C-4B4E-9DFB-953E12007E9A}"/>
               </a:ext>
             </a:extLst>
           </p:cNvPr>
@@ -4946,13 +4926,6 @@
   <p:clrMapOvr>
     <a:masterClrMapping/>
   </p:clrMapOvr>
-  <p:timing>
-    <p:tnLst>
-      <p:par>
-        <p:cTn id="1" dur="indefinite" restart="never" nodeType="tmRoot"/>
-      </p:par>
-    </p:tnLst>
-  </p:timing>
 </p:sld>
 </file>
 
@@ -5424,13 +5397,6 @@
   <p:clrMapOvr>
     <a:masterClrMapping/>
   </p:clrMapOvr>
-  <p:timing>
-    <p:tnLst>
-      <p:par>
-        <p:cTn id="1" dur="indefinite" restart="never" nodeType="tmRoot"/>
-      </p:par>
-    </p:tnLst>
-  </p:timing>
 </p:sld>
 </file>
 
@@ -5456,7 +5422,7 @@
           <p:cNvPr id="2" name="Title 1">
             <a:extLst>
               <a:ext uri="{FF2B5EF4-FFF2-40B4-BE49-F238E27FC236}">
-                <a16:creationId xmlns="" xmlns:a16="http://schemas.microsoft.com/office/drawing/2014/main" id="{FEF5F440-7918-4A6B-9C7C-C25F5B4AB5DD}"/>
+                <a16:creationId xmlns:a16="http://schemas.microsoft.com/office/drawing/2014/main" id="{FEF5F440-7918-4A6B-9C7C-C25F5B4AB5DD}"/>
               </a:ext>
             </a:extLst>
           </p:cNvPr>
@@ -5484,7 +5450,7 @@
           <p:cNvPr id="3" name="Content Placeholder 2">
             <a:extLst>
               <a:ext uri="{FF2B5EF4-FFF2-40B4-BE49-F238E27FC236}">
-                <a16:creationId xmlns="" xmlns:a16="http://schemas.microsoft.com/office/drawing/2014/main" id="{9E20F2C1-4D76-4D3B-8502-4FA0575D48CD}"/>
+                <a16:creationId xmlns:a16="http://schemas.microsoft.com/office/drawing/2014/main" id="{9E20F2C1-4D76-4D3B-8502-4FA0575D48CD}"/>
               </a:ext>
             </a:extLst>
           </p:cNvPr>
@@ -5512,7 +5478,7 @@
           <p:cNvPr id="4" name="Picture 3">
             <a:extLst>
               <a:ext uri="{FF2B5EF4-FFF2-40B4-BE49-F238E27FC236}">
-                <a16:creationId xmlns="" xmlns:a16="http://schemas.microsoft.com/office/drawing/2014/main" id="{91F19CE3-C79C-4B4E-9DFB-953E12007E9A}"/>
+                <a16:creationId xmlns:a16="http://schemas.microsoft.com/office/drawing/2014/main" id="{91F19CE3-C79C-4B4E-9DFB-953E12007E9A}"/>
               </a:ext>
             </a:extLst>
           </p:cNvPr>
@@ -5547,13 +5513,6 @@
   <p:clrMapOvr>
     <a:masterClrMapping/>
   </p:clrMapOvr>
-  <p:timing>
-    <p:tnLst>
-      <p:par>
-        <p:cTn id="1" dur="indefinite" restart="never" nodeType="tmRoot"/>
-      </p:par>
-    </p:tnLst>
-  </p:timing>
 </p:sld>
 </file>
 
@@ -7286,13 +7245,6 @@
   <p:clrMapOvr>
     <a:masterClrMapping/>
   </p:clrMapOvr>
-  <p:timing>
-    <p:tnLst>
-      <p:par>
-        <p:cTn id="1" dur="indefinite" restart="never" nodeType="tmRoot"/>
-      </p:par>
-    </p:tnLst>
-  </p:timing>
 </p:sld>
 </file>
 
@@ -7318,7 +7270,7 @@
           <p:cNvPr id="2" name="Title 1">
             <a:extLst>
               <a:ext uri="{FF2B5EF4-FFF2-40B4-BE49-F238E27FC236}">
-                <a16:creationId xmlns="" xmlns:a16="http://schemas.microsoft.com/office/drawing/2014/main" id="{FEF5F440-7918-4A6B-9C7C-C25F5B4AB5DD}"/>
+                <a16:creationId xmlns:a16="http://schemas.microsoft.com/office/drawing/2014/main" id="{FEF5F440-7918-4A6B-9C7C-C25F5B4AB5DD}"/>
               </a:ext>
             </a:extLst>
           </p:cNvPr>
@@ -7346,7 +7298,7 @@
           <p:cNvPr id="3" name="Content Placeholder 2">
             <a:extLst>
               <a:ext uri="{FF2B5EF4-FFF2-40B4-BE49-F238E27FC236}">
-                <a16:creationId xmlns="" xmlns:a16="http://schemas.microsoft.com/office/drawing/2014/main" id="{9E20F2C1-4D76-4D3B-8502-4FA0575D48CD}"/>
+                <a16:creationId xmlns:a16="http://schemas.microsoft.com/office/drawing/2014/main" id="{9E20F2C1-4D76-4D3B-8502-4FA0575D48CD}"/>
               </a:ext>
             </a:extLst>
           </p:cNvPr>
@@ -7374,7 +7326,7 @@
           <p:cNvPr id="4" name="Picture 3">
             <a:extLst>
               <a:ext uri="{FF2B5EF4-FFF2-40B4-BE49-F238E27FC236}">
-                <a16:creationId xmlns="" xmlns:a16="http://schemas.microsoft.com/office/drawing/2014/main" id="{91F19CE3-C79C-4B4E-9DFB-953E12007E9A}"/>
+                <a16:creationId xmlns:a16="http://schemas.microsoft.com/office/drawing/2014/main" id="{91F19CE3-C79C-4B4E-9DFB-953E12007E9A}"/>
               </a:ext>
             </a:extLst>
           </p:cNvPr>
@@ -7409,13 +7361,6 @@
   <p:clrMapOvr>
     <a:masterClrMapping/>
   </p:clrMapOvr>
-  <p:timing>
-    <p:tnLst>
-      <p:par>
-        <p:cTn id="1" dur="indefinite" restart="never" nodeType="tmRoot"/>
-      </p:par>
-    </p:tnLst>
-  </p:timing>
 </p:sld>
 </file>
 
@@ -7492,13 +7437,6 @@
   <p:clrMapOvr>
     <a:masterClrMapping/>
   </p:clrMapOvr>
-  <p:timing>
-    <p:tnLst>
-      <p:par>
-        <p:cTn id="1" dur="indefinite" restart="never" nodeType="tmRoot"/>
-      </p:par>
-    </p:tnLst>
-  </p:timing>
 </p:sld>
 </file>
 
@@ -8531,13 +8469,6 @@
   <p:clrMapOvr>
     <a:masterClrMapping/>
   </p:clrMapOvr>
-  <p:timing>
-    <p:tnLst>
-      <p:par>
-        <p:cTn id="1" dur="indefinite" restart="never" nodeType="tmRoot"/>
-      </p:par>
-    </p:tnLst>
-  </p:timing>
 </p:sld>
 </file>
 
@@ -8614,13 +8545,6 @@
   <p:clrMapOvr>
     <a:masterClrMapping/>
   </p:clrMapOvr>
-  <p:timing>
-    <p:tnLst>
-      <p:par>
-        <p:cTn id="1" dur="indefinite" restart="never" nodeType="tmRoot"/>
-      </p:par>
-    </p:tnLst>
-  </p:timing>
 </p:sld>
 </file>
 
@@ -8646,7 +8570,7 @@
           <p:cNvPr id="2" name="Title 1">
             <a:extLst>
               <a:ext uri="{FF2B5EF4-FFF2-40B4-BE49-F238E27FC236}">
-                <a16:creationId xmlns="" xmlns:a16="http://schemas.microsoft.com/office/drawing/2014/main" id="{FEF5F440-7918-4A6B-9C7C-C25F5B4AB5DD}"/>
+                <a16:creationId xmlns:a16="http://schemas.microsoft.com/office/drawing/2014/main" id="{FEF5F440-7918-4A6B-9C7C-C25F5B4AB5DD}"/>
               </a:ext>
             </a:extLst>
           </p:cNvPr>
@@ -8674,7 +8598,7 @@
           <p:cNvPr id="3" name="Content Placeholder 2">
             <a:extLst>
               <a:ext uri="{FF2B5EF4-FFF2-40B4-BE49-F238E27FC236}">
-                <a16:creationId xmlns="" xmlns:a16="http://schemas.microsoft.com/office/drawing/2014/main" id="{9E20F2C1-4D76-4D3B-8502-4FA0575D48CD}"/>
+                <a16:creationId xmlns:a16="http://schemas.microsoft.com/office/drawing/2014/main" id="{9E20F2C1-4D76-4D3B-8502-4FA0575D48CD}"/>
               </a:ext>
             </a:extLst>
           </p:cNvPr>
@@ -8702,7 +8626,7 @@
           <p:cNvPr id="4" name="Picture 3">
             <a:extLst>
               <a:ext uri="{FF2B5EF4-FFF2-40B4-BE49-F238E27FC236}">
-                <a16:creationId xmlns="" xmlns:a16="http://schemas.microsoft.com/office/drawing/2014/main" id="{91F19CE3-C79C-4B4E-9DFB-953E12007E9A}"/>
+                <a16:creationId xmlns:a16="http://schemas.microsoft.com/office/drawing/2014/main" id="{91F19CE3-C79C-4B4E-9DFB-953E12007E9A}"/>
               </a:ext>
             </a:extLst>
           </p:cNvPr>
@@ -8737,13 +8661,6 @@
   <p:clrMapOvr>
     <a:masterClrMapping/>
   </p:clrMapOvr>
-  <p:timing>
-    <p:tnLst>
-      <p:par>
-        <p:cTn id="1" dur="indefinite" restart="never" nodeType="tmRoot"/>
-      </p:par>
-    </p:tnLst>
-  </p:timing>
 </p:sld>
 </file>
 
@@ -9891,13 +9808,6 @@
   <p:clrMapOvr>
     <a:masterClrMapping/>
   </p:clrMapOvr>
-  <p:timing>
-    <p:tnLst>
-      <p:par>
-        <p:cTn id="1" dur="indefinite" restart="never" nodeType="tmRoot"/>
-      </p:par>
-    </p:tnLst>
-  </p:timing>
 </p:sld>
 </file>
 
@@ -10880,13 +10790,6 @@
   <p:clrMapOvr>
     <a:masterClrMapping/>
   </p:clrMapOvr>
-  <p:timing>
-    <p:tnLst>
-      <p:par>
-        <p:cTn id="1" dur="indefinite" restart="never" nodeType="tmRoot"/>
-      </p:par>
-    </p:tnLst>
-  </p:timing>
 </p:sld>
 </file>
 
@@ -10912,7 +10815,7 @@
           <p:cNvPr id="2" name="Title 1">
             <a:extLst>
               <a:ext uri="{FF2B5EF4-FFF2-40B4-BE49-F238E27FC236}">
-                <a16:creationId xmlns="" xmlns:a16="http://schemas.microsoft.com/office/drawing/2014/main" id="{FEF5F440-7918-4A6B-9C7C-C25F5B4AB5DD}"/>
+                <a16:creationId xmlns:a16="http://schemas.microsoft.com/office/drawing/2014/main" id="{FEF5F440-7918-4A6B-9C7C-C25F5B4AB5DD}"/>
               </a:ext>
             </a:extLst>
           </p:cNvPr>
@@ -10940,7 +10843,7 @@
           <p:cNvPr id="3" name="Content Placeholder 2">
             <a:extLst>
               <a:ext uri="{FF2B5EF4-FFF2-40B4-BE49-F238E27FC236}">
-                <a16:creationId xmlns="" xmlns:a16="http://schemas.microsoft.com/office/drawing/2014/main" id="{9E20F2C1-4D76-4D3B-8502-4FA0575D48CD}"/>
+                <a16:creationId xmlns:a16="http://schemas.microsoft.com/office/drawing/2014/main" id="{9E20F2C1-4D76-4D3B-8502-4FA0575D48CD}"/>
               </a:ext>
             </a:extLst>
           </p:cNvPr>
@@ -10968,7 +10871,7 @@
           <p:cNvPr id="4" name="Picture 3">
             <a:extLst>
               <a:ext uri="{FF2B5EF4-FFF2-40B4-BE49-F238E27FC236}">
-                <a16:creationId xmlns="" xmlns:a16="http://schemas.microsoft.com/office/drawing/2014/main" id="{91F19CE3-C79C-4B4E-9DFB-953E12007E9A}"/>
+                <a16:creationId xmlns:a16="http://schemas.microsoft.com/office/drawing/2014/main" id="{91F19CE3-C79C-4B4E-9DFB-953E12007E9A}"/>
               </a:ext>
             </a:extLst>
           </p:cNvPr>
@@ -11003,13 +10906,6 @@
   <p:clrMapOvr>
     <a:masterClrMapping/>
   </p:clrMapOvr>
-  <p:timing>
-    <p:tnLst>
-      <p:par>
-        <p:cTn id="1" dur="indefinite" restart="never" nodeType="tmRoot"/>
-      </p:par>
-    </p:tnLst>
-  </p:timing>
 </p:sld>
 </file>
 
@@ -11046,10 +10942,9 @@
           <a:lstStyle/>
           <a:p>
             <a:r>
-              <a:rPr lang="en-US" sz="3600" dirty="0" smtClean="0"/>
+              <a:rPr lang="en-US" sz="3600" dirty="0"/>
               <a:t>So if sets are good, really big sets are better, right?</a:t>
             </a:r>
-            <a:endParaRPr lang="en-US" sz="3600" dirty="0"/>
           </a:p>
         </p:txBody>
       </p:sp>
@@ -11073,7 +10968,7 @@
               <a:buChar char="•"/>
             </a:pPr>
             <a:r>
-              <a:rPr lang="en-US" dirty="0" smtClean="0"/>
+              <a:rPr lang="en-US" dirty="0"/>
               <a:t>Transaction log impacts</a:t>
             </a:r>
           </a:p>
@@ -11083,7 +10978,7 @@
               <a:buChar char="•"/>
             </a:pPr>
             <a:r>
-              <a:rPr lang="en-US" dirty="0" smtClean="0"/>
+              <a:rPr lang="en-US" dirty="0"/>
               <a:t>Long-running transactions and clearing the log</a:t>
             </a:r>
           </a:p>
@@ -11093,7 +10988,7 @@
               <a:buChar char="•"/>
             </a:pPr>
             <a:r>
-              <a:rPr lang="en-US" dirty="0" smtClean="0"/>
+              <a:rPr lang="en-US" dirty="0"/>
               <a:t>Log growth</a:t>
             </a:r>
           </a:p>
@@ -11103,7 +10998,7 @@
               <a:buChar char="•"/>
             </a:pPr>
             <a:r>
-              <a:rPr lang="en-US" dirty="0" smtClean="0"/>
+              <a:rPr lang="en-US" dirty="0"/>
               <a:t>Log space reservation</a:t>
             </a:r>
           </a:p>
@@ -11113,7 +11008,7 @@
               <a:buChar char="•"/>
             </a:pPr>
             <a:r>
-              <a:rPr lang="en-US" dirty="0" smtClean="0"/>
+              <a:rPr lang="en-US" dirty="0"/>
               <a:t>What if DB is restored to point in the middle of the operation?</a:t>
             </a:r>
           </a:p>
@@ -11123,11 +11018,11 @@
               <a:buChar char="•"/>
             </a:pPr>
             <a:r>
-              <a:rPr lang="en-US" dirty="0" smtClean="0"/>
+              <a:rPr lang="en-US" dirty="0"/>
               <a:t>Splitting up sets is a bit </a:t>
             </a:r>
             <a:r>
-              <a:rPr lang="en-US" smtClean="0"/>
+              <a:rPr lang="en-US"/>
               <a:t>of an art</a:t>
             </a:r>
             <a:endParaRPr lang="en-US" dirty="0"/>
@@ -11166,7 +11061,13 @@
       </p:grpSpPr>
       <p:sp>
         <p:nvSpPr>
-          <p:cNvPr id="2" name="Title 1"/>
+          <p:cNvPr id="2" name="Title 1">
+            <a:extLst>
+              <a:ext uri="{FF2B5EF4-FFF2-40B4-BE49-F238E27FC236}">
+                <a16:creationId xmlns:a16="http://schemas.microsoft.com/office/drawing/2014/main" id="{CBB17BFA-186D-4C50-B7F0-4DD01FC86CAC}"/>
+              </a:ext>
+            </a:extLst>
+          </p:cNvPr>
           <p:cNvSpPr>
             <a:spLocks noGrp="1"/>
           </p:cNvSpPr>
@@ -11181,19 +11082,20 @@
           <a:p>
             <a:r>
               <a:rPr lang="en-US" dirty="0"/>
-              <a:t>Key Take-</a:t>
-            </a:r>
-            <a:r>
-              <a:rPr lang="en-US" dirty="0" err="1"/>
-              <a:t>Aways</a:t>
-            </a:r>
-            <a:endParaRPr lang="en-US" dirty="0"/>
+              <a:t>Other Stuff</a:t>
+            </a:r>
           </a:p>
         </p:txBody>
       </p:sp>
       <p:sp>
         <p:nvSpPr>
-          <p:cNvPr id="3" name="Content Placeholder 2"/>
+          <p:cNvPr id="3" name="Content Placeholder 2">
+            <a:extLst>
+              <a:ext uri="{FF2B5EF4-FFF2-40B4-BE49-F238E27FC236}">
+                <a16:creationId xmlns:a16="http://schemas.microsoft.com/office/drawing/2014/main" id="{0CED3746-B260-4255-A890-AFA739367053}"/>
+              </a:ext>
+            </a:extLst>
+          </p:cNvPr>
           <p:cNvSpPr>
             <a:spLocks noGrp="1"/>
           </p:cNvSpPr>
@@ -11212,7 +11114,7 @@
             </a:pPr>
             <a:r>
               <a:rPr lang="en-US" dirty="0"/>
-              <a:t>Cursors are usually inefficient</a:t>
+              <a:t>In-Memory OLTP changes things</a:t>
             </a:r>
           </a:p>
           <a:p>
@@ -11222,43 +11124,15 @@
             </a:pPr>
             <a:r>
               <a:rPr lang="en-US" dirty="0"/>
-              <a:t>If necessary, declare as </a:t>
-            </a:r>
-            <a:r>
-              <a:rPr lang="en-US" dirty="0" err="1">
-                <a:solidFill>
-                  <a:srgbClr val="0000FF"/>
-                </a:solidFill>
-                <a:highlight>
-                  <a:srgbClr val="FFFFFF"/>
-                </a:highlight>
-                <a:latin typeface="Consolas" panose="020B0609020204030204" pitchFamily="49" charset="0"/>
-              </a:rPr>
-              <a:t>fast_forward</a:t>
-            </a:r>
-            <a:r>
-              <a:rPr lang="en-US" dirty="0">
-                <a:solidFill>
-                  <a:srgbClr val="000000"/>
-                </a:solidFill>
-                <a:highlight>
-                  <a:srgbClr val="FFFFFF"/>
-                </a:highlight>
-                <a:latin typeface="Consolas" panose="020B0609020204030204" pitchFamily="49" charset="0"/>
-              </a:rPr>
-              <a:t> </a:t>
-            </a:r>
-            <a:r>
-              <a:rPr lang="en-US" dirty="0" err="1">
-                <a:solidFill>
-                  <a:srgbClr val="0000FF"/>
-                </a:solidFill>
-                <a:highlight>
-                  <a:srgbClr val="FFFFFF"/>
-                </a:highlight>
-                <a:latin typeface="Consolas" panose="020B0609020204030204" pitchFamily="49" charset="0"/>
-              </a:rPr>
-              <a:t>read_only</a:t>
+              <a:t>aka </a:t>
+            </a:r>
+            <a:r>
+              <a:rPr lang="en-US" dirty="0" err="1"/>
+              <a:t>Hekaton</a:t>
+            </a:r>
+            <a:r>
+              <a:rPr lang="en-US"/>
+              <a:t>, new in SQL 2014</a:t>
             </a:r>
             <a:endParaRPr lang="en-US" dirty="0"/>
           </a:p>
@@ -11269,7 +11143,7 @@
             </a:pPr>
             <a:r>
               <a:rPr lang="en-US" dirty="0"/>
-              <a:t>Still necessary for lots of admin functionality</a:t>
+              <a:t>If natively compiled</a:t>
             </a:r>
           </a:p>
           <a:p>
@@ -11279,17 +11153,7 @@
             </a:pPr>
             <a:r>
               <a:rPr lang="en-US" dirty="0"/>
-              <a:t>Pre-2012, still best way to do running totals, etc.</a:t>
-            </a:r>
-          </a:p>
-          <a:p>
-            <a:pPr marL="571500" indent="-571500">
-              <a:buFont typeface="Arial" panose="020B0604020202020204" pitchFamily="34" charset="0"/>
-              <a:buChar char="•"/>
-            </a:pPr>
-            <a:r>
-              <a:rPr lang="en-US" dirty="0"/>
-              <a:t>Triangle joins are evil</a:t>
+              <a:t>Loops with data access perform well</a:t>
             </a:r>
           </a:p>
           <a:p>
@@ -11297,27 +11161,23 @@
               <a:buFont typeface="Arial" panose="020B0604020202020204" pitchFamily="34" charset="0"/>
               <a:buChar char="•"/>
             </a:pPr>
-            <a:endParaRPr lang="en-US" dirty="0"/>
+            <a:r>
+              <a:rPr lang="en-US" dirty="0"/>
+              <a:t>Beware of limitations</a:t>
+            </a:r>
           </a:p>
         </p:txBody>
       </p:sp>
     </p:spTree>
     <p:extLst>
       <p:ext uri="{BB962C8B-B14F-4D97-AF65-F5344CB8AC3E}">
-        <p14:creationId xmlns:p14="http://schemas.microsoft.com/office/powerpoint/2010/main" val="2597850043"/>
+        <p14:creationId xmlns:p14="http://schemas.microsoft.com/office/powerpoint/2010/main" val="1758122117"/>
       </p:ext>
     </p:extLst>
   </p:cSld>
   <p:clrMapOvr>
     <a:masterClrMapping/>
   </p:clrMapOvr>
-  <p:timing>
-    <p:tnLst>
-      <p:par>
-        <p:cTn id="1" dur="indefinite" restart="never" nodeType="tmRoot"/>
-      </p:par>
-    </p:tnLst>
-  </p:timing>
 </p:sld>
 </file>
 
@@ -11386,7 +11246,7 @@
             </a:pPr>
             <a:r>
               <a:rPr lang="en-US" dirty="0"/>
-              <a:t>Avoid most UDFs</a:t>
+              <a:t>Cursors are usually inefficient</a:t>
             </a:r>
           </a:p>
           <a:p>
@@ -11396,8 +11256,45 @@
             </a:pPr>
             <a:r>
               <a:rPr lang="en-US" dirty="0"/>
-              <a:t>Scalar and multi-statement TVFs with data access tend to perform poorly</a:t>
-            </a:r>
+              <a:t>If necessary, declare as </a:t>
+            </a:r>
+            <a:r>
+              <a:rPr lang="en-US" dirty="0" err="1">
+                <a:solidFill>
+                  <a:srgbClr val="0000FF"/>
+                </a:solidFill>
+                <a:highlight>
+                  <a:srgbClr val="FFFFFF"/>
+                </a:highlight>
+                <a:latin typeface="Consolas" panose="020B0609020204030204" pitchFamily="49" charset="0"/>
+              </a:rPr>
+              <a:t>fast_forward</a:t>
+            </a:r>
+            <a:r>
+              <a:rPr lang="en-US" dirty="0">
+                <a:solidFill>
+                  <a:srgbClr val="000000"/>
+                </a:solidFill>
+                <a:highlight>
+                  <a:srgbClr val="FFFFFF"/>
+                </a:highlight>
+                <a:latin typeface="Consolas" panose="020B0609020204030204" pitchFamily="49" charset="0"/>
+              </a:rPr>
+              <a:t> </a:t>
+            </a:r>
+            <a:r>
+              <a:rPr lang="en-US" dirty="0" err="1">
+                <a:solidFill>
+                  <a:srgbClr val="0000FF"/>
+                </a:solidFill>
+                <a:highlight>
+                  <a:srgbClr val="FFFFFF"/>
+                </a:highlight>
+                <a:latin typeface="Consolas" panose="020B0609020204030204" pitchFamily="49" charset="0"/>
+              </a:rPr>
+              <a:t>read_only</a:t>
+            </a:r>
+            <a:endParaRPr lang="en-US" dirty="0"/>
           </a:p>
           <a:p>
             <a:pPr marL="1147527" lvl="1" indent="-571500">
@@ -11406,7 +11303,17 @@
             </a:pPr>
             <a:r>
               <a:rPr lang="en-US" dirty="0"/>
-              <a:t>CLR with data access tends to perform poorly</a:t>
+              <a:t>Still necessary for lots of admin functionality</a:t>
+            </a:r>
+          </a:p>
+          <a:p>
+            <a:pPr marL="1147527" lvl="1" indent="-571500">
+              <a:buFont typeface="Arial" panose="020B0604020202020204" pitchFamily="34" charset="0"/>
+              <a:buChar char="•"/>
+            </a:pPr>
+            <a:r>
+              <a:rPr lang="en-US" dirty="0"/>
+              <a:t>Pre-2012, still best way to do running totals, etc.</a:t>
             </a:r>
           </a:p>
           <a:p>
@@ -11416,28 +11323,28 @@
             </a:pPr>
             <a:r>
               <a:rPr lang="en-US" dirty="0"/>
-              <a:t>Inline TVFs generally optimize well and tend to perform nicely</a:t>
-            </a:r>
+              <a:t>Triangle joins are evil</a:t>
+            </a:r>
+          </a:p>
+          <a:p>
+            <a:pPr marL="1147527" lvl="1" indent="-571500">
+              <a:buFont typeface="Arial" panose="020B0604020202020204" pitchFamily="34" charset="0"/>
+              <a:buChar char="•"/>
+            </a:pPr>
+            <a:endParaRPr lang="en-US" dirty="0"/>
           </a:p>
         </p:txBody>
       </p:sp>
     </p:spTree>
     <p:extLst>
       <p:ext uri="{BB962C8B-B14F-4D97-AF65-F5344CB8AC3E}">
-        <p14:creationId xmlns:p14="http://schemas.microsoft.com/office/powerpoint/2010/main" val="3534619094"/>
+        <p14:creationId xmlns:p14="http://schemas.microsoft.com/office/powerpoint/2010/main" val="2597850043"/>
       </p:ext>
     </p:extLst>
   </p:cSld>
   <p:clrMapOvr>
     <a:masterClrMapping/>
   </p:clrMapOvr>
-  <p:timing>
-    <p:tnLst>
-      <p:par>
-        <p:cTn id="1" dur="indefinite" restart="never" nodeType="tmRoot"/>
-      </p:par>
-    </p:tnLst>
-  </p:timing>
 </p:sld>
 </file>
 
@@ -11506,35 +11413,27 @@
             </a:pPr>
             <a:r>
               <a:rPr lang="en-US" dirty="0"/>
-              <a:t>Embrace </a:t>
-            </a:r>
-            <a:r>
-              <a:rPr lang="en-US" dirty="0" err="1">
-                <a:solidFill>
-                  <a:srgbClr val="FF00FF"/>
-                </a:solidFill>
-                <a:highlight>
-                  <a:srgbClr val="FFFFFF"/>
-                </a:highlight>
-                <a:latin typeface="Consolas" panose="020B0609020204030204" pitchFamily="49" charset="0"/>
-              </a:rPr>
-              <a:t>row_number</a:t>
-            </a:r>
-            <a:r>
-              <a:rPr lang="en-US" dirty="0">
-                <a:solidFill>
-                  <a:srgbClr val="808080"/>
-                </a:solidFill>
-                <a:highlight>
-                  <a:srgbClr val="FFFFFF"/>
-                </a:highlight>
-                <a:latin typeface="Consolas" panose="020B0609020204030204" pitchFamily="49" charset="0"/>
-              </a:rPr>
-              <a:t>()</a:t>
-            </a:r>
+              <a:t>Avoid most UDFs</a:t>
+            </a:r>
+          </a:p>
+          <a:p>
+            <a:pPr marL="1147527" lvl="1" indent="-571500">
+              <a:buFont typeface="Arial" panose="020B0604020202020204" pitchFamily="34" charset="0"/>
+              <a:buChar char="•"/>
+            </a:pPr>
             <a:r>
               <a:rPr lang="en-US" dirty="0"/>
-              <a:t>: It is much more useful than just for counting rows</a:t>
+              <a:t>Scalar and multi-statement TVFs with data access tend to perform poorly</a:t>
+            </a:r>
+          </a:p>
+          <a:p>
+            <a:pPr marL="1147527" lvl="1" indent="-571500">
+              <a:buFont typeface="Arial" panose="020B0604020202020204" pitchFamily="34" charset="0"/>
+              <a:buChar char="•"/>
+            </a:pPr>
+            <a:r>
+              <a:rPr lang="en-US" dirty="0"/>
+              <a:t>CLR with data access tends to perform poorly</a:t>
             </a:r>
           </a:p>
           <a:p>
@@ -11544,72 +11443,21 @@
             </a:pPr>
             <a:r>
               <a:rPr lang="en-US" dirty="0"/>
-              <a:t>Embrace windowing functions</a:t>
-            </a:r>
-          </a:p>
-          <a:p>
-            <a:pPr marL="571500" indent="-571500">
-              <a:buFont typeface="Arial" panose="020B0604020202020204" pitchFamily="34" charset="0"/>
-              <a:buChar char="•"/>
-            </a:pPr>
-            <a:r>
-              <a:rPr lang="en-US" dirty="0"/>
-              <a:t>Embrace </a:t>
-            </a:r>
-            <a:r>
-              <a:rPr lang="en-US" dirty="0">
-                <a:solidFill>
-                  <a:srgbClr val="808080"/>
-                </a:solidFill>
-                <a:highlight>
-                  <a:srgbClr val="FFFFFF"/>
-                </a:highlight>
-                <a:latin typeface="Consolas" panose="020B0609020204030204" pitchFamily="49" charset="0"/>
-              </a:rPr>
-              <a:t>apply</a:t>
-            </a:r>
-            <a:endParaRPr lang="en-US" dirty="0"/>
-          </a:p>
-          <a:p>
-            <a:pPr marL="1147527" lvl="1" indent="-571500">
-              <a:buFont typeface="Arial" panose="020B0604020202020204" pitchFamily="34" charset="0"/>
-              <a:buChar char="•"/>
-            </a:pPr>
-            <a:r>
-              <a:rPr lang="en-US" dirty="0"/>
-              <a:t>Easy way to improve many scalar UDFs</a:t>
-            </a:r>
-          </a:p>
-          <a:p>
-            <a:pPr marL="571500" indent="-571500">
-              <a:buFont typeface="Arial" panose="020B0604020202020204" pitchFamily="34" charset="0"/>
-              <a:buChar char="•"/>
-            </a:pPr>
-            <a:r>
-              <a:rPr lang="en-US" dirty="0" smtClean="0"/>
-              <a:t>May need to split up very large sets</a:t>
-            </a:r>
-            <a:endParaRPr lang="en-US" dirty="0"/>
+              <a:t>Inline TVFs generally optimize well and tend to perform nicely</a:t>
+            </a:r>
           </a:p>
         </p:txBody>
       </p:sp>
     </p:spTree>
     <p:extLst>
       <p:ext uri="{BB962C8B-B14F-4D97-AF65-F5344CB8AC3E}">
-        <p14:creationId xmlns:p14="http://schemas.microsoft.com/office/powerpoint/2010/main" val="2743941419"/>
+        <p14:creationId xmlns:p14="http://schemas.microsoft.com/office/powerpoint/2010/main" val="3534619094"/>
       </p:ext>
     </p:extLst>
   </p:cSld>
   <p:clrMapOvr>
     <a:masterClrMapping/>
   </p:clrMapOvr>
-  <p:timing>
-    <p:tnLst>
-      <p:par>
-        <p:cTn id="1" dur="indefinite" restart="never" nodeType="tmRoot"/>
-      </p:par>
-    </p:tnLst>
-  </p:timing>
 </p:sld>
 </file>
 
@@ -11647,8 +11495,13 @@
           <a:p>
             <a:r>
               <a:rPr lang="en-US" dirty="0"/>
-              <a:t>Thank You</a:t>
-            </a:r>
+              <a:t>Key Take-</a:t>
+            </a:r>
+            <a:r>
+              <a:rPr lang="en-US" dirty="0" err="1"/>
+              <a:t>Aways</a:t>
+            </a:r>
+            <a:endParaRPr lang="en-US" dirty="0"/>
           </a:p>
         </p:txBody>
       </p:sp>
@@ -11664,63 +11517,97 @@
         </p:nvSpPr>
         <p:spPr/>
         <p:txBody>
-          <a:bodyPr>
-            <a:normAutofit lnSpcReduction="10000"/>
-          </a:bodyPr>
+          <a:bodyPr/>
           <a:lstStyle/>
           <a:p>
+            <a:pPr marL="571500" indent="-571500">
+              <a:buFont typeface="Arial" panose="020B0604020202020204" pitchFamily="34" charset="0"/>
+              <a:buChar char="•"/>
+            </a:pPr>
             <a:r>
               <a:rPr lang="en-US" dirty="0"/>
-              <a:t>This presentation and supporting materials can be found at </a:t>
-            </a:r>
-            <a:r>
-              <a:rPr lang="en-US" dirty="0">
-                <a:hlinkClick r:id="rId2"/>
-              </a:rPr>
-              <a:t>www.tf3604.com/sets</a:t>
+              <a:t>Embrace </a:t>
+            </a:r>
+            <a:r>
+              <a:rPr lang="en-US" dirty="0" err="1">
+                <a:solidFill>
+                  <a:srgbClr val="FF00FF"/>
+                </a:solidFill>
+                <a:highlight>
+                  <a:srgbClr val="FFFFFF"/>
+                </a:highlight>
+                <a:latin typeface="Consolas" panose="020B0609020204030204" pitchFamily="49" charset="0"/>
+              </a:rPr>
+              <a:t>row_number</a:t>
+            </a:r>
+            <a:r>
+              <a:rPr lang="en-US" dirty="0">
+                <a:solidFill>
+                  <a:srgbClr val="808080"/>
+                </a:solidFill>
+                <a:highlight>
+                  <a:srgbClr val="FFFFFF"/>
+                </a:highlight>
+                <a:latin typeface="Consolas" panose="020B0609020204030204" pitchFamily="49" charset="0"/>
+              </a:rPr>
+              <a:t>()</a:t>
             </a:r>
             <a:r>
               <a:rPr lang="en-US" dirty="0"/>
-              <a:t>.</a:t>
-            </a:r>
-          </a:p>
-          <a:p>
-            <a:pPr lvl="1"/>
+              <a:t>: It is much more useful than just for counting rows</a:t>
+            </a:r>
+          </a:p>
+          <a:p>
+            <a:pPr marL="571500" indent="-571500">
+              <a:buFont typeface="Arial" panose="020B0604020202020204" pitchFamily="34" charset="0"/>
+              <a:buChar char="•"/>
+            </a:pPr>
             <a:r>
               <a:rPr lang="en-US" dirty="0"/>
-              <a:t>Slide deck</a:t>
-            </a:r>
-          </a:p>
-          <a:p>
-            <a:pPr lvl="1"/>
+              <a:t>Embrace windowing functions</a:t>
+            </a:r>
+          </a:p>
+          <a:p>
+            <a:pPr marL="571500" indent="-571500">
+              <a:buFont typeface="Arial" panose="020B0604020202020204" pitchFamily="34" charset="0"/>
+              <a:buChar char="•"/>
+            </a:pPr>
             <a:r>
               <a:rPr lang="en-US" dirty="0"/>
-              <a:t>Scripts</a:t>
-            </a:r>
-          </a:p>
-          <a:p>
-            <a:pPr lvl="1"/>
+              <a:t>Embrace </a:t>
+            </a:r>
+            <a:r>
+              <a:rPr lang="en-US" dirty="0">
+                <a:solidFill>
+                  <a:srgbClr val="808080"/>
+                </a:solidFill>
+                <a:highlight>
+                  <a:srgbClr val="FFFFFF"/>
+                </a:highlight>
+                <a:latin typeface="Consolas" panose="020B0609020204030204" pitchFamily="49" charset="0"/>
+              </a:rPr>
+              <a:t>apply</a:t>
+            </a:r>
+            <a:endParaRPr lang="en-US" dirty="0"/>
+          </a:p>
+          <a:p>
+            <a:pPr marL="1147527" lvl="1" indent="-571500">
+              <a:buFont typeface="Arial" panose="020B0604020202020204" pitchFamily="34" charset="0"/>
+              <a:buChar char="•"/>
+            </a:pPr>
             <a:r>
               <a:rPr lang="en-US" dirty="0"/>
-              <a:t>Sample database</a:t>
-            </a:r>
-          </a:p>
-          <a:p>
-            <a:pPr lvl="1"/>
-            <a:endParaRPr lang="en-US" dirty="0"/>
-          </a:p>
-          <a:p>
-            <a:endParaRPr lang="en-US" dirty="0"/>
-          </a:p>
-          <a:p>
-            <a:pPr algn="ctr"/>
-            <a:r>
-              <a:rPr lang="en-US" dirty="0">
-                <a:solidFill>
-                  <a:schemeClr val="tx1"/>
-                </a:solidFill>
-              </a:rPr>
-              <a:t>brian@tf3604.com	• @tf3604</a:t>
+              <a:t>Easy way to improve many scalar UDFs</a:t>
+            </a:r>
+          </a:p>
+          <a:p>
+            <a:pPr marL="571500" indent="-571500">
+              <a:buFont typeface="Arial" panose="020B0604020202020204" pitchFamily="34" charset="0"/>
+              <a:buChar char="•"/>
+            </a:pPr>
+            <a:r>
+              <a:rPr lang="en-US" dirty="0"/>
+              <a:t>May need to split up very large sets</a:t>
             </a:r>
           </a:p>
         </p:txBody>
@@ -11728,20 +11615,13 @@
     </p:spTree>
     <p:extLst>
       <p:ext uri="{BB962C8B-B14F-4D97-AF65-F5344CB8AC3E}">
-        <p14:creationId xmlns:p14="http://schemas.microsoft.com/office/powerpoint/2010/main" val="428730416"/>
+        <p14:creationId xmlns:p14="http://schemas.microsoft.com/office/powerpoint/2010/main" val="2743941419"/>
       </p:ext>
     </p:extLst>
   </p:cSld>
   <p:clrMapOvr>
     <a:masterClrMapping/>
   </p:clrMapOvr>
-  <p:timing>
-    <p:tnLst>
-      <p:par>
-        <p:cTn id="1" dur="indefinite" restart="never" nodeType="tmRoot"/>
-      </p:par>
-    </p:tnLst>
-  </p:timing>
 </p:sld>
 </file>
 
@@ -11840,14 +11720,131 @@
   <p:clrMapOvr>
     <a:masterClrMapping/>
   </p:clrMapOvr>
-  <mc:AlternateContent xmlns:mc="http://schemas.openxmlformats.org/markup-compatibility/2006" xmlns:p14="http://schemas.microsoft.com/office/powerpoint/2010/main">
-    <mc:Choice Requires="p14">
-      <p:transition spd="slow" p14:dur="2000"/>
-    </mc:Choice>
-    <mc:Fallback xmlns="">
-      <p:transition spd="slow"/>
-    </mc:Fallback>
-  </mc:AlternateContent>
+</p:sld>
+</file>
+
+<file path=ppt/slides/slide30.xml><?xml version="1.0" encoding="utf-8"?>
+<p:sld xmlns:a="http://schemas.openxmlformats.org/drawingml/2006/main" xmlns:r="http://schemas.openxmlformats.org/officeDocument/2006/relationships" xmlns:p="http://schemas.openxmlformats.org/presentationml/2006/main">
+  <p:cSld>
+    <p:spTree>
+      <p:nvGrpSpPr>
+        <p:cNvPr id="1" name=""/>
+        <p:cNvGrpSpPr/>
+        <p:nvPr/>
+      </p:nvGrpSpPr>
+      <p:grpSpPr>
+        <a:xfrm>
+          <a:off x="0" y="0"/>
+          <a:ext cx="0" cy="0"/>
+          <a:chOff x="0" y="0"/>
+          <a:chExt cx="0" cy="0"/>
+        </a:xfrm>
+      </p:grpSpPr>
+      <p:sp>
+        <p:nvSpPr>
+          <p:cNvPr id="2" name="Title 1"/>
+          <p:cNvSpPr>
+            <a:spLocks noGrp="1"/>
+          </p:cNvSpPr>
+          <p:nvPr>
+            <p:ph type="title"/>
+          </p:nvPr>
+        </p:nvSpPr>
+        <p:spPr/>
+        <p:txBody>
+          <a:bodyPr/>
+          <a:lstStyle/>
+          <a:p>
+            <a:r>
+              <a:rPr lang="en-US" dirty="0"/>
+              <a:t>Thank You</a:t>
+            </a:r>
+          </a:p>
+        </p:txBody>
+      </p:sp>
+      <p:sp>
+        <p:nvSpPr>
+          <p:cNvPr id="3" name="Content Placeholder 2"/>
+          <p:cNvSpPr>
+            <a:spLocks noGrp="1"/>
+          </p:cNvSpPr>
+          <p:nvPr>
+            <p:ph idx="1"/>
+          </p:nvPr>
+        </p:nvSpPr>
+        <p:spPr/>
+        <p:txBody>
+          <a:bodyPr>
+            <a:normAutofit lnSpcReduction="10000"/>
+          </a:bodyPr>
+          <a:lstStyle/>
+          <a:p>
+            <a:r>
+              <a:rPr lang="en-US" dirty="0"/>
+              <a:t>This presentation and supporting materials can be found at </a:t>
+            </a:r>
+            <a:r>
+              <a:rPr lang="en-US" dirty="0">
+                <a:hlinkClick r:id="rId2"/>
+              </a:rPr>
+              <a:t>www.tf3604.com/sets</a:t>
+            </a:r>
+            <a:r>
+              <a:rPr lang="en-US" dirty="0"/>
+              <a:t>.</a:t>
+            </a:r>
+          </a:p>
+          <a:p>
+            <a:pPr lvl="1"/>
+            <a:r>
+              <a:rPr lang="en-US" dirty="0"/>
+              <a:t>Slide deck</a:t>
+            </a:r>
+          </a:p>
+          <a:p>
+            <a:pPr lvl="1"/>
+            <a:r>
+              <a:rPr lang="en-US" dirty="0"/>
+              <a:t>Scripts</a:t>
+            </a:r>
+          </a:p>
+          <a:p>
+            <a:pPr lvl="1"/>
+            <a:r>
+              <a:rPr lang="en-US" dirty="0"/>
+              <a:t>Sample database</a:t>
+            </a:r>
+          </a:p>
+          <a:p>
+            <a:pPr lvl="1"/>
+            <a:endParaRPr lang="en-US" dirty="0"/>
+          </a:p>
+          <a:p>
+            <a:endParaRPr lang="en-US" dirty="0"/>
+          </a:p>
+          <a:p>
+            <a:pPr algn="ctr"/>
+            <a:r>
+              <a:rPr lang="en-US" dirty="0">
+                <a:solidFill>
+                  <a:schemeClr val="tx1"/>
+                </a:solidFill>
+              </a:rPr>
+              <a:t>brian@tf3604.com	• @tf3604</a:t>
+            </a:r>
+          </a:p>
+        </p:txBody>
+      </p:sp>
+    </p:spTree>
+    <p:extLst>
+      <p:ext uri="{BB962C8B-B14F-4D97-AF65-F5344CB8AC3E}">
+        <p14:creationId xmlns:p14="http://schemas.microsoft.com/office/powerpoint/2010/main" val="428730416"/>
+      </p:ext>
+    </p:extLst>
+  </p:cSld>
+  <p:clrMapOvr>
+    <a:masterClrMapping/>
+  </p:clrMapOvr>
 </p:sld>
 </file>
 
@@ -12008,13 +12005,6 @@
   <p:clrMapOvr>
     <a:masterClrMapping/>
   </p:clrMapOvr>
-  <p:timing>
-    <p:tnLst>
-      <p:par>
-        <p:cTn id="1" dur="indefinite" restart="never" nodeType="tmRoot"/>
-      </p:par>
-    </p:tnLst>
-  </p:timing>
 </p:sld>
 </file>
 
@@ -12089,7 +12079,7 @@
           <p:cNvPr id="4" name="Picture 3">
             <a:extLst>
               <a:ext uri="{FF2B5EF4-FFF2-40B4-BE49-F238E27FC236}">
-                <a16:creationId xmlns="" xmlns:a16="http://schemas.microsoft.com/office/drawing/2014/main" id="{90DA072C-7926-41E0-B73D-643B0D73A159}"/>
+                <a16:creationId xmlns:a16="http://schemas.microsoft.com/office/drawing/2014/main" id="{90DA072C-7926-41E0-B73D-643B0D73A159}"/>
               </a:ext>
             </a:extLst>
           </p:cNvPr>
@@ -12119,7 +12109,7 @@
           <p:cNvPr id="5" name="Picture 4">
             <a:extLst>
               <a:ext uri="{FF2B5EF4-FFF2-40B4-BE49-F238E27FC236}">
-                <a16:creationId xmlns="" xmlns:a16="http://schemas.microsoft.com/office/drawing/2014/main" id="{B4DA9823-AE8A-4DEE-9F72-FF82E5364AF8}"/>
+                <a16:creationId xmlns:a16="http://schemas.microsoft.com/office/drawing/2014/main" id="{B4DA9823-AE8A-4DEE-9F72-FF82E5364AF8}"/>
               </a:ext>
             </a:extLst>
           </p:cNvPr>
@@ -12149,7 +12139,7 @@
           <p:cNvPr id="6" name="Picture 5">
             <a:extLst>
               <a:ext uri="{FF2B5EF4-FFF2-40B4-BE49-F238E27FC236}">
-                <a16:creationId xmlns="" xmlns:a16="http://schemas.microsoft.com/office/drawing/2014/main" id="{6CBAB9CC-BE18-4833-9C69-EF84E94F5264}"/>
+                <a16:creationId xmlns:a16="http://schemas.microsoft.com/office/drawing/2014/main" id="{6CBAB9CC-BE18-4833-9C69-EF84E94F5264}"/>
               </a:ext>
             </a:extLst>
           </p:cNvPr>
@@ -12179,7 +12169,7 @@
           <p:cNvPr id="7" name="Picture 6">
             <a:extLst>
               <a:ext uri="{FF2B5EF4-FFF2-40B4-BE49-F238E27FC236}">
-                <a16:creationId xmlns="" xmlns:a16="http://schemas.microsoft.com/office/drawing/2014/main" id="{BFB3D48D-7586-44AA-B3A8-BA0BC32CCCDD}"/>
+                <a16:creationId xmlns:a16="http://schemas.microsoft.com/office/drawing/2014/main" id="{BFB3D48D-7586-44AA-B3A8-BA0BC32CCCDD}"/>
               </a:ext>
             </a:extLst>
           </p:cNvPr>
@@ -12487,7 +12477,7 @@
           <p:cNvPr id="5" name="Content Placeholder 4">
             <a:extLst>
               <a:ext uri="{FF2B5EF4-FFF2-40B4-BE49-F238E27FC236}">
-                <a16:creationId xmlns="" xmlns:a16="http://schemas.microsoft.com/office/drawing/2014/main" id="{EA577935-A7F7-4DF4-95F2-8BF0108D9ACF}"/>
+                <a16:creationId xmlns:a16="http://schemas.microsoft.com/office/drawing/2014/main" id="{EA577935-A7F7-4DF4-95F2-8BF0108D9ACF}"/>
               </a:ext>
             </a:extLst>
           </p:cNvPr>
@@ -13515,13 +13505,6 @@
   <p:clrMapOvr>
     <a:masterClrMapping/>
   </p:clrMapOvr>
-  <p:timing>
-    <p:tnLst>
-      <p:par>
-        <p:cTn id="1" dur="indefinite" restart="never" nodeType="tmRoot"/>
-      </p:par>
-    </p:tnLst>
-  </p:timing>
 </p:sld>
 </file>
 
@@ -13569,7 +13552,7 @@
           <p:cNvPr id="5" name="Content Placeholder 4">
             <a:extLst>
               <a:ext uri="{FF2B5EF4-FFF2-40B4-BE49-F238E27FC236}">
-                <a16:creationId xmlns="" xmlns:a16="http://schemas.microsoft.com/office/drawing/2014/main" id="{EA577935-A7F7-4DF4-95F2-8BF0108D9ACF}"/>
+                <a16:creationId xmlns:a16="http://schemas.microsoft.com/office/drawing/2014/main" id="{EA577935-A7F7-4DF4-95F2-8BF0108D9ACF}"/>
               </a:ext>
             </a:extLst>
           </p:cNvPr>
@@ -15601,13 +15584,6 @@
   <p:clrMapOvr>
     <a:masterClrMapping/>
   </p:clrMapOvr>
-  <p:timing>
-    <p:tnLst>
-      <p:par>
-        <p:cTn id="1" dur="indefinite" restart="never" nodeType="tmRoot"/>
-      </p:par>
-    </p:tnLst>
-  </p:timing>
 </p:sld>
 </file>
 
@@ -15663,7 +15639,7 @@
           <p:cNvPr id="5" name="Content Placeholder 4">
             <a:extLst>
               <a:ext uri="{FF2B5EF4-FFF2-40B4-BE49-F238E27FC236}">
-                <a16:creationId xmlns="" xmlns:a16="http://schemas.microsoft.com/office/drawing/2014/main" id="{EA577935-A7F7-4DF4-95F2-8BF0108D9ACF}"/>
+                <a16:creationId xmlns:a16="http://schemas.microsoft.com/office/drawing/2014/main" id="{EA577935-A7F7-4DF4-95F2-8BF0108D9ACF}"/>
               </a:ext>
             </a:extLst>
           </p:cNvPr>
@@ -16183,13 +16159,6 @@
   <p:clrMapOvr>
     <a:masterClrMapping/>
   </p:clrMapOvr>
-  <p:timing>
-    <p:tnLst>
-      <p:par>
-        <p:cTn id="1" dur="indefinite" restart="never" nodeType="tmRoot"/>
-      </p:par>
-    </p:tnLst>
-  </p:timing>
 </p:sld>
 </file>
 
@@ -16355,13 +16324,6 @@
   <p:clrMapOvr>
     <a:masterClrMapping/>
   </p:clrMapOvr>
-  <p:timing>
-    <p:tnLst>
-      <p:par>
-        <p:cTn id="1" dur="indefinite" restart="never" nodeType="tmRoot"/>
-      </p:par>
-    </p:tnLst>
-  </p:timing>
 </p:sld>
 </file>
 

</xml_diff>

<commit_message>
Change title slide for Sioux Falls 2017.
</commit_message>
<xml_diff>
--- a/HowToThinkInSets.pptx
+++ b/HowToThinkInSets.pptx
@@ -241,7 +241,7 @@
           <a:p>
             <a:fld id="{3CD51548-82AA-4A2B-B152-1D3266E0F652}" type="datetimeFigureOut">
               <a:rPr lang="en-US" smtClean="0"/>
-              <a:t>7/29/2017</a:t>
+              <a:t>8/1/2017</a:t>
             </a:fld>
             <a:endParaRPr lang="en-US"/>
           </a:p>
@@ -2431,7 +2431,7 @@
           <a:graphicData uri="http://schemas.openxmlformats.org/presentationml/2006/ole">
             <mc:AlternateContent xmlns:mc="http://schemas.openxmlformats.org/markup-compatibility/2006">
               <mc:Choice xmlns:v="urn:schemas-microsoft-com:vml" Requires="v">
-                <p:oleObj spid="_x0000_s1082" name="Image" r:id="rId10" imgW="2279520" imgH="1310400" progId="Photoshop.Image.18">
+                <p:oleObj spid="_x0000_s1084" name="Image" r:id="rId10" imgW="2279520" imgH="1310400" progId="Photoshop.Image.18">
                   <p:embed/>
                 </p:oleObj>
               </mc:Choice>
@@ -2820,9 +2820,44 @@
           <a:lstStyle/>
           <a:p>
             <a:r>
-              <a:rPr lang="en-US" sz="5400" dirty="0"/>
-              <a:t>Set Me Up: How to Think in Sets</a:t>
-            </a:r>
+              <a:rPr lang="en-US" sz="3200" dirty="0">
+                <a:solidFill>
+                  <a:schemeClr val="accent1"/>
+                </a:solidFill>
+              </a:rPr>
+              <a:t>Brian Hansen</a:t>
+            </a:r>
+            <a:br>
+              <a:rPr lang="en-US" sz="3200" dirty="0">
+                <a:solidFill>
+                  <a:schemeClr val="accent1"/>
+                </a:solidFill>
+              </a:rPr>
+            </a:br>
+            <a:r>
+              <a:rPr lang="en-US" sz="3200" dirty="0">
+                <a:solidFill>
+                  <a:schemeClr val="accent1"/>
+                </a:solidFill>
+              </a:rPr>
+              <a:t>brian@tf3604.com</a:t>
+            </a:r>
+            <a:br>
+              <a:rPr lang="en-US" sz="3200" dirty="0">
+                <a:solidFill>
+                  <a:schemeClr val="accent1"/>
+                </a:solidFill>
+              </a:rPr>
+            </a:br>
+            <a:r>
+              <a:rPr lang="en-US" sz="3200" dirty="0">
+                <a:solidFill>
+                  <a:schemeClr val="accent1"/>
+                </a:solidFill>
+              </a:rPr>
+              <a:t>@tf3604</a:t>
+            </a:r>
+            <a:endParaRPr lang="en-US" sz="3200" dirty="0"/>
           </a:p>
         </p:txBody>
       </p:sp>
@@ -2836,14 +2871,25 @@
             <p:ph type="body" sz="quarter" idx="10"/>
           </p:nvPr>
         </p:nvSpPr>
-        <p:spPr/>
+        <p:spPr>
+          <a:xfrm>
+            <a:off x="361157" y="360588"/>
+            <a:ext cx="10799762" cy="1762126"/>
+          </a:xfrm>
+        </p:spPr>
         <p:txBody>
           <a:bodyPr/>
           <a:lstStyle/>
           <a:p>
             <a:r>
+              <a:rPr lang="en-US" sz="6000" dirty="0"/>
+              <a:t>Set Me Up</a:t>
+            </a:r>
+          </a:p>
+          <a:p>
+            <a:r>
               <a:rPr lang="en-US" dirty="0"/>
-              <a:t>Brian Hansen</a:t>
+              <a:t>How to Think in Sets</a:t>
             </a:r>
           </a:p>
         </p:txBody>
@@ -2879,21 +2925,21 @@
             <a:pPr algn="r"/>
             <a:r>
               <a:rPr lang="en-US" dirty="0"/>
-              <a:t>SQL Saturday #628</a:t>
+              <a:t>SQL Saturday #662</a:t>
             </a:r>
           </a:p>
           <a:p>
             <a:pPr algn="r"/>
             <a:r>
               <a:rPr lang="en-US" dirty="0"/>
-              <a:t>Baton Rouge, Louisiana</a:t>
+              <a:t>Sioux Falls, South Dakota</a:t>
             </a:r>
           </a:p>
           <a:p>
             <a:pPr algn="r"/>
             <a:r>
               <a:rPr lang="en-US" dirty="0"/>
-              <a:t>29 July 2017</a:t>
+              <a:t>19 August 2017</a:t>
             </a:r>
           </a:p>
         </p:txBody>

</xml_diff>

<commit_message>
Fix final slide for Wausau.
</commit_message>
<xml_diff>
--- a/HowToThinkInSets.pptx
+++ b/HowToThinkInSets.pptx
@@ -241,7 +241,7 @@
           <a:p>
             <a:fld id="{3CD51548-82AA-4A2B-B152-1D3266E0F652}" type="datetimeFigureOut">
               <a:rPr lang="en-US" smtClean="0"/>
-              <a:t>8/25/2017</a:t>
+              <a:t>9/17/2017</a:t>
             </a:fld>
             <a:endParaRPr lang="en-US"/>
           </a:p>
@@ -2431,7 +2431,7 @@
           <a:graphicData uri="http://schemas.openxmlformats.org/presentationml/2006/ole">
             <mc:AlternateContent xmlns:mc="http://schemas.openxmlformats.org/markup-compatibility/2006">
               <mc:Choice xmlns:v="urn:schemas-microsoft-com:vml" Requires="v">
-                <p:oleObj spid="_x0000_s1089" name="Image" r:id="rId10" imgW="2279520" imgH="1310400" progId="Photoshop.Image.18">
+                <p:oleObj spid="_x0000_s1090" name="Image" r:id="rId10" imgW="2279520" imgH="1310400" progId="Photoshop.Image.18">
                   <p:embed/>
                 </p:oleObj>
               </mc:Choice>
@@ -11882,36 +11882,6 @@
           </a:p>
         </p:txBody>
       </p:sp>
-      <p:pic>
-        <p:nvPicPr>
-          <p:cNvPr id="4" name="Picture 3">
-            <a:extLst>
-              <a:ext uri="{FF2B5EF4-FFF2-40B4-BE49-F238E27FC236}">
-                <a16:creationId xmlns:a16="http://schemas.microsoft.com/office/drawing/2014/main" id="{EB502BA9-76A8-4813-8772-B8DB3115FF84}"/>
-              </a:ext>
-            </a:extLst>
-          </p:cNvPr>
-          <p:cNvPicPr>
-            <a:picLocks noChangeAspect="1"/>
-          </p:cNvPicPr>
-          <p:nvPr/>
-        </p:nvPicPr>
-        <p:blipFill>
-          <a:blip r:embed="rId3"/>
-          <a:stretch>
-            <a:fillRect/>
-          </a:stretch>
-        </p:blipFill>
-        <p:spPr>
-          <a:xfrm>
-            <a:off x="7159118" y="2155371"/>
-            <a:ext cx="3554482" cy="2570887"/>
-          </a:xfrm>
-          <a:prstGeom prst="rect">
-            <a:avLst/>
-          </a:prstGeom>
-        </p:spPr>
-      </p:pic>
       <p:sp>
         <p:nvSpPr>
           <p:cNvPr id="7" name="TextBox 6">

</xml_diff>

<commit_message>
Reset slide deck and spreadsheet for Kansas City 2017.
</commit_message>
<xml_diff>
--- a/HowToThinkInSets.pptx
+++ b/HowToThinkInSets.pptx
@@ -241,7 +241,7 @@
           <a:p>
             <a:fld id="{3CD51548-82AA-4A2B-B152-1D3266E0F652}" type="datetimeFigureOut">
               <a:rPr lang="en-US" smtClean="0"/>
-              <a:t>9/17/2017</a:t>
+              <a:t>10/06/2017</a:t>
             </a:fld>
             <a:endParaRPr lang="en-US"/>
           </a:p>
@@ -2431,7 +2431,7 @@
           <a:graphicData uri="http://schemas.openxmlformats.org/presentationml/2006/ole">
             <mc:AlternateContent xmlns:mc="http://schemas.openxmlformats.org/markup-compatibility/2006">
               <mc:Choice xmlns:v="urn:schemas-microsoft-com:vml" Requires="v">
-                <p:oleObj spid="_x0000_s1090" name="Image" r:id="rId10" imgW="2279520" imgH="1310400" progId="Photoshop.Image.18">
+                <p:oleObj spid="_x0000_s1092" name="Image" r:id="rId10" imgW="2279520" imgH="1310400" progId="Photoshop.Image.18">
                   <p:embed/>
                 </p:oleObj>
               </mc:Choice>
@@ -2899,7 +2899,7 @@
           <p:cNvPr id="4" name="TextBox 3">
             <a:extLst>
               <a:ext uri="{FF2B5EF4-FFF2-40B4-BE49-F238E27FC236}">
-                <a16:creationId xmlns:a16="http://schemas.microsoft.com/office/drawing/2014/main" id="{4E95CA58-BC71-4CE1-ACB0-4410970492E6}"/>
+                <a16:creationId xmlns:a16="http://schemas.microsoft.com/office/drawing/2014/main" xmlns="" id="{4E95CA58-BC71-4CE1-ACB0-4410970492E6}"/>
               </a:ext>
             </a:extLst>
           </p:cNvPr>
@@ -2925,23 +2925,36 @@
             <a:pPr algn="r"/>
             <a:r>
               <a:rPr lang="en-US" dirty="0"/>
-              <a:t>SQL Saturday #631</a:t>
-            </a:r>
+              <a:t>SQL Saturday </a:t>
+            </a:r>
+            <a:r>
+              <a:rPr lang="en-US" dirty="0" smtClean="0"/>
+              <a:t>#680</a:t>
+            </a:r>
+            <a:endParaRPr lang="en-US" dirty="0"/>
           </a:p>
           <a:p>
             <a:pPr algn="r"/>
             <a:r>
+              <a:rPr lang="en-US" dirty="0" smtClean="0"/>
+              <a:t>Kansas City, Missouri</a:t>
+            </a:r>
+            <a:endParaRPr lang="en-US" dirty="0"/>
+          </a:p>
+          <a:p>
+            <a:pPr algn="r"/>
+            <a:r>
               <a:rPr lang="en-US" dirty="0"/>
-              <a:t>Wausau, Wisconsin</a:t>
-            </a:r>
-          </a:p>
-          <a:p>
-            <a:pPr algn="r"/>
-            <a:r>
-              <a:rPr lang="en-US"/>
-              <a:t>16 September 2017</a:t>
-            </a:r>
-            <a:endParaRPr lang="en-US" dirty="0"/>
+              <a:t>7</a:t>
+            </a:r>
+            <a:r>
+              <a:rPr lang="en-US" dirty="0" smtClean="0"/>
+              <a:t> October </a:t>
+            </a:r>
+            <a:r>
+              <a:rPr lang="en-US" dirty="0"/>
+              <a:t>2017</a:t>
+            </a:r>
           </a:p>
         </p:txBody>
       </p:sp>
@@ -2980,7 +2993,7 @@
           <p:cNvPr id="2" name="Title 1">
             <a:extLst>
               <a:ext uri="{FF2B5EF4-FFF2-40B4-BE49-F238E27FC236}">
-                <a16:creationId xmlns:a16="http://schemas.microsoft.com/office/drawing/2014/main" id="{FEF5F440-7918-4A6B-9C7C-C25F5B4AB5DD}"/>
+                <a16:creationId xmlns:a16="http://schemas.microsoft.com/office/drawing/2014/main" xmlns="" id="{FEF5F440-7918-4A6B-9C7C-C25F5B4AB5DD}"/>
               </a:ext>
             </a:extLst>
           </p:cNvPr>
@@ -3008,7 +3021,7 @@
           <p:cNvPr id="3" name="Content Placeholder 2">
             <a:extLst>
               <a:ext uri="{FF2B5EF4-FFF2-40B4-BE49-F238E27FC236}">
-                <a16:creationId xmlns:a16="http://schemas.microsoft.com/office/drawing/2014/main" id="{9E20F2C1-4D76-4D3B-8502-4FA0575D48CD}"/>
+                <a16:creationId xmlns:a16="http://schemas.microsoft.com/office/drawing/2014/main" xmlns="" id="{9E20F2C1-4D76-4D3B-8502-4FA0575D48CD}"/>
               </a:ext>
             </a:extLst>
           </p:cNvPr>
@@ -3036,7 +3049,7 @@
           <p:cNvPr id="4" name="Picture 3">
             <a:extLst>
               <a:ext uri="{FF2B5EF4-FFF2-40B4-BE49-F238E27FC236}">
-                <a16:creationId xmlns:a16="http://schemas.microsoft.com/office/drawing/2014/main" id="{91F19CE3-C79C-4B4E-9DFB-953E12007E9A}"/>
+                <a16:creationId xmlns:a16="http://schemas.microsoft.com/office/drawing/2014/main" xmlns="" id="{91F19CE3-C79C-4B4E-9DFB-953E12007E9A}"/>
               </a:ext>
             </a:extLst>
           </p:cNvPr>
@@ -4882,7 +4895,7 @@
           <p:cNvPr id="2" name="Title 1">
             <a:extLst>
               <a:ext uri="{FF2B5EF4-FFF2-40B4-BE49-F238E27FC236}">
-                <a16:creationId xmlns:a16="http://schemas.microsoft.com/office/drawing/2014/main" id="{FEF5F440-7918-4A6B-9C7C-C25F5B4AB5DD}"/>
+                <a16:creationId xmlns:a16="http://schemas.microsoft.com/office/drawing/2014/main" xmlns="" id="{FEF5F440-7918-4A6B-9C7C-C25F5B4AB5DD}"/>
               </a:ext>
             </a:extLst>
           </p:cNvPr>
@@ -4910,7 +4923,7 @@
           <p:cNvPr id="3" name="Content Placeholder 2">
             <a:extLst>
               <a:ext uri="{FF2B5EF4-FFF2-40B4-BE49-F238E27FC236}">
-                <a16:creationId xmlns:a16="http://schemas.microsoft.com/office/drawing/2014/main" id="{9E20F2C1-4D76-4D3B-8502-4FA0575D48CD}"/>
+                <a16:creationId xmlns:a16="http://schemas.microsoft.com/office/drawing/2014/main" xmlns="" id="{9E20F2C1-4D76-4D3B-8502-4FA0575D48CD}"/>
               </a:ext>
             </a:extLst>
           </p:cNvPr>
@@ -4938,7 +4951,7 @@
           <p:cNvPr id="4" name="Picture 3">
             <a:extLst>
               <a:ext uri="{FF2B5EF4-FFF2-40B4-BE49-F238E27FC236}">
-                <a16:creationId xmlns:a16="http://schemas.microsoft.com/office/drawing/2014/main" id="{91F19CE3-C79C-4B4E-9DFB-953E12007E9A}"/>
+                <a16:creationId xmlns:a16="http://schemas.microsoft.com/office/drawing/2014/main" xmlns="" id="{91F19CE3-C79C-4B4E-9DFB-953E12007E9A}"/>
               </a:ext>
             </a:extLst>
           </p:cNvPr>
@@ -5469,7 +5482,7 @@
           <p:cNvPr id="2" name="Title 1">
             <a:extLst>
               <a:ext uri="{FF2B5EF4-FFF2-40B4-BE49-F238E27FC236}">
-                <a16:creationId xmlns:a16="http://schemas.microsoft.com/office/drawing/2014/main" id="{FEF5F440-7918-4A6B-9C7C-C25F5B4AB5DD}"/>
+                <a16:creationId xmlns:a16="http://schemas.microsoft.com/office/drawing/2014/main" xmlns="" id="{FEF5F440-7918-4A6B-9C7C-C25F5B4AB5DD}"/>
               </a:ext>
             </a:extLst>
           </p:cNvPr>
@@ -5497,7 +5510,7 @@
           <p:cNvPr id="3" name="Content Placeholder 2">
             <a:extLst>
               <a:ext uri="{FF2B5EF4-FFF2-40B4-BE49-F238E27FC236}">
-                <a16:creationId xmlns:a16="http://schemas.microsoft.com/office/drawing/2014/main" id="{9E20F2C1-4D76-4D3B-8502-4FA0575D48CD}"/>
+                <a16:creationId xmlns:a16="http://schemas.microsoft.com/office/drawing/2014/main" xmlns="" id="{9E20F2C1-4D76-4D3B-8502-4FA0575D48CD}"/>
               </a:ext>
             </a:extLst>
           </p:cNvPr>
@@ -5525,7 +5538,7 @@
           <p:cNvPr id="4" name="Picture 3">
             <a:extLst>
               <a:ext uri="{FF2B5EF4-FFF2-40B4-BE49-F238E27FC236}">
-                <a16:creationId xmlns:a16="http://schemas.microsoft.com/office/drawing/2014/main" id="{91F19CE3-C79C-4B4E-9DFB-953E12007E9A}"/>
+                <a16:creationId xmlns:a16="http://schemas.microsoft.com/office/drawing/2014/main" xmlns="" id="{91F19CE3-C79C-4B4E-9DFB-953E12007E9A}"/>
               </a:ext>
             </a:extLst>
           </p:cNvPr>
@@ -7317,7 +7330,7 @@
           <p:cNvPr id="2" name="Title 1">
             <a:extLst>
               <a:ext uri="{FF2B5EF4-FFF2-40B4-BE49-F238E27FC236}">
-                <a16:creationId xmlns:a16="http://schemas.microsoft.com/office/drawing/2014/main" id="{FEF5F440-7918-4A6B-9C7C-C25F5B4AB5DD}"/>
+                <a16:creationId xmlns:a16="http://schemas.microsoft.com/office/drawing/2014/main" xmlns="" id="{FEF5F440-7918-4A6B-9C7C-C25F5B4AB5DD}"/>
               </a:ext>
             </a:extLst>
           </p:cNvPr>
@@ -7345,7 +7358,7 @@
           <p:cNvPr id="3" name="Content Placeholder 2">
             <a:extLst>
               <a:ext uri="{FF2B5EF4-FFF2-40B4-BE49-F238E27FC236}">
-                <a16:creationId xmlns:a16="http://schemas.microsoft.com/office/drawing/2014/main" id="{9E20F2C1-4D76-4D3B-8502-4FA0575D48CD}"/>
+                <a16:creationId xmlns:a16="http://schemas.microsoft.com/office/drawing/2014/main" xmlns="" id="{9E20F2C1-4D76-4D3B-8502-4FA0575D48CD}"/>
               </a:ext>
             </a:extLst>
           </p:cNvPr>
@@ -7373,7 +7386,7 @@
           <p:cNvPr id="4" name="Picture 3">
             <a:extLst>
               <a:ext uri="{FF2B5EF4-FFF2-40B4-BE49-F238E27FC236}">
-                <a16:creationId xmlns:a16="http://schemas.microsoft.com/office/drawing/2014/main" id="{91F19CE3-C79C-4B4E-9DFB-953E12007E9A}"/>
+                <a16:creationId xmlns:a16="http://schemas.microsoft.com/office/drawing/2014/main" xmlns="" id="{91F19CE3-C79C-4B4E-9DFB-953E12007E9A}"/>
               </a:ext>
             </a:extLst>
           </p:cNvPr>
@@ -8617,7 +8630,7 @@
           <p:cNvPr id="2" name="Title 1">
             <a:extLst>
               <a:ext uri="{FF2B5EF4-FFF2-40B4-BE49-F238E27FC236}">
-                <a16:creationId xmlns:a16="http://schemas.microsoft.com/office/drawing/2014/main" id="{FEF5F440-7918-4A6B-9C7C-C25F5B4AB5DD}"/>
+                <a16:creationId xmlns:a16="http://schemas.microsoft.com/office/drawing/2014/main" xmlns="" id="{FEF5F440-7918-4A6B-9C7C-C25F5B4AB5DD}"/>
               </a:ext>
             </a:extLst>
           </p:cNvPr>
@@ -8645,7 +8658,7 @@
           <p:cNvPr id="3" name="Content Placeholder 2">
             <a:extLst>
               <a:ext uri="{FF2B5EF4-FFF2-40B4-BE49-F238E27FC236}">
-                <a16:creationId xmlns:a16="http://schemas.microsoft.com/office/drawing/2014/main" id="{9E20F2C1-4D76-4D3B-8502-4FA0575D48CD}"/>
+                <a16:creationId xmlns:a16="http://schemas.microsoft.com/office/drawing/2014/main" xmlns="" id="{9E20F2C1-4D76-4D3B-8502-4FA0575D48CD}"/>
               </a:ext>
             </a:extLst>
           </p:cNvPr>
@@ -8673,7 +8686,7 @@
           <p:cNvPr id="4" name="Picture 3">
             <a:extLst>
               <a:ext uri="{FF2B5EF4-FFF2-40B4-BE49-F238E27FC236}">
-                <a16:creationId xmlns:a16="http://schemas.microsoft.com/office/drawing/2014/main" id="{91F19CE3-C79C-4B4E-9DFB-953E12007E9A}"/>
+                <a16:creationId xmlns:a16="http://schemas.microsoft.com/office/drawing/2014/main" xmlns="" id="{91F19CE3-C79C-4B4E-9DFB-953E12007E9A}"/>
               </a:ext>
             </a:extLst>
           </p:cNvPr>
@@ -10862,7 +10875,7 @@
           <p:cNvPr id="2" name="Title 1">
             <a:extLst>
               <a:ext uri="{FF2B5EF4-FFF2-40B4-BE49-F238E27FC236}">
-                <a16:creationId xmlns:a16="http://schemas.microsoft.com/office/drawing/2014/main" id="{FEF5F440-7918-4A6B-9C7C-C25F5B4AB5DD}"/>
+                <a16:creationId xmlns:a16="http://schemas.microsoft.com/office/drawing/2014/main" xmlns="" id="{FEF5F440-7918-4A6B-9C7C-C25F5B4AB5DD}"/>
               </a:ext>
             </a:extLst>
           </p:cNvPr>
@@ -10890,7 +10903,7 @@
           <p:cNvPr id="3" name="Content Placeholder 2">
             <a:extLst>
               <a:ext uri="{FF2B5EF4-FFF2-40B4-BE49-F238E27FC236}">
-                <a16:creationId xmlns:a16="http://schemas.microsoft.com/office/drawing/2014/main" id="{9E20F2C1-4D76-4D3B-8502-4FA0575D48CD}"/>
+                <a16:creationId xmlns:a16="http://schemas.microsoft.com/office/drawing/2014/main" xmlns="" id="{9E20F2C1-4D76-4D3B-8502-4FA0575D48CD}"/>
               </a:ext>
             </a:extLst>
           </p:cNvPr>
@@ -10918,7 +10931,7 @@
           <p:cNvPr id="4" name="Picture 3">
             <a:extLst>
               <a:ext uri="{FF2B5EF4-FFF2-40B4-BE49-F238E27FC236}">
-                <a16:creationId xmlns:a16="http://schemas.microsoft.com/office/drawing/2014/main" id="{91F19CE3-C79C-4B4E-9DFB-953E12007E9A}"/>
+                <a16:creationId xmlns:a16="http://schemas.microsoft.com/office/drawing/2014/main" xmlns="" id="{91F19CE3-C79C-4B4E-9DFB-953E12007E9A}"/>
               </a:ext>
             </a:extLst>
           </p:cNvPr>
@@ -11111,7 +11124,7 @@
           <p:cNvPr id="2" name="Title 1">
             <a:extLst>
               <a:ext uri="{FF2B5EF4-FFF2-40B4-BE49-F238E27FC236}">
-                <a16:creationId xmlns:a16="http://schemas.microsoft.com/office/drawing/2014/main" id="{CBB17BFA-186D-4C50-B7F0-4DD01FC86CAC}"/>
+                <a16:creationId xmlns:a16="http://schemas.microsoft.com/office/drawing/2014/main" xmlns="" id="{CBB17BFA-186D-4C50-B7F0-4DD01FC86CAC}"/>
               </a:ext>
             </a:extLst>
           </p:cNvPr>
@@ -11139,7 +11152,7 @@
           <p:cNvPr id="3" name="Content Placeholder 2">
             <a:extLst>
               <a:ext uri="{FF2B5EF4-FFF2-40B4-BE49-F238E27FC236}">
-                <a16:creationId xmlns:a16="http://schemas.microsoft.com/office/drawing/2014/main" id="{0CED3746-B260-4255-A890-AFA739367053}"/>
+                <a16:creationId xmlns:a16="http://schemas.microsoft.com/office/drawing/2014/main" xmlns="" id="{0CED3746-B260-4255-A890-AFA739367053}"/>
               </a:ext>
             </a:extLst>
           </p:cNvPr>
@@ -11767,6 +11780,14 @@
   <p:clrMapOvr>
     <a:masterClrMapping/>
   </p:clrMapOvr>
+  <mc:AlternateContent xmlns:mc="http://schemas.openxmlformats.org/markup-compatibility/2006">
+    <mc:Choice xmlns:p14="http://schemas.microsoft.com/office/powerpoint/2010/main" Requires="p14">
+      <p:transition spd="slow" p14:dur="2000"/>
+    </mc:Choice>
+    <mc:Fallback>
+      <p:transition spd="slow"/>
+    </mc:Fallback>
+  </mc:AlternateContent>
 </p:sld>
 </file>
 
@@ -11878,42 +11899,6 @@
                 </a:solidFill>
               </a:rPr>
               <a:t>brian@tf3604.com	• @tf3604</a:t>
-            </a:r>
-          </a:p>
-        </p:txBody>
-      </p:sp>
-      <p:sp>
-        <p:nvSpPr>
-          <p:cNvPr id="7" name="TextBox 6">
-            <a:extLst>
-              <a:ext uri="{FF2B5EF4-FFF2-40B4-BE49-F238E27FC236}">
-                <a16:creationId xmlns:a16="http://schemas.microsoft.com/office/drawing/2014/main" id="{1DE4B312-F863-4915-BB02-E74869338BEC}"/>
-              </a:ext>
-            </a:extLst>
-          </p:cNvPr>
-          <p:cNvSpPr txBox="1"/>
-          <p:nvPr/>
-        </p:nvSpPr>
-        <p:spPr>
-          <a:xfrm flipH="1">
-            <a:off x="7159118" y="4716376"/>
-            <a:ext cx="3554482" cy="369332"/>
-          </a:xfrm>
-          <a:prstGeom prst="rect">
-            <a:avLst/>
-          </a:prstGeom>
-          <a:noFill/>
-        </p:spPr>
-        <p:txBody>
-          <a:bodyPr wrap="square" rtlCol="0">
-            <a:spAutoFit/>
-          </a:bodyPr>
-          <a:lstStyle/>
-          <a:p>
-            <a:pPr algn="ctr"/>
-            <a:r>
-              <a:rPr lang="en-US" dirty="0"/>
-              <a:t>Have a happy eclipse</a:t>
             </a:r>
           </a:p>
         </p:txBody>
@@ -12162,7 +12147,7 @@
           <p:cNvPr id="4" name="Picture 3">
             <a:extLst>
               <a:ext uri="{FF2B5EF4-FFF2-40B4-BE49-F238E27FC236}">
-                <a16:creationId xmlns:a16="http://schemas.microsoft.com/office/drawing/2014/main" id="{90DA072C-7926-41E0-B73D-643B0D73A159}"/>
+                <a16:creationId xmlns:a16="http://schemas.microsoft.com/office/drawing/2014/main" xmlns="" id="{90DA072C-7926-41E0-B73D-643B0D73A159}"/>
               </a:ext>
             </a:extLst>
           </p:cNvPr>
@@ -12192,7 +12177,7 @@
           <p:cNvPr id="5" name="Picture 4">
             <a:extLst>
               <a:ext uri="{FF2B5EF4-FFF2-40B4-BE49-F238E27FC236}">
-                <a16:creationId xmlns:a16="http://schemas.microsoft.com/office/drawing/2014/main" id="{B4DA9823-AE8A-4DEE-9F72-FF82E5364AF8}"/>
+                <a16:creationId xmlns:a16="http://schemas.microsoft.com/office/drawing/2014/main" xmlns="" id="{B4DA9823-AE8A-4DEE-9F72-FF82E5364AF8}"/>
               </a:ext>
             </a:extLst>
           </p:cNvPr>
@@ -12222,7 +12207,7 @@
           <p:cNvPr id="6" name="Picture 5">
             <a:extLst>
               <a:ext uri="{FF2B5EF4-FFF2-40B4-BE49-F238E27FC236}">
-                <a16:creationId xmlns:a16="http://schemas.microsoft.com/office/drawing/2014/main" id="{6CBAB9CC-BE18-4833-9C69-EF84E94F5264}"/>
+                <a16:creationId xmlns:a16="http://schemas.microsoft.com/office/drawing/2014/main" xmlns="" id="{6CBAB9CC-BE18-4833-9C69-EF84E94F5264}"/>
               </a:ext>
             </a:extLst>
           </p:cNvPr>
@@ -12252,7 +12237,7 @@
           <p:cNvPr id="7" name="Picture 6">
             <a:extLst>
               <a:ext uri="{FF2B5EF4-FFF2-40B4-BE49-F238E27FC236}">
-                <a16:creationId xmlns:a16="http://schemas.microsoft.com/office/drawing/2014/main" id="{BFB3D48D-7586-44AA-B3A8-BA0BC32CCCDD}"/>
+                <a16:creationId xmlns:a16="http://schemas.microsoft.com/office/drawing/2014/main" xmlns="" id="{BFB3D48D-7586-44AA-B3A8-BA0BC32CCCDD}"/>
               </a:ext>
             </a:extLst>
           </p:cNvPr>
@@ -12560,7 +12545,7 @@
           <p:cNvPr id="5" name="Content Placeholder 4">
             <a:extLst>
               <a:ext uri="{FF2B5EF4-FFF2-40B4-BE49-F238E27FC236}">
-                <a16:creationId xmlns:a16="http://schemas.microsoft.com/office/drawing/2014/main" id="{EA577935-A7F7-4DF4-95F2-8BF0108D9ACF}"/>
+                <a16:creationId xmlns:a16="http://schemas.microsoft.com/office/drawing/2014/main" xmlns="" id="{EA577935-A7F7-4DF4-95F2-8BF0108D9ACF}"/>
               </a:ext>
             </a:extLst>
           </p:cNvPr>
@@ -13635,7 +13620,7 @@
           <p:cNvPr id="5" name="Content Placeholder 4">
             <a:extLst>
               <a:ext uri="{FF2B5EF4-FFF2-40B4-BE49-F238E27FC236}">
-                <a16:creationId xmlns:a16="http://schemas.microsoft.com/office/drawing/2014/main" id="{EA577935-A7F7-4DF4-95F2-8BF0108D9ACF}"/>
+                <a16:creationId xmlns:a16="http://schemas.microsoft.com/office/drawing/2014/main" xmlns="" id="{EA577935-A7F7-4DF4-95F2-8BF0108D9ACF}"/>
               </a:ext>
             </a:extLst>
           </p:cNvPr>
@@ -15722,7 +15707,7 @@
           <p:cNvPr id="5" name="Content Placeholder 4">
             <a:extLst>
               <a:ext uri="{FF2B5EF4-FFF2-40B4-BE49-F238E27FC236}">
-                <a16:creationId xmlns:a16="http://schemas.microsoft.com/office/drawing/2014/main" id="{EA577935-A7F7-4DF4-95F2-8BF0108D9ACF}"/>
+                <a16:creationId xmlns:a16="http://schemas.microsoft.com/office/drawing/2014/main" xmlns="" id="{EA577935-A7F7-4DF4-95F2-8BF0108D9ACF}"/>
               </a:ext>
             </a:extLst>
           </p:cNvPr>

</xml_diff>